<commit_message>
Project documentation philosophy added
</commit_message>
<xml_diff>
--- a/06_ohjelmistoarkkitehtuurit_ja_patternit/documentation_principles_for_sw_projects.pptx
+++ b/06_ohjelmistoarkkitehtuurit_ja_patternit/documentation_principles_for_sw_projects.pptx
@@ -5,12 +5,15 @@
     <p:sldMasterId id="2147483648" r:id="rId4"/>
   </p:sldMasterIdLst>
   <p:notesMasterIdLst>
-    <p:notesMasterId r:id="rId8"/>
+    <p:notesMasterId r:id="rId11"/>
   </p:notesMasterIdLst>
   <p:sldIdLst>
     <p:sldId id="256" r:id="rId5"/>
     <p:sldId id="275" r:id="rId6"/>
     <p:sldId id="276" r:id="rId7"/>
+    <p:sldId id="277" r:id="rId8"/>
+    <p:sldId id="278" r:id="rId9"/>
+    <p:sldId id="279" r:id="rId10"/>
   </p:sldIdLst>
   <p:sldSz cx="12192000" cy="6858000"/>
   <p:notesSz cx="6858000" cy="9144000"/>
@@ -1193,7 +1196,7 @@
           <a:p>
             <a:fld id="{5645C365-1C26-6946-87AF-75D6A7DF4277}" type="datetimeFigureOut">
               <a:rPr lang="en-GB" smtClean="0"/>
-              <a:t>30/10/2022</a:t>
+              <a:t>31/10/2022</a:t>
             </a:fld>
             <a:endParaRPr lang="en-GB"/>
           </a:p>
@@ -1692,7 +1695,7 @@
           <a:p>
             <a:fld id="{35B864B8-8D08-7B43-B4FB-B2FB41A5D9E3}" type="datetime1">
               <a:rPr lang="fi-FI" smtClean="0"/>
-              <a:t>30.10.2022</a:t>
+              <a:t>31.10.2022</a:t>
             </a:fld>
             <a:endParaRPr lang="en-GB" dirty="0"/>
           </a:p>
@@ -2019,7 +2022,7 @@
           <a:p>
             <a:fld id="{D5AEA85A-FC56-D34C-9AA6-ECC3D2586F37}" type="datetime1">
               <a:rPr lang="fi-FI" smtClean="0"/>
-              <a:t>30.10.2022</a:t>
+              <a:t>31.10.2022</a:t>
             </a:fld>
             <a:endParaRPr lang="en-GB" dirty="0"/>
           </a:p>
@@ -2229,7 +2232,7 @@
           <a:p>
             <a:fld id="{E6BC6EEF-E660-7844-8930-418AFF95EA40}" type="datetime1">
               <a:rPr lang="fi-FI" smtClean="0"/>
-              <a:t>30.10.2022</a:t>
+              <a:t>31.10.2022</a:t>
             </a:fld>
             <a:endParaRPr lang="en-GB" dirty="0"/>
           </a:p>
@@ -2538,7 +2541,7 @@
           <a:p>
             <a:fld id="{4E10C7EC-C1C1-9849-A573-7692478FCD52}" type="datetime1">
               <a:rPr lang="fi-FI" smtClean="0"/>
-              <a:t>30.10.2022</a:t>
+              <a:t>31.10.2022</a:t>
             </a:fld>
             <a:endParaRPr lang="en-GB" dirty="0"/>
           </a:p>
@@ -2811,7 +2814,7 @@
           <a:p>
             <a:fld id="{844FF3FE-30BE-2040-9151-6FBC4992BF4F}" type="datetime1">
               <a:rPr lang="fi-FI" smtClean="0"/>
-              <a:t>30.10.2022</a:t>
+              <a:t>31.10.2022</a:t>
             </a:fld>
             <a:endParaRPr lang="en-GB" dirty="0"/>
           </a:p>
@@ -3051,7 +3054,7 @@
           <a:p>
             <a:fld id="{11EDCD7B-6966-E249-89F2-D46BDFBF56BE}" type="datetime1">
               <a:rPr lang="fi-FI" smtClean="0"/>
-              <a:t>30.10.2022</a:t>
+              <a:t>31.10.2022</a:t>
             </a:fld>
             <a:endParaRPr lang="en-GB" dirty="0"/>
           </a:p>
@@ -3344,7 +3347,7 @@
           <a:p>
             <a:fld id="{11EDCD7B-6966-E249-89F2-D46BDFBF56BE}" type="datetime1">
               <a:rPr lang="fi-FI" smtClean="0"/>
-              <a:t>30.10.2022</a:t>
+              <a:t>31.10.2022</a:t>
             </a:fld>
             <a:endParaRPr lang="en-GB" dirty="0"/>
           </a:p>
@@ -3783,7 +3786,7 @@
           <a:p>
             <a:fld id="{844FF3FE-30BE-2040-9151-6FBC4992BF4F}" type="datetime1">
               <a:rPr lang="fi-FI" smtClean="0"/>
-              <a:t>30.10.2022</a:t>
+              <a:t>31.10.2022</a:t>
             </a:fld>
             <a:endParaRPr lang="en-GB" dirty="0"/>
           </a:p>
@@ -4011,7 +4014,7 @@
           <a:p>
             <a:fld id="{11EDCD7B-6966-E249-89F2-D46BDFBF56BE}" type="datetime1">
               <a:rPr lang="fi-FI" smtClean="0"/>
-              <a:t>30.10.2022</a:t>
+              <a:t>31.10.2022</a:t>
             </a:fld>
             <a:endParaRPr lang="en-GB" dirty="0"/>
           </a:p>
@@ -4426,7 +4429,7 @@
           <a:p>
             <a:fld id="{B62E192A-D52B-F541-B2AA-4AEB9388F1F7}" type="datetime1">
               <a:rPr lang="fi-FI" smtClean="0"/>
-              <a:t>30.10.2022</a:t>
+              <a:t>31.10.2022</a:t>
             </a:fld>
             <a:endParaRPr lang="en-GB" dirty="0"/>
           </a:p>
@@ -4726,7 +4729,7 @@
           <a:p>
             <a:fld id="{EEA4FAA2-2B3E-264C-A42F-2D6D3EF33A3C}" type="datetime1">
               <a:rPr lang="fi-FI" smtClean="0"/>
-              <a:t>30.10.2022</a:t>
+              <a:t>31.10.2022</a:t>
             </a:fld>
             <a:endParaRPr lang="en-GB" dirty="0"/>
           </a:p>
@@ -5629,7 +5632,7 @@
           <a:p>
             <a:fld id="{B3114A65-8017-1743-A85A-B2A4BB835AE9}" type="datetime1">
               <a:rPr lang="fi-FI" smtClean="0"/>
-              <a:t>30.10.2022</a:t>
+              <a:t>31.10.2022</a:t>
             </a:fld>
             <a:endParaRPr lang="en-GB" dirty="0"/>
           </a:p>
@@ -5857,7 +5860,7 @@
           <a:p>
             <a:fld id="{11EDCD7B-6966-E249-89F2-D46BDFBF56BE}" type="datetime1">
               <a:rPr lang="fi-FI" smtClean="0"/>
-              <a:t>30.10.2022</a:t>
+              <a:t>31.10.2022</a:t>
             </a:fld>
             <a:endParaRPr lang="en-GB" dirty="0"/>
           </a:p>
@@ -6149,7 +6152,7 @@
           <a:p>
             <a:fld id="{45F98643-D206-614D-B596-3C8548138211}" type="datetime1">
               <a:rPr lang="fi-FI" smtClean="0"/>
-              <a:t>30.10.2022</a:t>
+              <a:t>31.10.2022</a:t>
             </a:fld>
             <a:endParaRPr lang="en-GB" dirty="0"/>
           </a:p>
@@ -6789,7 +6792,7 @@
           <a:p>
             <a:fld id="{30BF63A1-919F-FB49-ABA8-182126D24C50}" type="datetime1">
               <a:rPr lang="fi-FI" smtClean="0"/>
-              <a:t>30.10.2022</a:t>
+              <a:t>31.10.2022</a:t>
             </a:fld>
             <a:endParaRPr lang="en-GB" dirty="0"/>
           </a:p>
@@ -7396,53 +7399,144 @@
               <a:rPr lang="fi-FI" dirty="0" err="1"/>
               <a:t>modules</a:t>
             </a:r>
+            <a:r>
+              <a:rPr lang="fi-FI" dirty="0"/>
+              <a:t> for </a:t>
+            </a:r>
+            <a:r>
+              <a:rPr lang="fi-FI" dirty="0" err="1"/>
+              <a:t>easier</a:t>
+            </a:r>
+            <a:r>
+              <a:rPr lang="fi-FI" dirty="0"/>
+              <a:t> </a:t>
+            </a:r>
+            <a:r>
+              <a:rPr lang="fi-FI" dirty="0" err="1"/>
+              <a:t>learning</a:t>
+            </a:r>
+            <a:r>
+              <a:rPr lang="fi-FI" dirty="0"/>
+              <a:t> </a:t>
+            </a:r>
+            <a:r>
+              <a:rPr lang="fi-FI" dirty="0" err="1"/>
+              <a:t>but</a:t>
+            </a:r>
+            <a:r>
+              <a:rPr lang="fi-FI" dirty="0"/>
+              <a:t> </a:t>
+            </a:r>
+            <a:r>
+              <a:rPr lang="fi-FI" dirty="0" err="1"/>
+              <a:t>also</a:t>
+            </a:r>
+            <a:r>
+              <a:rPr lang="fi-FI" dirty="0"/>
+              <a:t> for </a:t>
+            </a:r>
+            <a:r>
+              <a:rPr lang="fi-FI" dirty="0" err="1"/>
+              <a:t>selection</a:t>
+            </a:r>
+            <a:r>
+              <a:rPr lang="fi-FI" dirty="0"/>
+              <a:t> </a:t>
+            </a:r>
+            <a:r>
+              <a:rPr lang="fi-FI" dirty="0" err="1"/>
+              <a:t>based</a:t>
+            </a:r>
+            <a:r>
+              <a:rPr lang="fi-FI" dirty="0"/>
+              <a:t> on </a:t>
+            </a:r>
+            <a:r>
+              <a:rPr lang="fi-FI" dirty="0" err="1"/>
+              <a:t>need</a:t>
+            </a:r>
+            <a:r>
+              <a:rPr lang="fi-FI" dirty="0"/>
+              <a:t> and </a:t>
+            </a:r>
+            <a:r>
+              <a:rPr lang="fi-FI" dirty="0" err="1"/>
+              <a:t>interest</a:t>
+            </a:r>
             <a:endParaRPr lang="fi-FI" dirty="0"/>
           </a:p>
           <a:p>
             <a:r>
               <a:rPr lang="fi-FI" dirty="0" err="1"/>
-              <a:t>Avoid</a:t>
-            </a:r>
-            <a:r>
-              <a:rPr lang="fi-FI" dirty="0"/>
-              <a:t> </a:t>
-            </a:r>
-            <a:r>
-              <a:rPr lang="fi-FI" dirty="0" err="1"/>
-              <a:t>documentation</a:t>
-            </a:r>
-            <a:r>
-              <a:rPr lang="fi-FI" dirty="0"/>
-              <a:t> </a:t>
-            </a:r>
-            <a:r>
-              <a:rPr lang="fi-FI" dirty="0" err="1"/>
-              <a:t>that</a:t>
-            </a:r>
-            <a:r>
-              <a:rPr lang="fi-FI" dirty="0"/>
-              <a:t> </a:t>
-            </a:r>
-            <a:r>
-              <a:rPr lang="fi-FI" dirty="0" err="1"/>
-              <a:t>can</a:t>
-            </a:r>
-            <a:r>
-              <a:rPr lang="fi-FI" dirty="0"/>
-              <a:t> </a:t>
-            </a:r>
-            <a:r>
-              <a:rPr lang="fi-FI" dirty="0" err="1"/>
-              <a:t>be</a:t>
-            </a:r>
-            <a:r>
-              <a:rPr lang="fi-FI" dirty="0"/>
-              <a:t> made </a:t>
-            </a:r>
-            <a:r>
-              <a:rPr lang="fi-FI" dirty="0" err="1"/>
-              <a:t>unnecessary</a:t>
-            </a:r>
+              <a:t>Optimize</a:t>
+            </a:r>
+            <a:r>
+              <a:rPr lang="fi-FI" dirty="0"/>
+              <a:t> </a:t>
+            </a:r>
+            <a:r>
+              <a:rPr lang="fi-FI" dirty="0" err="1"/>
+              <a:t>understanding</a:t>
+            </a:r>
+            <a:r>
+              <a:rPr lang="fi-FI" dirty="0"/>
+              <a:t> and </a:t>
+            </a:r>
+            <a:r>
+              <a:rPr lang="fi-FI" dirty="0" err="1"/>
+              <a:t>project</a:t>
+            </a:r>
+            <a:r>
+              <a:rPr lang="fi-FI" dirty="0"/>
+              <a:t> </a:t>
+            </a:r>
+            <a:r>
+              <a:rPr lang="fi-FI" dirty="0" err="1"/>
+              <a:t>reading</a:t>
+            </a:r>
+            <a:r>
+              <a:rPr lang="fi-FI" dirty="0"/>
+              <a:t> </a:t>
+            </a:r>
+            <a:r>
+              <a:rPr lang="fi-FI" dirty="0" err="1"/>
+              <a:t>speed</a:t>
+            </a:r>
+            <a:r>
+              <a:rPr lang="fi-FI" dirty="0"/>
+              <a:t>, </a:t>
+            </a:r>
+            <a:r>
+              <a:rPr lang="fi-FI" dirty="0" err="1"/>
+              <a:t>not</a:t>
+            </a:r>
+            <a:r>
+              <a:rPr lang="fi-FI" dirty="0"/>
+              <a:t> </a:t>
+            </a:r>
+            <a:r>
+              <a:rPr lang="fi-FI" dirty="0" err="1"/>
+              <a:t>project</a:t>
+            </a:r>
+            <a:r>
+              <a:rPr lang="fi-FI" dirty="0"/>
+              <a:t> </a:t>
+            </a:r>
+            <a:r>
+              <a:rPr lang="fi-FI" dirty="0" err="1"/>
+              <a:t>writing</a:t>
+            </a:r>
+            <a:r>
+              <a:rPr lang="fi-FI" dirty="0"/>
+              <a:t> </a:t>
+            </a:r>
+            <a:r>
+              <a:rPr lang="fi-FI" dirty="0" err="1"/>
+              <a:t>speed</a:t>
+            </a:r>
+            <a:endParaRPr lang="fi-FI" dirty="0"/>
+          </a:p>
+          <a:p>
             <a:endParaRPr lang="fi-FI" dirty="0"/>
           </a:p>
           <a:p>
@@ -7479,7 +7573,7 @@
           <a:p>
             <a:fld id="{202E1EC2-47B8-044B-A09E-6A63B4D80C87}" type="datetime1">
               <a:rPr lang="fi-FI" smtClean="0"/>
-              <a:t>30.10.2022</a:t>
+              <a:t>31.10.2022</a:t>
             </a:fld>
             <a:endParaRPr lang="en-GB"/>
           </a:p>
@@ -7731,7 +7825,7 @@
           <a:p>
             <a:fld id="{202E1EC2-47B8-044B-A09E-6A63B4D80C87}" type="datetime1">
               <a:rPr lang="fi-FI" smtClean="0"/>
-              <a:t>30.10.2022</a:t>
+              <a:t>31.10.2022</a:t>
             </a:fld>
             <a:endParaRPr lang="en-GB"/>
           </a:p>
@@ -7795,6 +7889,1924 @@
     <p:extLst>
       <p:ext uri="{BB962C8B-B14F-4D97-AF65-F5344CB8AC3E}">
         <p14:creationId xmlns:p14="http://schemas.microsoft.com/office/powerpoint/2010/main" val="1083875970"/>
+      </p:ext>
+    </p:extLst>
+  </p:cSld>
+  <p:clrMapOvr>
+    <a:masterClrMapping/>
+  </p:clrMapOvr>
+</p:sld>
+</file>
+
+<file path=ppt/slides/slide4.xml><?xml version="1.0" encoding="utf-8"?>
+<p:sld xmlns:a="http://schemas.openxmlformats.org/drawingml/2006/main" xmlns:r="http://schemas.openxmlformats.org/officeDocument/2006/relationships" xmlns:p="http://schemas.openxmlformats.org/presentationml/2006/main">
+  <p:cSld>
+    <p:spTree>
+      <p:nvGrpSpPr>
+        <p:cNvPr id="1" name=""/>
+        <p:cNvGrpSpPr/>
+        <p:nvPr/>
+      </p:nvGrpSpPr>
+      <p:grpSpPr>
+        <a:xfrm>
+          <a:off x="0" y="0"/>
+          <a:ext cx="0" cy="0"/>
+          <a:chOff x="0" y="0"/>
+          <a:chExt cx="0" cy="0"/>
+        </a:xfrm>
+      </p:grpSpPr>
+      <p:sp>
+        <p:nvSpPr>
+          <p:cNvPr id="8" name="Title 7">
+            <a:extLst>
+              <a:ext uri="{FF2B5EF4-FFF2-40B4-BE49-F238E27FC236}">
+                <a16:creationId xmlns:a16="http://schemas.microsoft.com/office/drawing/2014/main" id="{197044C3-CD23-D844-B780-26FABA91AD0F}"/>
+              </a:ext>
+            </a:extLst>
+          </p:cNvPr>
+          <p:cNvSpPr>
+            <a:spLocks noGrp="1"/>
+          </p:cNvSpPr>
+          <p:nvPr>
+            <p:ph type="title"/>
+          </p:nvPr>
+        </p:nvSpPr>
+        <p:spPr>
+          <a:xfrm>
+            <a:off x="550863" y="549276"/>
+            <a:ext cx="11125200" cy="745798"/>
+          </a:xfrm>
+        </p:spPr>
+        <p:txBody>
+          <a:bodyPr>
+            <a:normAutofit/>
+          </a:bodyPr>
+          <a:lstStyle/>
+          <a:p>
+            <a:r>
+              <a:rPr lang="fi-FI" dirty="0"/>
+              <a:t>Environment and </a:t>
+            </a:r>
+            <a:r>
+              <a:rPr lang="fi-FI" dirty="0" err="1"/>
+              <a:t>project</a:t>
+            </a:r>
+            <a:r>
+              <a:rPr lang="fi-FI" dirty="0"/>
+              <a:t> </a:t>
+            </a:r>
+            <a:r>
+              <a:rPr lang="fi-FI" dirty="0" err="1"/>
+              <a:t>information</a:t>
+            </a:r>
+            <a:endParaRPr lang="fi-FI" dirty="0"/>
+          </a:p>
+        </p:txBody>
+      </p:sp>
+      <p:sp>
+        <p:nvSpPr>
+          <p:cNvPr id="9" name="Content Placeholder 8">
+            <a:extLst>
+              <a:ext uri="{FF2B5EF4-FFF2-40B4-BE49-F238E27FC236}">
+                <a16:creationId xmlns:a16="http://schemas.microsoft.com/office/drawing/2014/main" id="{ACDE61D8-A75A-F94B-B57A-46F276C03311}"/>
+              </a:ext>
+            </a:extLst>
+          </p:cNvPr>
+          <p:cNvSpPr>
+            <a:spLocks noGrp="1"/>
+          </p:cNvSpPr>
+          <p:nvPr>
+            <p:ph sz="half" idx="2"/>
+          </p:nvPr>
+        </p:nvSpPr>
+        <p:spPr>
+          <a:xfrm>
+            <a:off x="550864" y="1295073"/>
+            <a:ext cx="11125198" cy="4618365"/>
+          </a:xfrm>
+        </p:spPr>
+        <p:txBody>
+          <a:bodyPr>
+            <a:normAutofit/>
+          </a:bodyPr>
+          <a:lstStyle/>
+          <a:p>
+            <a:r>
+              <a:rPr lang="fi-FI" b="1" dirty="0" err="1"/>
+              <a:t>Hand-over</a:t>
+            </a:r>
+            <a:r>
+              <a:rPr lang="fi-FI" dirty="0"/>
+              <a:t> is </a:t>
+            </a:r>
+            <a:r>
+              <a:rPr lang="fi-FI" dirty="0" err="1"/>
+              <a:t>importantant</a:t>
+            </a:r>
+            <a:r>
+              <a:rPr lang="fi-FI" dirty="0"/>
+              <a:t> in </a:t>
+            </a:r>
+            <a:r>
+              <a:rPr lang="fi-FI" dirty="0" err="1"/>
+              <a:t>all</a:t>
+            </a:r>
+            <a:r>
+              <a:rPr lang="fi-FI" dirty="0"/>
+              <a:t> </a:t>
+            </a:r>
+            <a:r>
+              <a:rPr lang="fi-FI" dirty="0" err="1"/>
+              <a:t>projects</a:t>
+            </a:r>
+            <a:r>
+              <a:rPr lang="fi-FI" dirty="0"/>
+              <a:t>. </a:t>
+            </a:r>
+            <a:r>
+              <a:rPr lang="fi-FI" dirty="0" err="1"/>
+              <a:t>We</a:t>
+            </a:r>
+            <a:r>
+              <a:rPr lang="fi-FI" dirty="0"/>
+              <a:t> </a:t>
+            </a:r>
+            <a:r>
+              <a:rPr lang="fi-FI" dirty="0" err="1"/>
+              <a:t>never</a:t>
+            </a:r>
+            <a:r>
+              <a:rPr lang="fi-FI" dirty="0"/>
+              <a:t> </a:t>
+            </a:r>
+            <a:r>
+              <a:rPr lang="fi-FI" dirty="0" err="1"/>
+              <a:t>know</a:t>
+            </a:r>
+            <a:r>
+              <a:rPr lang="fi-FI" dirty="0"/>
+              <a:t> </a:t>
+            </a:r>
+            <a:r>
+              <a:rPr lang="fi-FI" dirty="0" err="1"/>
+              <a:t>who</a:t>
+            </a:r>
+            <a:r>
+              <a:rPr lang="fi-FI" dirty="0"/>
+              <a:t> </a:t>
+            </a:r>
+            <a:r>
+              <a:rPr lang="fi-FI" dirty="0" err="1"/>
+              <a:t>might</a:t>
+            </a:r>
+            <a:r>
+              <a:rPr lang="fi-FI" dirty="0"/>
+              <a:t> </a:t>
+            </a:r>
+            <a:r>
+              <a:rPr lang="fi-FI" dirty="0" err="1"/>
+              <a:t>continue</a:t>
+            </a:r>
+            <a:r>
+              <a:rPr lang="fi-FI" dirty="0"/>
+              <a:t> </a:t>
+            </a:r>
+            <a:r>
+              <a:rPr lang="fi-FI" dirty="0" err="1"/>
+              <a:t>with</a:t>
+            </a:r>
+            <a:r>
+              <a:rPr lang="fi-FI" dirty="0"/>
+              <a:t> </a:t>
+            </a:r>
+            <a:r>
+              <a:rPr lang="fi-FI" dirty="0" err="1"/>
+              <a:t>the</a:t>
+            </a:r>
+            <a:r>
+              <a:rPr lang="fi-FI" dirty="0"/>
+              <a:t> </a:t>
+            </a:r>
+            <a:r>
+              <a:rPr lang="fi-FI" dirty="0" err="1"/>
+              <a:t>project</a:t>
+            </a:r>
+            <a:endParaRPr lang="fi-FI" dirty="0"/>
+          </a:p>
+          <a:p>
+            <a:r>
+              <a:rPr lang="fi-FI" dirty="0"/>
+              <a:t>README.md is </a:t>
+            </a:r>
+            <a:r>
+              <a:rPr lang="fi-FI" dirty="0" err="1"/>
+              <a:t>our</a:t>
+            </a:r>
+            <a:r>
+              <a:rPr lang="fi-FI" dirty="0"/>
+              <a:t> </a:t>
+            </a:r>
+            <a:r>
+              <a:rPr lang="fi-FI" dirty="0" err="1"/>
+              <a:t>project</a:t>
+            </a:r>
+            <a:r>
+              <a:rPr lang="fi-FI" dirty="0"/>
+              <a:t> de-facto </a:t>
+            </a:r>
+            <a:r>
+              <a:rPr lang="fi-FI" dirty="0" err="1"/>
+              <a:t>standard</a:t>
+            </a:r>
+            <a:r>
+              <a:rPr lang="fi-FI" dirty="0"/>
+              <a:t>.</a:t>
+            </a:r>
+          </a:p>
+          <a:p>
+            <a:pPr lvl="1"/>
+            <a:r>
+              <a:rPr lang="fi-FI" dirty="0"/>
+              <a:t>Some </a:t>
+            </a:r>
+            <a:r>
+              <a:rPr lang="fi-FI" dirty="0" err="1"/>
+              <a:t>Markdown</a:t>
+            </a:r>
+            <a:r>
+              <a:rPr lang="fi-FI" dirty="0"/>
+              <a:t> </a:t>
+            </a:r>
+            <a:r>
+              <a:rPr lang="fi-FI" dirty="0" err="1"/>
+              <a:t>markup</a:t>
+            </a:r>
+            <a:r>
+              <a:rPr lang="fi-FI" dirty="0"/>
+              <a:t> </a:t>
+            </a:r>
+            <a:r>
+              <a:rPr lang="fi-FI" dirty="0" err="1"/>
+              <a:t>examples</a:t>
+            </a:r>
+            <a:r>
+              <a:rPr lang="fi-FI" dirty="0"/>
+              <a:t> </a:t>
+            </a:r>
+            <a:r>
+              <a:rPr lang="fi-FI" dirty="0" err="1"/>
+              <a:t>given</a:t>
+            </a:r>
+            <a:r>
+              <a:rPr lang="fi-FI" dirty="0"/>
+              <a:t> on </a:t>
+            </a:r>
+            <a:r>
+              <a:rPr lang="fi-FI" dirty="0" err="1"/>
+              <a:t>the</a:t>
+            </a:r>
+            <a:r>
+              <a:rPr lang="fi-FI" dirty="0"/>
+              <a:t> </a:t>
+            </a:r>
+            <a:r>
+              <a:rPr lang="fi-FI" dirty="0" err="1"/>
+              <a:t>course</a:t>
+            </a:r>
+            <a:r>
+              <a:rPr lang="fi-FI" dirty="0"/>
+              <a:t>. </a:t>
+            </a:r>
+            <a:r>
+              <a:rPr lang="fi-FI" dirty="0" err="1"/>
+              <a:t>Check</a:t>
+            </a:r>
+            <a:r>
+              <a:rPr lang="fi-FI" dirty="0"/>
+              <a:t> it out. </a:t>
+            </a:r>
+            <a:r>
+              <a:rPr lang="fi-FI" dirty="0" err="1"/>
+              <a:t>Test</a:t>
+            </a:r>
+            <a:r>
+              <a:rPr lang="fi-FI" dirty="0"/>
+              <a:t> </a:t>
+            </a:r>
+            <a:r>
+              <a:rPr lang="fi-FI" dirty="0" err="1"/>
+              <a:t>whether</a:t>
+            </a:r>
+            <a:r>
+              <a:rPr lang="fi-FI" dirty="0"/>
+              <a:t> </a:t>
+            </a:r>
+            <a:r>
+              <a:rPr lang="fi-FI" dirty="0" err="1"/>
+              <a:t>works</a:t>
+            </a:r>
+            <a:r>
+              <a:rPr lang="fi-FI" dirty="0"/>
+              <a:t> on </a:t>
+            </a:r>
+            <a:r>
+              <a:rPr lang="fi-FI" dirty="0" err="1"/>
+              <a:t>Github</a:t>
+            </a:r>
+            <a:r>
+              <a:rPr lang="fi-FI" dirty="0"/>
+              <a:t> </a:t>
+            </a:r>
+            <a:r>
+              <a:rPr lang="fi-FI" dirty="0" err="1"/>
+              <a:t>pages</a:t>
+            </a:r>
+            <a:r>
+              <a:rPr lang="fi-FI" dirty="0"/>
+              <a:t>.</a:t>
+            </a:r>
+          </a:p>
+          <a:p>
+            <a:r>
+              <a:rPr lang="fi-FI" dirty="0"/>
+              <a:t>Make </a:t>
+            </a:r>
+            <a:r>
+              <a:rPr lang="fi-FI" dirty="0" err="1"/>
+              <a:t>your</a:t>
+            </a:r>
+            <a:r>
+              <a:rPr lang="fi-FI" dirty="0"/>
+              <a:t> </a:t>
+            </a:r>
+            <a:r>
+              <a:rPr lang="fi-FI" dirty="0" err="1"/>
+              <a:t>project</a:t>
+            </a:r>
+            <a:r>
+              <a:rPr lang="fi-FI" dirty="0"/>
+              <a:t> </a:t>
+            </a:r>
+            <a:r>
+              <a:rPr lang="fi-FI" dirty="0" err="1"/>
+              <a:t>installation</a:t>
+            </a:r>
+            <a:r>
+              <a:rPr lang="fi-FI" dirty="0"/>
+              <a:t> and </a:t>
+            </a:r>
+            <a:r>
+              <a:rPr lang="fi-FI" dirty="0" err="1"/>
+              <a:t>configuration</a:t>
+            </a:r>
+            <a:r>
+              <a:rPr lang="fi-FI" dirty="0"/>
+              <a:t> </a:t>
+            </a:r>
+            <a:r>
+              <a:rPr lang="fi-FI" dirty="0" err="1"/>
+              <a:t>clear</a:t>
+            </a:r>
+            <a:r>
+              <a:rPr lang="fi-FI" dirty="0"/>
+              <a:t> to </a:t>
+            </a:r>
+            <a:r>
+              <a:rPr lang="fi-FI" dirty="0" err="1"/>
+              <a:t>the</a:t>
+            </a:r>
+            <a:r>
+              <a:rPr lang="fi-FI" dirty="0"/>
+              <a:t> </a:t>
+            </a:r>
+            <a:r>
+              <a:rPr lang="fi-FI" dirty="0" err="1"/>
+              <a:t>reader</a:t>
+            </a:r>
+            <a:r>
+              <a:rPr lang="fi-FI" dirty="0"/>
+              <a:t>. An </a:t>
+            </a:r>
+            <a:r>
+              <a:rPr lang="fi-FI" dirty="0" err="1"/>
+              <a:t>average</a:t>
+            </a:r>
+            <a:r>
+              <a:rPr lang="fi-FI" dirty="0"/>
+              <a:t> IT </a:t>
+            </a:r>
+            <a:r>
+              <a:rPr lang="fi-FI" dirty="0" err="1"/>
+              <a:t>professional</a:t>
+            </a:r>
+            <a:r>
+              <a:rPr lang="fi-FI" dirty="0"/>
+              <a:t> </a:t>
+            </a:r>
+            <a:r>
+              <a:rPr lang="fi-FI" dirty="0" err="1"/>
+              <a:t>has</a:t>
+            </a:r>
+            <a:r>
+              <a:rPr lang="fi-FI" dirty="0"/>
+              <a:t> to </a:t>
+            </a:r>
+            <a:r>
+              <a:rPr lang="fi-FI" dirty="0" err="1"/>
+              <a:t>be</a:t>
+            </a:r>
+            <a:r>
+              <a:rPr lang="fi-FI" dirty="0"/>
+              <a:t> </a:t>
+            </a:r>
+            <a:r>
+              <a:rPr lang="fi-FI" dirty="0" err="1"/>
+              <a:t>able</a:t>
+            </a:r>
+            <a:r>
+              <a:rPr lang="fi-FI" dirty="0"/>
+              <a:t> to </a:t>
+            </a:r>
+            <a:r>
+              <a:rPr lang="fi-FI" dirty="0" err="1"/>
+              <a:t>setup</a:t>
+            </a:r>
+            <a:r>
+              <a:rPr lang="fi-FI" dirty="0"/>
+              <a:t> </a:t>
+            </a:r>
+            <a:r>
+              <a:rPr lang="fi-FI" dirty="0" err="1"/>
+              <a:t>everything</a:t>
+            </a:r>
+            <a:r>
+              <a:rPr lang="fi-FI" dirty="0"/>
+              <a:t> </a:t>
+            </a:r>
+            <a:r>
+              <a:rPr lang="fi-FI" dirty="0" err="1"/>
+              <a:t>without</a:t>
+            </a:r>
+            <a:r>
+              <a:rPr lang="fi-FI" dirty="0"/>
+              <a:t> </a:t>
+            </a:r>
+            <a:r>
+              <a:rPr lang="fi-FI" dirty="0" err="1"/>
+              <a:t>further</a:t>
+            </a:r>
+            <a:r>
+              <a:rPr lang="fi-FI" dirty="0"/>
+              <a:t> </a:t>
+            </a:r>
+            <a:r>
+              <a:rPr lang="fi-FI" dirty="0" err="1"/>
+              <a:t>assistance</a:t>
+            </a:r>
+            <a:r>
+              <a:rPr lang="fi-FI" dirty="0"/>
+              <a:t>!</a:t>
+            </a:r>
+          </a:p>
+          <a:p>
+            <a:r>
+              <a:rPr lang="fi-FI" dirty="0" err="1"/>
+              <a:t>Don’t</a:t>
+            </a:r>
+            <a:r>
+              <a:rPr lang="fi-FI" dirty="0"/>
+              <a:t> </a:t>
+            </a:r>
+            <a:r>
+              <a:rPr lang="fi-FI" dirty="0" err="1"/>
+              <a:t>write</a:t>
+            </a:r>
+            <a:r>
+              <a:rPr lang="fi-FI" dirty="0"/>
+              <a:t> </a:t>
+            </a:r>
+            <a:r>
+              <a:rPr lang="fi-FI" dirty="0" err="1"/>
+              <a:t>redundant</a:t>
+            </a:r>
+            <a:r>
+              <a:rPr lang="fi-FI" dirty="0"/>
+              <a:t> </a:t>
+            </a:r>
+            <a:r>
+              <a:rPr lang="fi-FI" dirty="0" err="1"/>
+              <a:t>information</a:t>
+            </a:r>
+            <a:r>
+              <a:rPr lang="fi-FI" dirty="0"/>
+              <a:t>. </a:t>
+            </a:r>
+            <a:r>
+              <a:rPr lang="fi-FI" dirty="0" err="1"/>
+              <a:t>Thus</a:t>
+            </a:r>
+            <a:r>
+              <a:rPr lang="fi-FI" dirty="0"/>
+              <a:t> no </a:t>
+            </a:r>
+            <a:r>
+              <a:rPr lang="fi-FI" dirty="0" err="1"/>
+              <a:t>instructions</a:t>
+            </a:r>
+            <a:r>
+              <a:rPr lang="fi-FI" dirty="0"/>
+              <a:t> on </a:t>
+            </a:r>
+            <a:r>
+              <a:rPr lang="fi-FI" dirty="0" err="1"/>
+              <a:t>how</a:t>
+            </a:r>
+            <a:r>
+              <a:rPr lang="fi-FI" dirty="0"/>
+              <a:t> to </a:t>
+            </a:r>
+            <a:r>
+              <a:rPr lang="fi-FI" dirty="0" err="1"/>
+              <a:t>e.g</a:t>
+            </a:r>
+            <a:r>
+              <a:rPr lang="fi-FI" dirty="0"/>
+              <a:t>. </a:t>
+            </a:r>
+            <a:r>
+              <a:rPr lang="fi-FI" dirty="0" err="1"/>
+              <a:t>install</a:t>
+            </a:r>
+            <a:r>
+              <a:rPr lang="fi-FI" dirty="0"/>
+              <a:t> </a:t>
+            </a:r>
+            <a:r>
+              <a:rPr lang="fi-FI" dirty="0" err="1"/>
+              <a:t>Docker</a:t>
+            </a:r>
+            <a:r>
+              <a:rPr lang="fi-FI" dirty="0"/>
+              <a:t>. Just </a:t>
+            </a:r>
+            <a:r>
+              <a:rPr lang="fi-FI" dirty="0" err="1"/>
+              <a:t>list</a:t>
+            </a:r>
+            <a:r>
+              <a:rPr lang="fi-FI" dirty="0"/>
+              <a:t> it as </a:t>
+            </a:r>
+            <a:r>
+              <a:rPr lang="fi-FI" dirty="0" err="1"/>
+              <a:t>pre-requisites</a:t>
+            </a:r>
+            <a:r>
+              <a:rPr lang="fi-FI" dirty="0"/>
+              <a:t> and </a:t>
+            </a:r>
+            <a:r>
+              <a:rPr lang="fi-FI" dirty="0" err="1"/>
+              <a:t>possibly</a:t>
+            </a:r>
+            <a:r>
+              <a:rPr lang="fi-FI" dirty="0"/>
+              <a:t> </a:t>
+            </a:r>
+            <a:r>
+              <a:rPr lang="fi-FI" dirty="0" err="1"/>
+              <a:t>give</a:t>
+            </a:r>
+            <a:r>
+              <a:rPr lang="fi-FI" dirty="0"/>
+              <a:t> </a:t>
+            </a:r>
+            <a:r>
+              <a:rPr lang="fi-FI" dirty="0" err="1"/>
+              <a:t>link</a:t>
+            </a:r>
+            <a:r>
+              <a:rPr lang="fi-FI" dirty="0"/>
+              <a:t> to </a:t>
+            </a:r>
+            <a:r>
+              <a:rPr lang="fi-FI" dirty="0" err="1"/>
+              <a:t>elsewhere</a:t>
+            </a:r>
+            <a:r>
+              <a:rPr lang="fi-FI" dirty="0"/>
+              <a:t>. </a:t>
+            </a:r>
+          </a:p>
+          <a:p>
+            <a:r>
+              <a:rPr lang="fi-FI" dirty="0" err="1"/>
+              <a:t>Remember</a:t>
+            </a:r>
+            <a:r>
+              <a:rPr lang="fi-FI" dirty="0"/>
+              <a:t> to </a:t>
+            </a:r>
+            <a:r>
+              <a:rPr lang="fi-FI" dirty="0" err="1"/>
+              <a:t>explain</a:t>
+            </a:r>
+            <a:r>
+              <a:rPr lang="fi-FI" dirty="0"/>
+              <a:t> </a:t>
+            </a:r>
+            <a:r>
+              <a:rPr lang="fi-FI" dirty="0" err="1"/>
+              <a:t>the</a:t>
+            </a:r>
+            <a:r>
+              <a:rPr lang="fi-FI" dirty="0"/>
+              <a:t> </a:t>
+            </a:r>
+            <a:r>
+              <a:rPr lang="fi-FI" dirty="0" err="1"/>
+              <a:t>gitignored</a:t>
+            </a:r>
+            <a:r>
+              <a:rPr lang="fi-FI" dirty="0"/>
+              <a:t> </a:t>
+            </a:r>
+            <a:r>
+              <a:rPr lang="fi-FI" dirty="0" err="1"/>
+              <a:t>secrets</a:t>
+            </a:r>
+            <a:r>
+              <a:rPr lang="fi-FI" dirty="0"/>
+              <a:t> </a:t>
+            </a:r>
+            <a:r>
+              <a:rPr lang="fi-FI" dirty="0" err="1"/>
+              <a:t>config</a:t>
+            </a:r>
+            <a:r>
+              <a:rPr lang="fi-FI" dirty="0"/>
+              <a:t>! (</a:t>
+            </a:r>
+            <a:r>
+              <a:rPr lang="fi-FI" dirty="0" err="1"/>
+              <a:t>But</a:t>
+            </a:r>
+            <a:r>
+              <a:rPr lang="fi-FI" dirty="0"/>
+              <a:t> no </a:t>
+            </a:r>
+            <a:r>
+              <a:rPr lang="fi-FI" dirty="0" err="1"/>
+              <a:t>real</a:t>
+            </a:r>
+            <a:r>
+              <a:rPr lang="fi-FI" dirty="0"/>
+              <a:t> </a:t>
+            </a:r>
+            <a:r>
+              <a:rPr lang="fi-FI" dirty="0" err="1"/>
+              <a:t>values</a:t>
+            </a:r>
+            <a:r>
+              <a:rPr lang="fi-FI" dirty="0"/>
+              <a:t> to </a:t>
+            </a:r>
+            <a:r>
+              <a:rPr lang="fi-FI" dirty="0" err="1"/>
+              <a:t>the</a:t>
+            </a:r>
+            <a:r>
+              <a:rPr lang="fi-FI" dirty="0"/>
+              <a:t> git repo (</a:t>
+            </a:r>
+            <a:r>
+              <a:rPr lang="fi-FI" dirty="0" err="1"/>
+              <a:t>history</a:t>
+            </a:r>
+            <a:r>
+              <a:rPr lang="fi-FI" dirty="0"/>
+              <a:t>)!)</a:t>
+            </a:r>
+          </a:p>
+          <a:p>
+            <a:r>
+              <a:rPr lang="fi-FI" dirty="0" err="1"/>
+              <a:t>Be</a:t>
+            </a:r>
+            <a:r>
+              <a:rPr lang="fi-FI" dirty="0"/>
+              <a:t> </a:t>
+            </a:r>
+            <a:r>
+              <a:rPr lang="fi-FI" dirty="0" err="1"/>
+              <a:t>modular</a:t>
+            </a:r>
+            <a:r>
+              <a:rPr lang="fi-FI" dirty="0"/>
+              <a:t> in </a:t>
+            </a:r>
+            <a:r>
+              <a:rPr lang="fi-FI" dirty="0" err="1"/>
+              <a:t>your</a:t>
+            </a:r>
+            <a:r>
+              <a:rPr lang="fi-FI" dirty="0"/>
+              <a:t> </a:t>
+            </a:r>
+            <a:r>
+              <a:rPr lang="fi-FI" dirty="0" err="1"/>
+              <a:t>explanations</a:t>
+            </a:r>
+            <a:r>
+              <a:rPr lang="fi-FI" dirty="0"/>
+              <a:t>, </a:t>
+            </a:r>
+            <a:r>
+              <a:rPr lang="fi-FI" dirty="0" err="1"/>
+              <a:t>link</a:t>
+            </a:r>
+            <a:r>
+              <a:rPr lang="fi-FI" dirty="0"/>
+              <a:t> to </a:t>
+            </a:r>
+            <a:r>
+              <a:rPr lang="fi-FI" dirty="0" err="1"/>
+              <a:t>to</a:t>
+            </a:r>
+            <a:r>
+              <a:rPr lang="fi-FI" dirty="0"/>
+              <a:t> </a:t>
+            </a:r>
+            <a:r>
+              <a:rPr lang="fi-FI" dirty="0" err="1"/>
+              <a:t>other</a:t>
+            </a:r>
+            <a:r>
+              <a:rPr lang="fi-FI" dirty="0"/>
+              <a:t> .md </a:t>
+            </a:r>
+            <a:r>
+              <a:rPr lang="fi-FI" dirty="0" err="1"/>
+              <a:t>files</a:t>
+            </a:r>
+            <a:r>
+              <a:rPr lang="fi-FI" dirty="0"/>
+              <a:t> in </a:t>
+            </a:r>
+            <a:r>
+              <a:rPr lang="fi-FI" dirty="0" err="1"/>
+              <a:t>the</a:t>
+            </a:r>
+            <a:r>
+              <a:rPr lang="fi-FI" dirty="0"/>
+              <a:t> </a:t>
+            </a:r>
+            <a:r>
+              <a:rPr lang="fi-FI" dirty="0" err="1"/>
+              <a:t>project</a:t>
+            </a:r>
+            <a:r>
+              <a:rPr lang="fi-FI" dirty="0"/>
+              <a:t>.</a:t>
+            </a:r>
+          </a:p>
+          <a:p>
+            <a:endParaRPr lang="fi-FI" dirty="0"/>
+          </a:p>
+        </p:txBody>
+      </p:sp>
+      <p:sp>
+        <p:nvSpPr>
+          <p:cNvPr id="5" name="Date Placeholder 4">
+            <a:extLst>
+              <a:ext uri="{FF2B5EF4-FFF2-40B4-BE49-F238E27FC236}">
+                <a16:creationId xmlns:a16="http://schemas.microsoft.com/office/drawing/2014/main" id="{976244E2-AA76-2742-B2EC-FEC79276155C}"/>
+              </a:ext>
+            </a:extLst>
+          </p:cNvPr>
+          <p:cNvSpPr>
+            <a:spLocks noGrp="1"/>
+          </p:cNvSpPr>
+          <p:nvPr>
+            <p:ph type="dt" sz="half" idx="10"/>
+          </p:nvPr>
+        </p:nvSpPr>
+        <p:spPr/>
+        <p:txBody>
+          <a:bodyPr/>
+          <a:lstStyle/>
+          <a:p>
+            <a:fld id="{202E1EC2-47B8-044B-A09E-6A63B4D80C87}" type="datetime1">
+              <a:rPr lang="fi-FI" smtClean="0"/>
+              <a:t>31.10.2022</a:t>
+            </a:fld>
+            <a:endParaRPr lang="en-GB"/>
+          </a:p>
+        </p:txBody>
+      </p:sp>
+      <p:sp>
+        <p:nvSpPr>
+          <p:cNvPr id="6" name="Footer Placeholder 5">
+            <a:extLst>
+              <a:ext uri="{FF2B5EF4-FFF2-40B4-BE49-F238E27FC236}">
+                <a16:creationId xmlns:a16="http://schemas.microsoft.com/office/drawing/2014/main" id="{588CE607-4137-8840-8FEA-42EAC857E3A3}"/>
+              </a:ext>
+            </a:extLst>
+          </p:cNvPr>
+          <p:cNvSpPr>
+            <a:spLocks noGrp="1"/>
+          </p:cNvSpPr>
+          <p:nvPr>
+            <p:ph type="ftr" sz="quarter" idx="11"/>
+          </p:nvPr>
+        </p:nvSpPr>
+        <p:spPr/>
+        <p:txBody>
+          <a:bodyPr/>
+          <a:lstStyle/>
+          <a:p>
+            <a:endParaRPr lang="en-GB"/>
+          </a:p>
+        </p:txBody>
+      </p:sp>
+      <p:sp>
+        <p:nvSpPr>
+          <p:cNvPr id="7" name="Slide Number Placeholder 6">
+            <a:extLst>
+              <a:ext uri="{FF2B5EF4-FFF2-40B4-BE49-F238E27FC236}">
+                <a16:creationId xmlns:a16="http://schemas.microsoft.com/office/drawing/2014/main" id="{2E133A96-6C73-0844-B8CB-27C2B5F4CFB1}"/>
+              </a:ext>
+            </a:extLst>
+          </p:cNvPr>
+          <p:cNvSpPr>
+            <a:spLocks noGrp="1"/>
+          </p:cNvSpPr>
+          <p:nvPr>
+            <p:ph type="sldNum" sz="quarter" idx="12"/>
+          </p:nvPr>
+        </p:nvSpPr>
+        <p:spPr/>
+        <p:txBody>
+          <a:bodyPr/>
+          <a:lstStyle/>
+          <a:p>
+            <a:fld id="{76BAB7ED-EDE9-4D4B-9A2D-30E18C47C16E}" type="slidenum">
+              <a:rPr lang="en-GB" smtClean="0"/>
+              <a:t>4</a:t>
+            </a:fld>
+            <a:endParaRPr lang="en-GB"/>
+          </a:p>
+        </p:txBody>
+      </p:sp>
+    </p:spTree>
+    <p:extLst>
+      <p:ext uri="{BB962C8B-B14F-4D97-AF65-F5344CB8AC3E}">
+        <p14:creationId xmlns:p14="http://schemas.microsoft.com/office/powerpoint/2010/main" val="2495581074"/>
+      </p:ext>
+    </p:extLst>
+  </p:cSld>
+  <p:clrMapOvr>
+    <a:masterClrMapping/>
+  </p:clrMapOvr>
+</p:sld>
+</file>
+
+<file path=ppt/slides/slide5.xml><?xml version="1.0" encoding="utf-8"?>
+<p:sld xmlns:a="http://schemas.openxmlformats.org/drawingml/2006/main" xmlns:r="http://schemas.openxmlformats.org/officeDocument/2006/relationships" xmlns:p="http://schemas.openxmlformats.org/presentationml/2006/main">
+  <p:cSld>
+    <p:spTree>
+      <p:nvGrpSpPr>
+        <p:cNvPr id="1" name=""/>
+        <p:cNvGrpSpPr/>
+        <p:nvPr/>
+      </p:nvGrpSpPr>
+      <p:grpSpPr>
+        <a:xfrm>
+          <a:off x="0" y="0"/>
+          <a:ext cx="0" cy="0"/>
+          <a:chOff x="0" y="0"/>
+          <a:chExt cx="0" cy="0"/>
+        </a:xfrm>
+      </p:grpSpPr>
+      <p:sp>
+        <p:nvSpPr>
+          <p:cNvPr id="8" name="Title 7">
+            <a:extLst>
+              <a:ext uri="{FF2B5EF4-FFF2-40B4-BE49-F238E27FC236}">
+                <a16:creationId xmlns:a16="http://schemas.microsoft.com/office/drawing/2014/main" id="{197044C3-CD23-D844-B780-26FABA91AD0F}"/>
+              </a:ext>
+            </a:extLst>
+          </p:cNvPr>
+          <p:cNvSpPr>
+            <a:spLocks noGrp="1"/>
+          </p:cNvSpPr>
+          <p:nvPr>
+            <p:ph type="title"/>
+          </p:nvPr>
+        </p:nvSpPr>
+        <p:spPr>
+          <a:xfrm>
+            <a:off x="550863" y="549276"/>
+            <a:ext cx="11125200" cy="745798"/>
+          </a:xfrm>
+        </p:spPr>
+        <p:txBody>
+          <a:bodyPr/>
+          <a:lstStyle/>
+          <a:p>
+            <a:r>
+              <a:rPr lang="fi-FI" dirty="0"/>
+              <a:t>Architecture </a:t>
+            </a:r>
+            <a:r>
+              <a:rPr lang="fi-FI" dirty="0" err="1"/>
+              <a:t>introduction</a:t>
+            </a:r>
+            <a:endParaRPr lang="fi-FI" dirty="0"/>
+          </a:p>
+        </p:txBody>
+      </p:sp>
+      <p:sp>
+        <p:nvSpPr>
+          <p:cNvPr id="9" name="Content Placeholder 8">
+            <a:extLst>
+              <a:ext uri="{FF2B5EF4-FFF2-40B4-BE49-F238E27FC236}">
+                <a16:creationId xmlns:a16="http://schemas.microsoft.com/office/drawing/2014/main" id="{ACDE61D8-A75A-F94B-B57A-46F276C03311}"/>
+              </a:ext>
+            </a:extLst>
+          </p:cNvPr>
+          <p:cNvSpPr>
+            <a:spLocks noGrp="1"/>
+          </p:cNvSpPr>
+          <p:nvPr>
+            <p:ph sz="half" idx="2"/>
+          </p:nvPr>
+        </p:nvSpPr>
+        <p:spPr>
+          <a:xfrm>
+            <a:off x="550864" y="1295073"/>
+            <a:ext cx="11125198" cy="4618365"/>
+          </a:xfrm>
+        </p:spPr>
+        <p:txBody>
+          <a:bodyPr>
+            <a:normAutofit/>
+          </a:bodyPr>
+          <a:lstStyle/>
+          <a:p>
+            <a:r>
+              <a:rPr lang="fi-FI" dirty="0" err="1"/>
+              <a:t>Give</a:t>
+            </a:r>
+            <a:r>
+              <a:rPr lang="fi-FI" dirty="0"/>
+              <a:t> just </a:t>
+            </a:r>
+            <a:r>
+              <a:rPr lang="fi-FI" dirty="0" err="1"/>
+              <a:t>the</a:t>
+            </a:r>
+            <a:r>
+              <a:rPr lang="fi-FI" dirty="0"/>
+              <a:t> </a:t>
+            </a:r>
+            <a:r>
+              <a:rPr lang="fi-FI" dirty="0" err="1"/>
+              <a:t>big</a:t>
+            </a:r>
+            <a:r>
+              <a:rPr lang="fi-FI" dirty="0"/>
+              <a:t> </a:t>
+            </a:r>
+            <a:r>
+              <a:rPr lang="fi-FI" dirty="0" err="1"/>
+              <a:t>picture</a:t>
+            </a:r>
+            <a:r>
+              <a:rPr lang="fi-FI" dirty="0"/>
+              <a:t>, </a:t>
+            </a:r>
+            <a:r>
+              <a:rPr lang="fi-FI" dirty="0" err="1"/>
+              <a:t>put</a:t>
+            </a:r>
+            <a:r>
+              <a:rPr lang="fi-FI" dirty="0"/>
+              <a:t> </a:t>
+            </a:r>
+            <a:r>
+              <a:rPr lang="fi-FI" dirty="0" err="1"/>
+              <a:t>the</a:t>
+            </a:r>
+            <a:r>
+              <a:rPr lang="fi-FI" dirty="0"/>
+              <a:t> </a:t>
+            </a:r>
+            <a:r>
+              <a:rPr lang="fi-FI" dirty="0" err="1"/>
+              <a:t>reader</a:t>
+            </a:r>
+            <a:r>
+              <a:rPr lang="fi-FI" dirty="0"/>
+              <a:t> on </a:t>
+            </a:r>
+            <a:r>
+              <a:rPr lang="fi-FI" dirty="0" err="1"/>
+              <a:t>the</a:t>
+            </a:r>
+            <a:r>
+              <a:rPr lang="fi-FI" dirty="0"/>
+              <a:t> </a:t>
+            </a:r>
+            <a:r>
+              <a:rPr lang="fi-FI" dirty="0" err="1"/>
+              <a:t>map</a:t>
+            </a:r>
+            <a:endParaRPr lang="fi-FI" dirty="0"/>
+          </a:p>
+          <a:p>
+            <a:r>
+              <a:rPr lang="fi-FI" dirty="0" err="1"/>
+              <a:t>It’s</a:t>
+            </a:r>
+            <a:r>
+              <a:rPr lang="fi-FI" dirty="0"/>
+              <a:t> a </a:t>
+            </a:r>
+            <a:r>
+              <a:rPr lang="fi-FI" dirty="0" err="1"/>
+              <a:t>lot</a:t>
+            </a:r>
+            <a:r>
+              <a:rPr lang="fi-FI" dirty="0"/>
+              <a:t> </a:t>
+            </a:r>
+            <a:r>
+              <a:rPr lang="fi-FI" dirty="0" err="1"/>
+              <a:t>easier</a:t>
+            </a:r>
+            <a:r>
+              <a:rPr lang="fi-FI" dirty="0"/>
+              <a:t> to </a:t>
+            </a:r>
+            <a:r>
+              <a:rPr lang="fi-FI" dirty="0" err="1"/>
+              <a:t>study</a:t>
+            </a:r>
+            <a:r>
+              <a:rPr lang="fi-FI" dirty="0"/>
+              <a:t> </a:t>
+            </a:r>
+            <a:r>
+              <a:rPr lang="fi-FI" dirty="0" err="1"/>
+              <a:t>the</a:t>
+            </a:r>
+            <a:r>
+              <a:rPr lang="fi-FI" dirty="0"/>
+              <a:t> </a:t>
+            </a:r>
+            <a:r>
+              <a:rPr lang="fi-FI" dirty="0" err="1"/>
+              <a:t>project</a:t>
+            </a:r>
+            <a:r>
+              <a:rPr lang="fi-FI" dirty="0"/>
+              <a:t> </a:t>
+            </a:r>
+            <a:r>
+              <a:rPr lang="fi-FI" dirty="0" err="1"/>
+              <a:t>folders</a:t>
+            </a:r>
+            <a:r>
+              <a:rPr lang="fi-FI" dirty="0"/>
+              <a:t> and </a:t>
+            </a:r>
+            <a:r>
+              <a:rPr lang="fi-FI" dirty="0" err="1"/>
+              <a:t>code</a:t>
+            </a:r>
+            <a:r>
+              <a:rPr lang="fi-FI" dirty="0"/>
+              <a:t> </a:t>
+            </a:r>
+            <a:r>
+              <a:rPr lang="fi-FI" dirty="0" err="1"/>
+              <a:t>when</a:t>
+            </a:r>
+            <a:r>
+              <a:rPr lang="fi-FI" dirty="0"/>
+              <a:t> </a:t>
+            </a:r>
+            <a:r>
+              <a:rPr lang="fi-FI" dirty="0" err="1"/>
+              <a:t>you</a:t>
+            </a:r>
+            <a:r>
+              <a:rPr lang="fi-FI" dirty="0"/>
+              <a:t> </a:t>
+            </a:r>
+            <a:r>
+              <a:rPr lang="fi-FI" dirty="0" err="1"/>
+              <a:t>have</a:t>
+            </a:r>
+            <a:r>
+              <a:rPr lang="fi-FI" dirty="0"/>
+              <a:t> some </a:t>
+            </a:r>
+            <a:r>
+              <a:rPr lang="fi-FI" dirty="0" err="1"/>
+              <a:t>kind</a:t>
+            </a:r>
+            <a:r>
+              <a:rPr lang="fi-FI" dirty="0"/>
+              <a:t> of idea </a:t>
+            </a:r>
+            <a:r>
+              <a:rPr lang="fi-FI" dirty="0" err="1"/>
+              <a:t>what</a:t>
+            </a:r>
+            <a:r>
+              <a:rPr lang="fi-FI" dirty="0"/>
+              <a:t> to look for</a:t>
+            </a:r>
+          </a:p>
+          <a:p>
+            <a:r>
+              <a:rPr lang="fi-FI" dirty="0" err="1"/>
+              <a:t>Maybe</a:t>
+            </a:r>
+            <a:r>
+              <a:rPr lang="fi-FI" dirty="0"/>
+              <a:t> some </a:t>
+            </a:r>
+            <a:r>
+              <a:rPr lang="fi-FI" dirty="0" err="1"/>
+              <a:t>rough</a:t>
+            </a:r>
+            <a:r>
+              <a:rPr lang="fi-FI" dirty="0"/>
+              <a:t> </a:t>
+            </a:r>
+            <a:r>
+              <a:rPr lang="fi-FI" dirty="0" err="1"/>
+              <a:t>visualization</a:t>
+            </a:r>
+            <a:r>
+              <a:rPr lang="fi-FI" dirty="0"/>
+              <a:t> of </a:t>
+            </a:r>
+            <a:r>
+              <a:rPr lang="fi-FI" dirty="0" err="1"/>
+              <a:t>the</a:t>
+            </a:r>
+            <a:r>
+              <a:rPr lang="fi-FI" dirty="0"/>
+              <a:t> </a:t>
+            </a:r>
+            <a:r>
+              <a:rPr lang="fi-FI" dirty="0" err="1"/>
+              <a:t>architecture</a:t>
+            </a:r>
+            <a:r>
+              <a:rPr lang="fi-FI" dirty="0"/>
+              <a:t> and </a:t>
+            </a:r>
+            <a:r>
+              <a:rPr lang="fi-FI" dirty="0" err="1"/>
+              <a:t>very</a:t>
+            </a:r>
+            <a:r>
+              <a:rPr lang="fi-FI" dirty="0"/>
+              <a:t> </a:t>
+            </a:r>
+            <a:r>
+              <a:rPr lang="fi-FI" dirty="0" err="1"/>
+              <a:t>brief</a:t>
+            </a:r>
+            <a:r>
+              <a:rPr lang="fi-FI" dirty="0"/>
+              <a:t> </a:t>
+            </a:r>
+            <a:r>
+              <a:rPr lang="fi-FI" dirty="0" err="1"/>
+              <a:t>explanations</a:t>
+            </a:r>
+            <a:r>
+              <a:rPr lang="fi-FI" dirty="0"/>
+              <a:t> of </a:t>
+            </a:r>
+            <a:r>
+              <a:rPr lang="fi-FI" dirty="0" err="1"/>
+              <a:t>each</a:t>
+            </a:r>
+            <a:r>
+              <a:rPr lang="fi-FI" dirty="0"/>
+              <a:t> </a:t>
+            </a:r>
+            <a:r>
+              <a:rPr lang="fi-FI" dirty="0" err="1"/>
+              <a:t>part</a:t>
+            </a:r>
+            <a:r>
+              <a:rPr lang="fi-FI" dirty="0"/>
+              <a:t>?</a:t>
+            </a:r>
+          </a:p>
+          <a:p>
+            <a:r>
+              <a:rPr lang="fi-FI" dirty="0" err="1"/>
+              <a:t>Possible</a:t>
+            </a:r>
+            <a:r>
+              <a:rPr lang="fi-FI" dirty="0"/>
+              <a:t> just in </a:t>
+            </a:r>
+            <a:r>
+              <a:rPr lang="fi-FI" dirty="0" err="1"/>
+              <a:t>this</a:t>
+            </a:r>
+            <a:r>
+              <a:rPr lang="fi-FI" dirty="0"/>
+              <a:t> </a:t>
+            </a:r>
+            <a:r>
+              <a:rPr lang="fi-FI" dirty="0" err="1"/>
+              <a:t>level</a:t>
+            </a:r>
+            <a:r>
+              <a:rPr lang="fi-FI" dirty="0"/>
+              <a:t>: </a:t>
+            </a:r>
+            <a:r>
+              <a:rPr lang="fi-FI" dirty="0" err="1"/>
+              <a:t>Frontend</a:t>
+            </a:r>
+            <a:r>
+              <a:rPr lang="fi-FI" dirty="0"/>
+              <a:t>: </a:t>
+            </a:r>
+            <a:r>
+              <a:rPr lang="fi-FI" dirty="0" err="1"/>
+              <a:t>React</a:t>
+            </a:r>
+            <a:r>
+              <a:rPr lang="fi-FI" dirty="0"/>
+              <a:t>, </a:t>
+            </a:r>
+            <a:r>
+              <a:rPr lang="fi-FI" dirty="0" err="1"/>
+              <a:t>MaterialUI</a:t>
+            </a:r>
+            <a:r>
+              <a:rPr lang="fi-FI" dirty="0"/>
+              <a:t>, AJAX </a:t>
+            </a:r>
+            <a:r>
+              <a:rPr lang="fi-FI" dirty="0" err="1"/>
+              <a:t>with</a:t>
+            </a:r>
+            <a:r>
+              <a:rPr lang="fi-FI" dirty="0"/>
+              <a:t> </a:t>
+            </a:r>
+            <a:r>
+              <a:rPr lang="fi-FI" dirty="0" err="1"/>
+              <a:t>Axios</a:t>
+            </a:r>
+            <a:r>
+              <a:rPr lang="fi-FI" dirty="0"/>
+              <a:t>, </a:t>
+            </a:r>
+            <a:r>
+              <a:rPr lang="fi-FI" dirty="0" err="1"/>
+              <a:t>react-router-dom</a:t>
+            </a:r>
+            <a:r>
+              <a:rPr lang="fi-FI" dirty="0"/>
+              <a:t> (v6 </a:t>
+            </a:r>
+            <a:r>
+              <a:rPr lang="fi-FI" dirty="0" err="1"/>
+              <a:t>routig</a:t>
+            </a:r>
+            <a:r>
+              <a:rPr lang="fi-FI" dirty="0"/>
+              <a:t> </a:t>
+            </a:r>
+            <a:r>
+              <a:rPr lang="fi-FI" dirty="0" err="1"/>
+              <a:t>contexts</a:t>
+            </a:r>
+            <a:r>
+              <a:rPr lang="fi-FI" dirty="0"/>
+              <a:t> </a:t>
+            </a:r>
+            <a:r>
+              <a:rPr lang="fi-FI" dirty="0" err="1"/>
+              <a:t>used</a:t>
+            </a:r>
+            <a:r>
+              <a:rPr lang="fi-FI" dirty="0"/>
+              <a:t>). </a:t>
+            </a:r>
+          </a:p>
+          <a:p>
+            <a:pPr lvl="1"/>
+            <a:r>
+              <a:rPr lang="fi-FI" dirty="0" err="1"/>
+              <a:t>Would</a:t>
+            </a:r>
+            <a:r>
+              <a:rPr lang="fi-FI" dirty="0"/>
+              <a:t> it </a:t>
+            </a:r>
+            <a:r>
+              <a:rPr lang="fi-FI" dirty="0" err="1"/>
+              <a:t>be</a:t>
+            </a:r>
+            <a:r>
+              <a:rPr lang="fi-FI" dirty="0"/>
+              <a:t> </a:t>
+            </a:r>
+            <a:r>
+              <a:rPr lang="fi-FI" dirty="0" err="1"/>
+              <a:t>possible</a:t>
+            </a:r>
+            <a:r>
+              <a:rPr lang="fi-FI" dirty="0"/>
+              <a:t> to </a:t>
+            </a:r>
+            <a:r>
+              <a:rPr lang="fi-FI" dirty="0" err="1"/>
+              <a:t>link</a:t>
+            </a:r>
+            <a:r>
+              <a:rPr lang="fi-FI" dirty="0"/>
+              <a:t> to </a:t>
+            </a:r>
+            <a:r>
+              <a:rPr lang="fi-FI" dirty="0" err="1"/>
+              <a:t>e.g</a:t>
+            </a:r>
+            <a:r>
+              <a:rPr lang="fi-FI" dirty="0"/>
+              <a:t>. </a:t>
+            </a:r>
+            <a:r>
+              <a:rPr lang="fi-FI" dirty="0" err="1"/>
+              <a:t>the</a:t>
+            </a:r>
+            <a:r>
+              <a:rPr lang="fi-FI" dirty="0"/>
+              <a:t> </a:t>
+            </a:r>
+            <a:r>
+              <a:rPr lang="fi-FI" dirty="0" err="1"/>
+              <a:t>library</a:t>
+            </a:r>
+            <a:r>
+              <a:rPr lang="fi-FI" dirty="0"/>
+              <a:t> </a:t>
+            </a:r>
+            <a:r>
+              <a:rPr lang="fi-FI" dirty="0" err="1"/>
+              <a:t>list</a:t>
+            </a:r>
+            <a:r>
+              <a:rPr lang="fi-FI" dirty="0"/>
+              <a:t> in </a:t>
+            </a:r>
+            <a:r>
+              <a:rPr lang="fi-FI" dirty="0" err="1"/>
+              <a:t>package.json</a:t>
+            </a:r>
+            <a:r>
+              <a:rPr lang="fi-FI" dirty="0"/>
+              <a:t> of a </a:t>
+            </a:r>
+            <a:r>
+              <a:rPr lang="fi-FI" dirty="0" err="1"/>
+              <a:t>Node</a:t>
+            </a:r>
+            <a:r>
+              <a:rPr lang="fi-FI" dirty="0"/>
+              <a:t> </a:t>
+            </a:r>
+            <a:r>
+              <a:rPr lang="fi-FI" dirty="0" err="1"/>
+              <a:t>project</a:t>
+            </a:r>
+            <a:r>
+              <a:rPr lang="fi-FI" dirty="0"/>
+              <a:t>?</a:t>
+            </a:r>
+          </a:p>
+          <a:p>
+            <a:r>
+              <a:rPr lang="fi-FI" dirty="0" err="1"/>
+              <a:t>Keep</a:t>
+            </a:r>
+            <a:r>
+              <a:rPr lang="fi-FI" dirty="0"/>
+              <a:t> </a:t>
+            </a:r>
+            <a:r>
+              <a:rPr lang="fi-FI" dirty="0" err="1"/>
+              <a:t>this</a:t>
+            </a:r>
+            <a:r>
+              <a:rPr lang="fi-FI" dirty="0"/>
+              <a:t> </a:t>
+            </a:r>
+            <a:r>
+              <a:rPr lang="fi-FI" dirty="0" err="1"/>
+              <a:t>simple</a:t>
+            </a:r>
+            <a:r>
+              <a:rPr lang="fi-FI" dirty="0"/>
+              <a:t> and as </a:t>
+            </a:r>
+            <a:r>
+              <a:rPr lang="fi-FI" dirty="0" err="1"/>
+              <a:t>short</a:t>
+            </a:r>
+            <a:r>
+              <a:rPr lang="fi-FI" dirty="0"/>
+              <a:t> as </a:t>
+            </a:r>
+            <a:r>
+              <a:rPr lang="fi-FI" dirty="0" err="1"/>
+              <a:t>possible</a:t>
+            </a:r>
+            <a:r>
+              <a:rPr lang="fi-FI" dirty="0"/>
+              <a:t>. And </a:t>
+            </a:r>
+            <a:r>
+              <a:rPr lang="fi-FI" dirty="0" err="1"/>
+              <a:t>so</a:t>
+            </a:r>
+            <a:r>
+              <a:rPr lang="fi-FI" dirty="0"/>
+              <a:t> </a:t>
+            </a:r>
+            <a:r>
+              <a:rPr lang="fi-FI" dirty="0" err="1"/>
+              <a:t>generic</a:t>
+            </a:r>
+            <a:r>
+              <a:rPr lang="fi-FI" dirty="0"/>
+              <a:t> </a:t>
+            </a:r>
+            <a:r>
+              <a:rPr lang="fi-FI" dirty="0" err="1"/>
+              <a:t>that</a:t>
+            </a:r>
+            <a:r>
+              <a:rPr lang="fi-FI" dirty="0"/>
+              <a:t> </a:t>
+            </a:r>
+            <a:r>
+              <a:rPr lang="fi-FI" dirty="0" err="1"/>
+              <a:t>there</a:t>
+            </a:r>
+            <a:r>
+              <a:rPr lang="fi-FI" dirty="0"/>
+              <a:t> </a:t>
+            </a:r>
+            <a:r>
+              <a:rPr lang="fi-FI" dirty="0" err="1"/>
+              <a:t>should</a:t>
+            </a:r>
+            <a:r>
+              <a:rPr lang="fi-FI" dirty="0"/>
+              <a:t> </a:t>
+            </a:r>
+            <a:r>
+              <a:rPr lang="fi-FI" dirty="0" err="1"/>
+              <a:t>not</a:t>
+            </a:r>
+            <a:r>
+              <a:rPr lang="fi-FI" dirty="0"/>
+              <a:t> </a:t>
+            </a:r>
+            <a:r>
+              <a:rPr lang="fi-FI" dirty="0" err="1"/>
+              <a:t>be</a:t>
+            </a:r>
+            <a:r>
+              <a:rPr lang="fi-FI" dirty="0"/>
+              <a:t> </a:t>
+            </a:r>
+            <a:r>
+              <a:rPr lang="fi-FI" dirty="0" err="1"/>
+              <a:t>much</a:t>
+            </a:r>
+            <a:r>
+              <a:rPr lang="fi-FI" dirty="0"/>
+              <a:t> </a:t>
+            </a:r>
+            <a:r>
+              <a:rPr lang="fi-FI" dirty="0" err="1"/>
+              <a:t>need</a:t>
+            </a:r>
+            <a:r>
+              <a:rPr lang="fi-FI" dirty="0"/>
+              <a:t> for </a:t>
+            </a:r>
+            <a:r>
+              <a:rPr lang="fi-FI" dirty="0" err="1"/>
+              <a:t>changes</a:t>
+            </a:r>
+            <a:r>
+              <a:rPr lang="fi-FI" dirty="0"/>
+              <a:t> </a:t>
+            </a:r>
+            <a:r>
+              <a:rPr lang="fi-FI" dirty="0" err="1"/>
+              <a:t>later</a:t>
+            </a:r>
+            <a:r>
+              <a:rPr lang="fi-FI" dirty="0"/>
+              <a:t>.</a:t>
+            </a:r>
+          </a:p>
+        </p:txBody>
+      </p:sp>
+      <p:sp>
+        <p:nvSpPr>
+          <p:cNvPr id="5" name="Date Placeholder 4">
+            <a:extLst>
+              <a:ext uri="{FF2B5EF4-FFF2-40B4-BE49-F238E27FC236}">
+                <a16:creationId xmlns:a16="http://schemas.microsoft.com/office/drawing/2014/main" id="{976244E2-AA76-2742-B2EC-FEC79276155C}"/>
+              </a:ext>
+            </a:extLst>
+          </p:cNvPr>
+          <p:cNvSpPr>
+            <a:spLocks noGrp="1"/>
+          </p:cNvSpPr>
+          <p:nvPr>
+            <p:ph type="dt" sz="half" idx="10"/>
+          </p:nvPr>
+        </p:nvSpPr>
+        <p:spPr/>
+        <p:txBody>
+          <a:bodyPr/>
+          <a:lstStyle/>
+          <a:p>
+            <a:fld id="{202E1EC2-47B8-044B-A09E-6A63B4D80C87}" type="datetime1">
+              <a:rPr lang="fi-FI" smtClean="0"/>
+              <a:t>31.10.2022</a:t>
+            </a:fld>
+            <a:endParaRPr lang="en-GB"/>
+          </a:p>
+        </p:txBody>
+      </p:sp>
+      <p:sp>
+        <p:nvSpPr>
+          <p:cNvPr id="6" name="Footer Placeholder 5">
+            <a:extLst>
+              <a:ext uri="{FF2B5EF4-FFF2-40B4-BE49-F238E27FC236}">
+                <a16:creationId xmlns:a16="http://schemas.microsoft.com/office/drawing/2014/main" id="{588CE607-4137-8840-8FEA-42EAC857E3A3}"/>
+              </a:ext>
+            </a:extLst>
+          </p:cNvPr>
+          <p:cNvSpPr>
+            <a:spLocks noGrp="1"/>
+          </p:cNvSpPr>
+          <p:nvPr>
+            <p:ph type="ftr" sz="quarter" idx="11"/>
+          </p:nvPr>
+        </p:nvSpPr>
+        <p:spPr/>
+        <p:txBody>
+          <a:bodyPr/>
+          <a:lstStyle/>
+          <a:p>
+            <a:endParaRPr lang="en-GB"/>
+          </a:p>
+        </p:txBody>
+      </p:sp>
+      <p:sp>
+        <p:nvSpPr>
+          <p:cNvPr id="7" name="Slide Number Placeholder 6">
+            <a:extLst>
+              <a:ext uri="{FF2B5EF4-FFF2-40B4-BE49-F238E27FC236}">
+                <a16:creationId xmlns:a16="http://schemas.microsoft.com/office/drawing/2014/main" id="{2E133A96-6C73-0844-B8CB-27C2B5F4CFB1}"/>
+              </a:ext>
+            </a:extLst>
+          </p:cNvPr>
+          <p:cNvSpPr>
+            <a:spLocks noGrp="1"/>
+          </p:cNvSpPr>
+          <p:nvPr>
+            <p:ph type="sldNum" sz="quarter" idx="12"/>
+          </p:nvPr>
+        </p:nvSpPr>
+        <p:spPr/>
+        <p:txBody>
+          <a:bodyPr/>
+          <a:lstStyle/>
+          <a:p>
+            <a:fld id="{76BAB7ED-EDE9-4D4B-9A2D-30E18C47C16E}" type="slidenum">
+              <a:rPr lang="en-GB" smtClean="0"/>
+              <a:t>5</a:t>
+            </a:fld>
+            <a:endParaRPr lang="en-GB"/>
+          </a:p>
+        </p:txBody>
+      </p:sp>
+    </p:spTree>
+    <p:extLst>
+      <p:ext uri="{BB962C8B-B14F-4D97-AF65-F5344CB8AC3E}">
+        <p14:creationId xmlns:p14="http://schemas.microsoft.com/office/powerpoint/2010/main" val="1854965976"/>
+      </p:ext>
+    </p:extLst>
+  </p:cSld>
+  <p:clrMapOvr>
+    <a:masterClrMapping/>
+  </p:clrMapOvr>
+</p:sld>
+</file>
+
+<file path=ppt/slides/slide6.xml><?xml version="1.0" encoding="utf-8"?>
+<p:sld xmlns:a="http://schemas.openxmlformats.org/drawingml/2006/main" xmlns:r="http://schemas.openxmlformats.org/officeDocument/2006/relationships" xmlns:p="http://schemas.openxmlformats.org/presentationml/2006/main">
+  <p:cSld>
+    <p:spTree>
+      <p:nvGrpSpPr>
+        <p:cNvPr id="1" name=""/>
+        <p:cNvGrpSpPr/>
+        <p:nvPr/>
+      </p:nvGrpSpPr>
+      <p:grpSpPr>
+        <a:xfrm>
+          <a:off x="0" y="0"/>
+          <a:ext cx="0" cy="0"/>
+          <a:chOff x="0" y="0"/>
+          <a:chExt cx="0" cy="0"/>
+        </a:xfrm>
+      </p:grpSpPr>
+      <p:sp>
+        <p:nvSpPr>
+          <p:cNvPr id="8" name="Title 7">
+            <a:extLst>
+              <a:ext uri="{FF2B5EF4-FFF2-40B4-BE49-F238E27FC236}">
+                <a16:creationId xmlns:a16="http://schemas.microsoft.com/office/drawing/2014/main" id="{197044C3-CD23-D844-B780-26FABA91AD0F}"/>
+              </a:ext>
+            </a:extLst>
+          </p:cNvPr>
+          <p:cNvSpPr>
+            <a:spLocks noGrp="1"/>
+          </p:cNvSpPr>
+          <p:nvPr>
+            <p:ph type="title"/>
+          </p:nvPr>
+        </p:nvSpPr>
+        <p:spPr>
+          <a:xfrm>
+            <a:off x="550863" y="549276"/>
+            <a:ext cx="11125200" cy="745798"/>
+          </a:xfrm>
+        </p:spPr>
+        <p:txBody>
+          <a:bodyPr/>
+          <a:lstStyle/>
+          <a:p>
+            <a:r>
+              <a:rPr lang="fi-FI" dirty="0" err="1"/>
+              <a:t>Database</a:t>
+            </a:r>
+            <a:r>
+              <a:rPr lang="fi-FI" dirty="0"/>
+              <a:t> design and </a:t>
+            </a:r>
+            <a:r>
+              <a:rPr lang="fi-FI" dirty="0" err="1"/>
+              <a:t>visualization</a:t>
+            </a:r>
+            <a:endParaRPr lang="fi-FI" dirty="0"/>
+          </a:p>
+        </p:txBody>
+      </p:sp>
+      <p:sp>
+        <p:nvSpPr>
+          <p:cNvPr id="9" name="Content Placeholder 8">
+            <a:extLst>
+              <a:ext uri="{FF2B5EF4-FFF2-40B4-BE49-F238E27FC236}">
+                <a16:creationId xmlns:a16="http://schemas.microsoft.com/office/drawing/2014/main" id="{ACDE61D8-A75A-F94B-B57A-46F276C03311}"/>
+              </a:ext>
+            </a:extLst>
+          </p:cNvPr>
+          <p:cNvSpPr>
+            <a:spLocks noGrp="1"/>
+          </p:cNvSpPr>
+          <p:nvPr>
+            <p:ph sz="half" idx="2"/>
+          </p:nvPr>
+        </p:nvSpPr>
+        <p:spPr>
+          <a:xfrm>
+            <a:off x="515937" y="1165566"/>
+            <a:ext cx="11125198" cy="4857757"/>
+          </a:xfrm>
+        </p:spPr>
+        <p:txBody>
+          <a:bodyPr>
+            <a:normAutofit/>
+          </a:bodyPr>
+          <a:lstStyle/>
+          <a:p>
+            <a:r>
+              <a:rPr lang="en-US" dirty="0"/>
+              <a:t>In school you have learned good long processes for database design. From conceptual level ER diagrams, to logical level design, normalization, database diagrams, etc.</a:t>
+            </a:r>
+          </a:p>
+          <a:p>
+            <a:r>
+              <a:rPr lang="en-US" dirty="0"/>
+              <a:t>Those are to some extent for learning the database design</a:t>
+            </a:r>
+          </a:p>
+          <a:p>
+            <a:r>
+              <a:rPr lang="en-US" dirty="0"/>
+              <a:t>Some developers just do the database design and implementation at once (database diagram or just SQL DDL scripts). This of course requires some expertise and experience.</a:t>
+            </a:r>
+          </a:p>
+          <a:p>
+            <a:r>
+              <a:rPr lang="en-US" dirty="0"/>
+              <a:t>Many tools offer generation of diagrams based on SQL DML Create table statements. </a:t>
+            </a:r>
+          </a:p>
+          <a:p>
+            <a:pPr lvl="1"/>
+            <a:r>
+              <a:rPr lang="en-US" dirty="0"/>
+              <a:t>E.g. </a:t>
+            </a:r>
+            <a:r>
+              <a:rPr lang="en-US" dirty="0" err="1"/>
+              <a:t>DBeaver</a:t>
+            </a:r>
+            <a:r>
+              <a:rPr lang="en-US" dirty="0"/>
+              <a:t> offers adding more diagrams to the project and selecting which tables you want to include in there. </a:t>
+            </a:r>
+            <a:r>
+              <a:rPr lang="en-US" dirty="0" err="1"/>
+              <a:t>DBeaver</a:t>
+            </a:r>
+            <a:r>
+              <a:rPr lang="en-US" dirty="0"/>
+              <a:t> calls them ER diagrams, but they are actually </a:t>
+            </a:r>
+            <a:r>
+              <a:rPr lang="en-US" b="1" dirty="0"/>
+              <a:t>logical level </a:t>
+            </a:r>
+            <a:r>
+              <a:rPr lang="en-US" b="1" i="1" dirty="0"/>
+              <a:t>database diagrams</a:t>
+            </a:r>
+            <a:r>
+              <a:rPr lang="en-US" dirty="0"/>
+              <a:t>, table diagrams.</a:t>
+            </a:r>
+          </a:p>
+          <a:p>
+            <a:r>
+              <a:rPr lang="en-US" dirty="0"/>
+              <a:t>In addition to generated database diagrams we need some data dictionary for: </a:t>
+            </a:r>
+          </a:p>
+          <a:p>
+            <a:pPr lvl="1"/>
+            <a:r>
+              <a:rPr lang="en-US" dirty="0"/>
+              <a:t>a) avoiding using lot of aliases in project documentation, code and UI </a:t>
+            </a:r>
+          </a:p>
+          <a:p>
+            <a:pPr lvl="1"/>
+            <a:r>
+              <a:rPr lang="en-US" dirty="0"/>
+              <a:t>b) agreeing on the units/limits etc. </a:t>
+            </a:r>
+          </a:p>
+          <a:p>
+            <a:pPr lvl="1"/>
+            <a:r>
+              <a:rPr lang="en-US" dirty="0"/>
+              <a:t>c) general understanding of some complicated business case concept.</a:t>
+            </a:r>
+          </a:p>
+          <a:p>
+            <a:r>
+              <a:rPr lang="en-US" dirty="0"/>
+              <a:t>Many databases offer the COMMENT ON feature of the SQL standard. Comments on tables and columns. </a:t>
+            </a:r>
+          </a:p>
+          <a:p>
+            <a:r>
+              <a:rPr lang="en-US" dirty="0"/>
+              <a:t>Then we could avoid having separate database documents? All generated </a:t>
+            </a:r>
+            <a:r>
+              <a:rPr lang="en-US"/>
+              <a:t>from scripts?</a:t>
+            </a:r>
+            <a:endParaRPr lang="en-US" dirty="0"/>
+          </a:p>
+        </p:txBody>
+      </p:sp>
+      <p:sp>
+        <p:nvSpPr>
+          <p:cNvPr id="5" name="Date Placeholder 4">
+            <a:extLst>
+              <a:ext uri="{FF2B5EF4-FFF2-40B4-BE49-F238E27FC236}">
+                <a16:creationId xmlns:a16="http://schemas.microsoft.com/office/drawing/2014/main" id="{976244E2-AA76-2742-B2EC-FEC79276155C}"/>
+              </a:ext>
+            </a:extLst>
+          </p:cNvPr>
+          <p:cNvSpPr>
+            <a:spLocks noGrp="1"/>
+          </p:cNvSpPr>
+          <p:nvPr>
+            <p:ph type="dt" sz="half" idx="10"/>
+          </p:nvPr>
+        </p:nvSpPr>
+        <p:spPr/>
+        <p:txBody>
+          <a:bodyPr/>
+          <a:lstStyle/>
+          <a:p>
+            <a:fld id="{202E1EC2-47B8-044B-A09E-6A63B4D80C87}" type="datetime1">
+              <a:rPr lang="fi-FI" smtClean="0"/>
+              <a:t>31.10.2022</a:t>
+            </a:fld>
+            <a:endParaRPr lang="en-GB"/>
+          </a:p>
+        </p:txBody>
+      </p:sp>
+      <p:sp>
+        <p:nvSpPr>
+          <p:cNvPr id="6" name="Footer Placeholder 5">
+            <a:extLst>
+              <a:ext uri="{FF2B5EF4-FFF2-40B4-BE49-F238E27FC236}">
+                <a16:creationId xmlns:a16="http://schemas.microsoft.com/office/drawing/2014/main" id="{588CE607-4137-8840-8FEA-42EAC857E3A3}"/>
+              </a:ext>
+            </a:extLst>
+          </p:cNvPr>
+          <p:cNvSpPr>
+            <a:spLocks noGrp="1"/>
+          </p:cNvSpPr>
+          <p:nvPr>
+            <p:ph type="ftr" sz="quarter" idx="11"/>
+          </p:nvPr>
+        </p:nvSpPr>
+        <p:spPr/>
+        <p:txBody>
+          <a:bodyPr/>
+          <a:lstStyle/>
+          <a:p>
+            <a:endParaRPr lang="en-GB"/>
+          </a:p>
+        </p:txBody>
+      </p:sp>
+      <p:sp>
+        <p:nvSpPr>
+          <p:cNvPr id="7" name="Slide Number Placeholder 6">
+            <a:extLst>
+              <a:ext uri="{FF2B5EF4-FFF2-40B4-BE49-F238E27FC236}">
+                <a16:creationId xmlns:a16="http://schemas.microsoft.com/office/drawing/2014/main" id="{2E133A96-6C73-0844-B8CB-27C2B5F4CFB1}"/>
+              </a:ext>
+            </a:extLst>
+          </p:cNvPr>
+          <p:cNvSpPr>
+            <a:spLocks noGrp="1"/>
+          </p:cNvSpPr>
+          <p:nvPr>
+            <p:ph type="sldNum" sz="quarter" idx="12"/>
+          </p:nvPr>
+        </p:nvSpPr>
+        <p:spPr/>
+        <p:txBody>
+          <a:bodyPr/>
+          <a:lstStyle/>
+          <a:p>
+            <a:fld id="{76BAB7ED-EDE9-4D4B-9A2D-30E18C47C16E}" type="slidenum">
+              <a:rPr lang="en-GB" smtClean="0"/>
+              <a:t>6</a:t>
+            </a:fld>
+            <a:endParaRPr lang="en-GB"/>
+          </a:p>
+        </p:txBody>
+      </p:sp>
+    </p:spTree>
+    <p:extLst>
+      <p:ext uri="{BB962C8B-B14F-4D97-AF65-F5344CB8AC3E}">
+        <p14:creationId xmlns:p14="http://schemas.microsoft.com/office/powerpoint/2010/main" val="846650119"/>
       </p:ext>
     </p:extLst>
   </p:cSld>
@@ -8493,21 +10505,21 @@
 </file>
 
 <file path=customXml/item2.xml><?xml version="1.0" encoding="utf-8"?>
+<p:properties xmlns:p="http://schemas.microsoft.com/office/2006/metadata/properties" xmlns:xsi="http://www.w3.org/2001/XMLSchema-instance" xmlns:pc="http://schemas.microsoft.com/office/infopath/2007/PartnerControls">
+  <documentManagement>
+    <PublishingExpirationDate xmlns="http://schemas.microsoft.com/sharepoint/v3" xsi:nil="true"/>
+    <PublishingStartDate xmlns="http://schemas.microsoft.com/sharepoint/v3" xsi:nil="true"/>
+  </documentManagement>
+</p:properties>
+</file>
+
+<file path=customXml/item3.xml><?xml version="1.0" encoding="utf-8"?>
 <?mso-contentType ?>
 <FormTemplates xmlns="http://schemas.microsoft.com/sharepoint/v3/contenttype/forms">
   <Display>DocumentLibraryForm</Display>
   <Edit>DocumentLibraryForm</Edit>
   <New>DocumentLibraryForm</New>
 </FormTemplates>
-</file>
-
-<file path=customXml/item3.xml><?xml version="1.0" encoding="utf-8"?>
-<p:properties xmlns:p="http://schemas.microsoft.com/office/2006/metadata/properties" xmlns:xsi="http://www.w3.org/2001/XMLSchema-instance" xmlns:pc="http://schemas.microsoft.com/office/infopath/2007/PartnerControls">
-  <documentManagement>
-    <PublishingExpirationDate xmlns="http://schemas.microsoft.com/sharepoint/v3" xsi:nil="true"/>
-    <PublishingStartDate xmlns="http://schemas.microsoft.com/sharepoint/v3" xsi:nil="true"/>
-  </documentManagement>
-</p:properties>
 </file>
 
 <file path=customXml/itemProps1.xml><?xml version="1.0" encoding="utf-8"?>
@@ -8529,25 +10541,25 @@
 </file>
 
 <file path=customXml/itemProps2.xml><?xml version="1.0" encoding="utf-8"?>
+<ds:datastoreItem xmlns:ds="http://schemas.openxmlformats.org/officeDocument/2006/customXml" ds:itemID="{DED4E12E-7268-4B03-A47B-0755D62B5E31}">
+  <ds:schemaRefs>
+    <ds:schemaRef ds:uri="http://purl.org/dc/dcmitype/"/>
+    <ds:schemaRef ds:uri="http://purl.org/dc/terms/"/>
+    <ds:schemaRef ds:uri="http://schemas.microsoft.com/office/2006/metadata/properties"/>
+    <ds:schemaRef ds:uri="http://schemas.microsoft.com/office/2006/documentManagement/types"/>
+    <ds:schemaRef ds:uri="http://schemas.microsoft.com/office/infopath/2007/PartnerControls"/>
+    <ds:schemaRef ds:uri="http://schemas.microsoft.com/sharepoint/v3"/>
+    <ds:schemaRef ds:uri="http://schemas.openxmlformats.org/package/2006/metadata/core-properties"/>
+    <ds:schemaRef ds:uri="http://www.w3.org/XML/1998/namespace"/>
+    <ds:schemaRef ds:uri="http://purl.org/dc/elements/1.1/"/>
+  </ds:schemaRefs>
+</ds:datastoreItem>
+</file>
+
+<file path=customXml/itemProps3.xml><?xml version="1.0" encoding="utf-8"?>
 <ds:datastoreItem xmlns:ds="http://schemas.openxmlformats.org/officeDocument/2006/customXml" ds:itemID="{D546C03B-CD3A-4EA0-AAA4-0E00E896454E}">
   <ds:schemaRefs>
     <ds:schemaRef ds:uri="http://schemas.microsoft.com/sharepoint/v3/contenttype/forms"/>
   </ds:schemaRefs>
 </ds:datastoreItem>
-</file>
-
-<file path=customXml/itemProps3.xml><?xml version="1.0" encoding="utf-8"?>
-<ds:datastoreItem xmlns:ds="http://schemas.openxmlformats.org/officeDocument/2006/customXml" ds:itemID="{DED4E12E-7268-4B03-A47B-0755D62B5E31}">
-  <ds:schemaRefs>
-    <ds:schemaRef ds:uri="http://schemas.microsoft.com/office/2006/documentManagement/types"/>
-    <ds:schemaRef ds:uri="http://schemas.microsoft.com/office/infopath/2007/PartnerControls"/>
-    <ds:schemaRef ds:uri="http://schemas.microsoft.com/sharepoint/v3"/>
-    <ds:schemaRef ds:uri="http://purl.org/dc/elements/1.1/"/>
-    <ds:schemaRef ds:uri="http://schemas.openxmlformats.org/package/2006/metadata/core-properties"/>
-    <ds:schemaRef ds:uri="http://purl.org/dc/terms/"/>
-    <ds:schemaRef ds:uri="http://schemas.microsoft.com/office/2006/metadata/properties"/>
-    <ds:schemaRef ds:uri="http://www.w3.org/XML/1998/namespace"/>
-    <ds:schemaRef ds:uri="http://purl.org/dc/dcmitype/"/>
-  </ds:schemaRefs>
-</ds:datastoreItem>
 </file>
</xml_diff>

<commit_message>
Project documentation philosophy first complete version ready
</commit_message>
<xml_diff>
--- a/06_ohjelmistoarkkitehtuurit_ja_patternit/documentation_principles_for_sw_projects.pptx
+++ b/06_ohjelmistoarkkitehtuurit_ja_patternit/documentation_principles_for_sw_projects.pptx
@@ -5,7 +5,7 @@
     <p:sldMasterId id="2147483648" r:id="rId4"/>
   </p:sldMasterIdLst>
   <p:notesMasterIdLst>
-    <p:notesMasterId r:id="rId11"/>
+    <p:notesMasterId r:id="rId13"/>
   </p:notesMasterIdLst>
   <p:sldIdLst>
     <p:sldId id="256" r:id="rId5"/>
@@ -14,6 +14,8 @@
     <p:sldId id="277" r:id="rId8"/>
     <p:sldId id="278" r:id="rId9"/>
     <p:sldId id="279" r:id="rId10"/>
+    <p:sldId id="280" r:id="rId11"/>
+    <p:sldId id="281" r:id="rId12"/>
   </p:sldIdLst>
   <p:sldSz cx="12192000" cy="6858000"/>
   <p:notesSz cx="6858000" cy="9144000"/>
@@ -9816,6 +9818,1493 @@
 </p:sld>
 </file>
 
+<file path=ppt/slides/slide7.xml><?xml version="1.0" encoding="utf-8"?>
+<p:sld xmlns:a="http://schemas.openxmlformats.org/drawingml/2006/main" xmlns:r="http://schemas.openxmlformats.org/officeDocument/2006/relationships" xmlns:p="http://schemas.openxmlformats.org/presentationml/2006/main">
+  <p:cSld>
+    <p:spTree>
+      <p:nvGrpSpPr>
+        <p:cNvPr id="1" name=""/>
+        <p:cNvGrpSpPr/>
+        <p:nvPr/>
+      </p:nvGrpSpPr>
+      <p:grpSpPr>
+        <a:xfrm>
+          <a:off x="0" y="0"/>
+          <a:ext cx="0" cy="0"/>
+          <a:chOff x="0" y="0"/>
+          <a:chExt cx="0" cy="0"/>
+        </a:xfrm>
+      </p:grpSpPr>
+      <p:sp>
+        <p:nvSpPr>
+          <p:cNvPr id="8" name="Title 7">
+            <a:extLst>
+              <a:ext uri="{FF2B5EF4-FFF2-40B4-BE49-F238E27FC236}">
+                <a16:creationId xmlns:a16="http://schemas.microsoft.com/office/drawing/2014/main" id="{197044C3-CD23-D844-B780-26FABA91AD0F}"/>
+              </a:ext>
+            </a:extLst>
+          </p:cNvPr>
+          <p:cNvSpPr>
+            <a:spLocks noGrp="1"/>
+          </p:cNvSpPr>
+          <p:nvPr>
+            <p:ph type="title"/>
+          </p:nvPr>
+        </p:nvSpPr>
+        <p:spPr>
+          <a:xfrm>
+            <a:off x="550863" y="549276"/>
+            <a:ext cx="11125200" cy="745798"/>
+          </a:xfrm>
+        </p:spPr>
+        <p:txBody>
+          <a:bodyPr/>
+          <a:lstStyle/>
+          <a:p>
+            <a:r>
+              <a:rPr lang="fi-FI" dirty="0"/>
+              <a:t>Program </a:t>
+            </a:r>
+            <a:r>
+              <a:rPr lang="fi-FI" dirty="0" err="1"/>
+              <a:t>code</a:t>
+            </a:r>
+            <a:r>
+              <a:rPr lang="fi-FI" dirty="0"/>
+              <a:t> </a:t>
+            </a:r>
+            <a:r>
+              <a:rPr lang="fi-FI" dirty="0" err="1"/>
+              <a:t>comments</a:t>
+            </a:r>
+            <a:endParaRPr lang="fi-FI" dirty="0"/>
+          </a:p>
+        </p:txBody>
+      </p:sp>
+      <p:sp>
+        <p:nvSpPr>
+          <p:cNvPr id="9" name="Content Placeholder 8">
+            <a:extLst>
+              <a:ext uri="{FF2B5EF4-FFF2-40B4-BE49-F238E27FC236}">
+                <a16:creationId xmlns:a16="http://schemas.microsoft.com/office/drawing/2014/main" id="{ACDE61D8-A75A-F94B-B57A-46F276C03311}"/>
+              </a:ext>
+            </a:extLst>
+          </p:cNvPr>
+          <p:cNvSpPr>
+            <a:spLocks noGrp="1"/>
+          </p:cNvSpPr>
+          <p:nvPr>
+            <p:ph sz="half" idx="2"/>
+          </p:nvPr>
+        </p:nvSpPr>
+        <p:spPr>
+          <a:xfrm>
+            <a:off x="550864" y="1295073"/>
+            <a:ext cx="11125198" cy="4618365"/>
+          </a:xfrm>
+        </p:spPr>
+        <p:txBody>
+          <a:bodyPr>
+            <a:normAutofit/>
+          </a:bodyPr>
+          <a:lstStyle/>
+          <a:p>
+            <a:r>
+              <a:rPr lang="fi-FI" dirty="0" err="1"/>
+              <a:t>First</a:t>
+            </a:r>
+            <a:r>
+              <a:rPr lang="fi-FI" dirty="0"/>
+              <a:t> </a:t>
+            </a:r>
+            <a:r>
+              <a:rPr lang="fi-FI" dirty="0" err="1"/>
+              <a:t>rule</a:t>
+            </a:r>
+            <a:r>
+              <a:rPr lang="fi-FI" dirty="0"/>
+              <a:t>: </a:t>
+            </a:r>
+            <a:r>
+              <a:rPr lang="fi-FI" dirty="0" err="1"/>
+              <a:t>Avoid</a:t>
+            </a:r>
+            <a:r>
+              <a:rPr lang="fi-FI" dirty="0"/>
+              <a:t> </a:t>
+            </a:r>
+            <a:r>
+              <a:rPr lang="fi-FI" dirty="0" err="1"/>
+              <a:t>need</a:t>
+            </a:r>
+            <a:r>
+              <a:rPr lang="fi-FI" dirty="0"/>
+              <a:t> for </a:t>
+            </a:r>
+            <a:r>
+              <a:rPr lang="fi-FI" dirty="0" err="1"/>
+              <a:t>code</a:t>
+            </a:r>
+            <a:r>
+              <a:rPr lang="fi-FI" dirty="0"/>
+              <a:t> </a:t>
+            </a:r>
+            <a:r>
+              <a:rPr lang="fi-FI" dirty="0" err="1"/>
+              <a:t>comments</a:t>
+            </a:r>
+            <a:r>
+              <a:rPr lang="fi-FI" dirty="0"/>
+              <a:t>. </a:t>
+            </a:r>
+            <a:r>
+              <a:rPr lang="fi-FI" dirty="0" err="1"/>
+              <a:t>Instead</a:t>
+            </a:r>
+            <a:r>
+              <a:rPr lang="fi-FI" dirty="0"/>
+              <a:t> </a:t>
+            </a:r>
+            <a:r>
+              <a:rPr lang="fi-FI" dirty="0" err="1"/>
+              <a:t>try</a:t>
+            </a:r>
+            <a:r>
+              <a:rPr lang="fi-FI" dirty="0"/>
+              <a:t> to </a:t>
+            </a:r>
+            <a:r>
+              <a:rPr lang="fi-FI" dirty="0" err="1"/>
+              <a:t>make</a:t>
+            </a:r>
+            <a:r>
+              <a:rPr lang="fi-FI" dirty="0"/>
+              <a:t> </a:t>
+            </a:r>
+            <a:r>
+              <a:rPr lang="fi-FI" dirty="0" err="1"/>
+              <a:t>your</a:t>
+            </a:r>
+            <a:r>
+              <a:rPr lang="fi-FI" dirty="0"/>
+              <a:t> </a:t>
+            </a:r>
+            <a:r>
+              <a:rPr lang="fi-FI" dirty="0" err="1"/>
+              <a:t>code</a:t>
+            </a:r>
+            <a:r>
+              <a:rPr lang="fi-FI" dirty="0"/>
+              <a:t> </a:t>
+            </a:r>
+            <a:r>
+              <a:rPr lang="fi-FI" dirty="0" err="1"/>
+              <a:t>clear</a:t>
+            </a:r>
+            <a:r>
+              <a:rPr lang="fi-FI" dirty="0"/>
+              <a:t> </a:t>
+            </a:r>
+            <a:r>
+              <a:rPr lang="fi-FI" dirty="0" err="1"/>
+              <a:t>with</a:t>
+            </a:r>
+            <a:r>
+              <a:rPr lang="fi-FI" dirty="0"/>
+              <a:t> </a:t>
+            </a:r>
+            <a:r>
+              <a:rPr lang="fi-FI" dirty="0" err="1"/>
+              <a:t>naming</a:t>
+            </a:r>
+            <a:r>
+              <a:rPr lang="fi-FI" dirty="0"/>
+              <a:t> </a:t>
+            </a:r>
+            <a:r>
+              <a:rPr lang="fi-FI" dirty="0" err="1"/>
+              <a:t>conventions</a:t>
+            </a:r>
+            <a:r>
+              <a:rPr lang="fi-FI" dirty="0"/>
+              <a:t> and </a:t>
+            </a:r>
+            <a:r>
+              <a:rPr lang="fi-FI" dirty="0" err="1"/>
+              <a:t>folder</a:t>
+            </a:r>
+            <a:r>
+              <a:rPr lang="fi-FI" dirty="0"/>
+              <a:t> </a:t>
+            </a:r>
+            <a:r>
+              <a:rPr lang="fi-FI" dirty="0" err="1"/>
+              <a:t>structure</a:t>
+            </a:r>
+            <a:endParaRPr lang="fi-FI" dirty="0"/>
+          </a:p>
+          <a:p>
+            <a:pPr lvl="1"/>
+            <a:r>
+              <a:rPr lang="fi-FI" dirty="0" err="1"/>
+              <a:t>Folder</a:t>
+            </a:r>
+            <a:r>
+              <a:rPr lang="fi-FI" dirty="0"/>
+              <a:t> </a:t>
+            </a:r>
+            <a:r>
+              <a:rPr lang="fi-FI" dirty="0" err="1"/>
+              <a:t>structure</a:t>
+            </a:r>
+            <a:endParaRPr lang="fi-FI" dirty="0"/>
+          </a:p>
+          <a:p>
+            <a:pPr lvl="1"/>
+            <a:r>
+              <a:rPr lang="fi-FI" dirty="0" err="1"/>
+              <a:t>Naming</a:t>
+            </a:r>
+            <a:r>
+              <a:rPr lang="fi-FI" dirty="0"/>
+              <a:t>: </a:t>
+            </a:r>
+            <a:r>
+              <a:rPr lang="fi-FI" dirty="0" err="1"/>
+              <a:t>Folders</a:t>
+            </a:r>
+            <a:r>
+              <a:rPr lang="fi-FI" dirty="0"/>
+              <a:t>, </a:t>
+            </a:r>
+            <a:r>
+              <a:rPr lang="fi-FI" dirty="0" err="1"/>
+              <a:t>files</a:t>
+            </a:r>
+            <a:r>
+              <a:rPr lang="fi-FI" dirty="0"/>
+              <a:t>, </a:t>
+            </a:r>
+            <a:r>
+              <a:rPr lang="fi-FI" dirty="0" err="1"/>
+              <a:t>classes</a:t>
+            </a:r>
+            <a:r>
+              <a:rPr lang="fi-FI" dirty="0"/>
+              <a:t>, </a:t>
+            </a:r>
+            <a:r>
+              <a:rPr lang="fi-FI" dirty="0" err="1"/>
+              <a:t>modules</a:t>
+            </a:r>
+            <a:r>
+              <a:rPr lang="fi-FI" dirty="0"/>
+              <a:t>, </a:t>
+            </a:r>
+            <a:r>
+              <a:rPr lang="fi-FI" dirty="0" err="1"/>
+              <a:t>functions</a:t>
+            </a:r>
+            <a:r>
+              <a:rPr lang="fi-FI" dirty="0"/>
+              <a:t>, </a:t>
+            </a:r>
+            <a:r>
+              <a:rPr lang="fi-FI" dirty="0" err="1"/>
+              <a:t>variables</a:t>
+            </a:r>
+            <a:r>
+              <a:rPr lang="fi-FI" dirty="0"/>
+              <a:t>, </a:t>
+            </a:r>
+            <a:r>
+              <a:rPr lang="fi-FI" dirty="0" err="1"/>
+              <a:t>attributes</a:t>
+            </a:r>
+            <a:r>
+              <a:rPr lang="fi-FI" dirty="0"/>
+              <a:t> of </a:t>
+            </a:r>
+            <a:r>
+              <a:rPr lang="fi-FI" dirty="0" err="1"/>
+              <a:t>objects</a:t>
+            </a:r>
+            <a:endParaRPr lang="fi-FI" dirty="0"/>
+          </a:p>
+          <a:p>
+            <a:r>
+              <a:rPr lang="fi-FI" dirty="0" err="1"/>
+              <a:t>Then</a:t>
+            </a:r>
+            <a:r>
+              <a:rPr lang="fi-FI" dirty="0"/>
+              <a:t>, </a:t>
+            </a:r>
+            <a:r>
+              <a:rPr lang="fi-FI" dirty="0" err="1"/>
+              <a:t>if</a:t>
+            </a:r>
+            <a:r>
+              <a:rPr lang="fi-FI" dirty="0"/>
+              <a:t> </a:t>
+            </a:r>
+            <a:r>
+              <a:rPr lang="fi-FI" dirty="0" err="1"/>
+              <a:t>still</a:t>
+            </a:r>
+            <a:r>
+              <a:rPr lang="fi-FI" dirty="0"/>
+              <a:t> </a:t>
+            </a:r>
+            <a:r>
+              <a:rPr lang="fi-FI" dirty="0" err="1"/>
+              <a:t>needed</a:t>
+            </a:r>
+            <a:r>
+              <a:rPr lang="fi-FI" dirty="0"/>
+              <a:t>, </a:t>
+            </a:r>
+            <a:r>
+              <a:rPr lang="fi-FI" dirty="0" err="1"/>
+              <a:t>only</a:t>
+            </a:r>
+            <a:r>
+              <a:rPr lang="fi-FI" dirty="0"/>
+              <a:t> </a:t>
+            </a:r>
+            <a:r>
+              <a:rPr lang="fi-FI" dirty="0" err="1"/>
+              <a:t>explain</a:t>
+            </a:r>
+            <a:r>
+              <a:rPr lang="fi-FI" dirty="0"/>
+              <a:t> </a:t>
+            </a:r>
+            <a:r>
+              <a:rPr lang="fi-FI" dirty="0" err="1"/>
+              <a:t>the</a:t>
+            </a:r>
+            <a:r>
+              <a:rPr lang="fi-FI" dirty="0"/>
+              <a:t> </a:t>
+            </a:r>
+            <a:r>
+              <a:rPr lang="fi-FI" dirty="0" err="1"/>
+              <a:t>confusing</a:t>
+            </a:r>
+            <a:r>
+              <a:rPr lang="fi-FI" dirty="0"/>
+              <a:t>, </a:t>
+            </a:r>
+            <a:r>
+              <a:rPr lang="fi-FI" dirty="0" err="1"/>
+              <a:t>irregular</a:t>
+            </a:r>
+            <a:r>
+              <a:rPr lang="fi-FI" dirty="0"/>
+              <a:t>/</a:t>
+            </a:r>
+            <a:r>
+              <a:rPr lang="fi-FI" dirty="0" err="1"/>
+              <a:t>unconventional</a:t>
+            </a:r>
+            <a:r>
+              <a:rPr lang="fi-FI" dirty="0"/>
+              <a:t>/ </a:t>
+            </a:r>
+            <a:r>
+              <a:rPr lang="fi-FI" dirty="0" err="1"/>
+              <a:t>or</a:t>
+            </a:r>
+            <a:r>
+              <a:rPr lang="fi-FI" dirty="0"/>
+              <a:t> </a:t>
+            </a:r>
+            <a:r>
+              <a:rPr lang="fi-FI" dirty="0" err="1"/>
+              <a:t>complicated</a:t>
+            </a:r>
+            <a:r>
+              <a:rPr lang="fi-FI" dirty="0"/>
+              <a:t> </a:t>
+            </a:r>
+            <a:r>
+              <a:rPr lang="fi-FI" dirty="0" err="1"/>
+              <a:t>parts</a:t>
+            </a:r>
+            <a:endParaRPr lang="fi-FI" dirty="0"/>
+          </a:p>
+          <a:p>
+            <a:r>
+              <a:rPr lang="fi-FI" dirty="0" err="1"/>
+              <a:t>Less</a:t>
+            </a:r>
+            <a:r>
+              <a:rPr lang="fi-FI" dirty="0"/>
+              <a:t> is </a:t>
+            </a:r>
+            <a:r>
+              <a:rPr lang="fi-FI" dirty="0" err="1"/>
+              <a:t>more</a:t>
+            </a:r>
+            <a:r>
+              <a:rPr lang="fi-FI" dirty="0"/>
+              <a:t>. </a:t>
+            </a:r>
+            <a:r>
+              <a:rPr lang="fi-FI" dirty="0" err="1"/>
+              <a:t>Quality</a:t>
+            </a:r>
+            <a:r>
+              <a:rPr lang="fi-FI" dirty="0"/>
+              <a:t> </a:t>
+            </a:r>
+            <a:r>
+              <a:rPr lang="fi-FI" dirty="0" err="1"/>
+              <a:t>over</a:t>
+            </a:r>
+            <a:r>
+              <a:rPr lang="fi-FI" dirty="0"/>
+              <a:t> </a:t>
+            </a:r>
+            <a:r>
+              <a:rPr lang="fi-FI" dirty="0" err="1"/>
+              <a:t>quantity</a:t>
+            </a:r>
+            <a:r>
+              <a:rPr lang="fi-FI" dirty="0"/>
+              <a:t>. </a:t>
+            </a:r>
+            <a:r>
+              <a:rPr lang="fi-FI" dirty="0" err="1"/>
+              <a:t>Think</a:t>
+            </a:r>
+            <a:r>
+              <a:rPr lang="fi-FI" dirty="0"/>
+              <a:t> </a:t>
+            </a:r>
+            <a:r>
+              <a:rPr lang="fi-FI" dirty="0" err="1"/>
+              <a:t>from</a:t>
+            </a:r>
+            <a:r>
+              <a:rPr lang="fi-FI" dirty="0"/>
+              <a:t> </a:t>
+            </a:r>
+            <a:r>
+              <a:rPr lang="fi-FI" dirty="0" err="1"/>
+              <a:t>reader’s</a:t>
+            </a:r>
+            <a:r>
+              <a:rPr lang="fi-FI" dirty="0"/>
+              <a:t> </a:t>
+            </a:r>
+            <a:r>
+              <a:rPr lang="fi-FI" dirty="0" err="1"/>
+              <a:t>point</a:t>
+            </a:r>
+            <a:r>
+              <a:rPr lang="fi-FI" dirty="0"/>
+              <a:t> of </a:t>
+            </a:r>
+            <a:r>
+              <a:rPr lang="fi-FI" dirty="0" err="1"/>
+              <a:t>view</a:t>
+            </a:r>
+            <a:r>
+              <a:rPr lang="fi-FI" dirty="0"/>
+              <a:t> and </a:t>
+            </a:r>
+            <a:r>
+              <a:rPr lang="fi-FI" dirty="0" err="1"/>
+              <a:t>starting</a:t>
+            </a:r>
+            <a:r>
+              <a:rPr lang="fi-FI" dirty="0"/>
+              <a:t> </a:t>
+            </a:r>
+            <a:r>
+              <a:rPr lang="fi-FI" dirty="0" err="1"/>
+              <a:t>point</a:t>
+            </a:r>
+            <a:r>
+              <a:rPr lang="fi-FI" dirty="0"/>
+              <a:t>, </a:t>
+            </a:r>
+            <a:r>
+              <a:rPr lang="fi-FI" dirty="0" err="1"/>
+              <a:t>not</a:t>
+            </a:r>
+            <a:r>
+              <a:rPr lang="fi-FI" dirty="0"/>
+              <a:t> </a:t>
+            </a:r>
+            <a:r>
+              <a:rPr lang="fi-FI" dirty="0" err="1"/>
+              <a:t>yours</a:t>
+            </a:r>
+            <a:r>
+              <a:rPr lang="fi-FI" dirty="0"/>
+              <a:t>.</a:t>
+            </a:r>
+          </a:p>
+          <a:p>
+            <a:r>
+              <a:rPr lang="fi-FI" dirty="0" err="1"/>
+              <a:t>Sometimes</a:t>
+            </a:r>
+            <a:r>
+              <a:rPr lang="fi-FI" dirty="0"/>
+              <a:t> </a:t>
+            </a:r>
+            <a:r>
+              <a:rPr lang="fi-FI" dirty="0" err="1"/>
+              <a:t>writing</a:t>
+            </a:r>
+            <a:r>
+              <a:rPr lang="fi-FI" dirty="0"/>
+              <a:t> </a:t>
+            </a:r>
+            <a:r>
+              <a:rPr lang="fi-FI" dirty="0" err="1"/>
+              <a:t>longer</a:t>
+            </a:r>
+            <a:r>
+              <a:rPr lang="fi-FI" dirty="0"/>
+              <a:t> </a:t>
+            </a:r>
+            <a:r>
+              <a:rPr lang="fi-FI" dirty="0" err="1"/>
+              <a:t>code</a:t>
+            </a:r>
+            <a:r>
+              <a:rPr lang="fi-FI" dirty="0"/>
+              <a:t> </a:t>
+            </a:r>
+            <a:r>
+              <a:rPr lang="fi-FI" dirty="0" err="1"/>
+              <a:t>helps</a:t>
+            </a:r>
+            <a:r>
+              <a:rPr lang="fi-FI" dirty="0"/>
+              <a:t>, </a:t>
+            </a:r>
+            <a:r>
+              <a:rPr lang="fi-FI" dirty="0" err="1"/>
+              <a:t>optimize</a:t>
+            </a:r>
+            <a:r>
+              <a:rPr lang="fi-FI" dirty="0"/>
+              <a:t> </a:t>
+            </a:r>
+            <a:r>
+              <a:rPr lang="fi-FI" dirty="0" err="1"/>
+              <a:t>reading</a:t>
+            </a:r>
+            <a:r>
+              <a:rPr lang="fi-FI" dirty="0"/>
+              <a:t> </a:t>
+            </a:r>
+            <a:r>
+              <a:rPr lang="fi-FI" dirty="0" err="1"/>
+              <a:t>speed</a:t>
+            </a:r>
+            <a:r>
+              <a:rPr lang="fi-FI" dirty="0"/>
+              <a:t>, </a:t>
+            </a:r>
+            <a:r>
+              <a:rPr lang="fi-FI" dirty="0" err="1"/>
+              <a:t>never</a:t>
+            </a:r>
+            <a:r>
+              <a:rPr lang="fi-FI" dirty="0"/>
+              <a:t> </a:t>
+            </a:r>
+            <a:r>
+              <a:rPr lang="fi-FI" dirty="0" err="1"/>
+              <a:t>writing</a:t>
+            </a:r>
+            <a:r>
+              <a:rPr lang="fi-FI" dirty="0"/>
+              <a:t> </a:t>
+            </a:r>
+            <a:r>
+              <a:rPr lang="fi-FI" dirty="0" err="1"/>
+              <a:t>speed</a:t>
+            </a:r>
+            <a:r>
+              <a:rPr lang="fi-FI" dirty="0"/>
+              <a:t>.</a:t>
+            </a:r>
+          </a:p>
+          <a:p>
+            <a:r>
+              <a:rPr lang="fi-FI" dirty="0" err="1"/>
+              <a:t>E.g</a:t>
+            </a:r>
+            <a:r>
+              <a:rPr lang="fi-FI" dirty="0"/>
+              <a:t>. </a:t>
+            </a:r>
+            <a:r>
+              <a:rPr lang="fi-FI" dirty="0" err="1"/>
+              <a:t>changing</a:t>
+            </a:r>
+            <a:r>
+              <a:rPr lang="fi-FI" dirty="0"/>
+              <a:t> </a:t>
+            </a:r>
+            <a:r>
+              <a:rPr lang="fi-FI" dirty="0" err="1"/>
+              <a:t>from</a:t>
+            </a:r>
+            <a:r>
+              <a:rPr lang="fi-FI" dirty="0"/>
+              <a:t> </a:t>
+            </a:r>
+            <a:r>
+              <a:rPr lang="fi-FI" dirty="0" err="1"/>
+              <a:t>the</a:t>
+            </a:r>
+            <a:r>
+              <a:rPr lang="fi-FI" dirty="0"/>
+              <a:t> a ? b : c </a:t>
+            </a:r>
+            <a:r>
+              <a:rPr lang="fi-FI" dirty="0" err="1"/>
+              <a:t>ternary</a:t>
+            </a:r>
+            <a:r>
+              <a:rPr lang="fi-FI" dirty="0"/>
+              <a:t> </a:t>
+            </a:r>
+            <a:r>
+              <a:rPr lang="fi-FI" dirty="0" err="1"/>
+              <a:t>operator</a:t>
+            </a:r>
+            <a:r>
+              <a:rPr lang="fi-FI" dirty="0"/>
+              <a:t> to </a:t>
+            </a:r>
+            <a:r>
+              <a:rPr lang="fi-FI" dirty="0" err="1"/>
+              <a:t>if-else</a:t>
+            </a:r>
+            <a:r>
+              <a:rPr lang="fi-FI" dirty="0"/>
+              <a:t> </a:t>
+            </a:r>
+            <a:r>
+              <a:rPr lang="fi-FI" dirty="0" err="1"/>
+              <a:t>might</a:t>
+            </a:r>
+            <a:r>
+              <a:rPr lang="fi-FI" dirty="0"/>
+              <a:t> help </a:t>
+            </a:r>
+            <a:r>
+              <a:rPr lang="fi-FI" dirty="0" err="1"/>
+              <a:t>the</a:t>
+            </a:r>
+            <a:r>
+              <a:rPr lang="fi-FI" dirty="0"/>
+              <a:t> </a:t>
+            </a:r>
+            <a:r>
+              <a:rPr lang="fi-FI" dirty="0" err="1"/>
+              <a:t>readability</a:t>
+            </a:r>
+            <a:r>
+              <a:rPr lang="fi-FI" dirty="0"/>
+              <a:t> of </a:t>
+            </a:r>
+            <a:r>
+              <a:rPr lang="fi-FI" dirty="0" err="1"/>
+              <a:t>the</a:t>
+            </a:r>
+            <a:r>
+              <a:rPr lang="fi-FI" dirty="0"/>
+              <a:t> </a:t>
+            </a:r>
+            <a:r>
+              <a:rPr lang="fi-FI" dirty="0" err="1"/>
+              <a:t>code</a:t>
+            </a:r>
+            <a:r>
+              <a:rPr lang="fi-FI" dirty="0"/>
+              <a:t> and </a:t>
+            </a:r>
+            <a:r>
+              <a:rPr lang="fi-FI" dirty="0" err="1"/>
+              <a:t>e.g</a:t>
+            </a:r>
+            <a:r>
+              <a:rPr lang="fi-FI" dirty="0"/>
+              <a:t>. </a:t>
+            </a:r>
+            <a:r>
+              <a:rPr lang="fi-FI" dirty="0" err="1"/>
+              <a:t>allow</a:t>
+            </a:r>
+            <a:r>
+              <a:rPr lang="fi-FI" dirty="0"/>
+              <a:t> </a:t>
+            </a:r>
+            <a:r>
+              <a:rPr lang="fi-FI" dirty="0" err="1"/>
+              <a:t>using</a:t>
+            </a:r>
+            <a:r>
+              <a:rPr lang="fi-FI" dirty="0"/>
+              <a:t> </a:t>
+            </a:r>
+            <a:r>
+              <a:rPr lang="fi-FI" dirty="0" err="1"/>
+              <a:t>explanatory</a:t>
+            </a:r>
+            <a:r>
+              <a:rPr lang="fi-FI" dirty="0"/>
+              <a:t> </a:t>
+            </a:r>
+            <a:r>
+              <a:rPr lang="fi-FI" dirty="0" err="1"/>
+              <a:t>variable</a:t>
+            </a:r>
+            <a:r>
+              <a:rPr lang="fi-FI" dirty="0"/>
+              <a:t> </a:t>
+            </a:r>
+            <a:r>
+              <a:rPr lang="fi-FI" dirty="0" err="1"/>
+              <a:t>names</a:t>
+            </a:r>
+            <a:r>
+              <a:rPr lang="fi-FI" dirty="0"/>
+              <a:t> and </a:t>
+            </a:r>
+            <a:r>
+              <a:rPr lang="fi-FI" dirty="0" err="1"/>
+              <a:t>comments</a:t>
+            </a:r>
+            <a:r>
+              <a:rPr lang="fi-FI" dirty="0"/>
+              <a:t> </a:t>
+            </a:r>
+            <a:r>
+              <a:rPr lang="fi-FI" dirty="0" err="1"/>
+              <a:t>next</a:t>
+            </a:r>
+            <a:r>
+              <a:rPr lang="fi-FI" dirty="0"/>
+              <a:t> to </a:t>
+            </a:r>
+            <a:r>
+              <a:rPr lang="fi-FI" dirty="0" err="1"/>
+              <a:t>lines</a:t>
+            </a:r>
+            <a:endParaRPr lang="fi-FI" dirty="0"/>
+          </a:p>
+        </p:txBody>
+      </p:sp>
+      <p:sp>
+        <p:nvSpPr>
+          <p:cNvPr id="5" name="Date Placeholder 4">
+            <a:extLst>
+              <a:ext uri="{FF2B5EF4-FFF2-40B4-BE49-F238E27FC236}">
+                <a16:creationId xmlns:a16="http://schemas.microsoft.com/office/drawing/2014/main" id="{976244E2-AA76-2742-B2EC-FEC79276155C}"/>
+              </a:ext>
+            </a:extLst>
+          </p:cNvPr>
+          <p:cNvSpPr>
+            <a:spLocks noGrp="1"/>
+          </p:cNvSpPr>
+          <p:nvPr>
+            <p:ph type="dt" sz="half" idx="10"/>
+          </p:nvPr>
+        </p:nvSpPr>
+        <p:spPr/>
+        <p:txBody>
+          <a:bodyPr/>
+          <a:lstStyle/>
+          <a:p>
+            <a:fld id="{202E1EC2-47B8-044B-A09E-6A63B4D80C87}" type="datetime1">
+              <a:rPr lang="fi-FI" smtClean="0"/>
+              <a:t>31.10.2022</a:t>
+            </a:fld>
+            <a:endParaRPr lang="en-GB"/>
+          </a:p>
+        </p:txBody>
+      </p:sp>
+      <p:sp>
+        <p:nvSpPr>
+          <p:cNvPr id="6" name="Footer Placeholder 5">
+            <a:extLst>
+              <a:ext uri="{FF2B5EF4-FFF2-40B4-BE49-F238E27FC236}">
+                <a16:creationId xmlns:a16="http://schemas.microsoft.com/office/drawing/2014/main" id="{588CE607-4137-8840-8FEA-42EAC857E3A3}"/>
+              </a:ext>
+            </a:extLst>
+          </p:cNvPr>
+          <p:cNvSpPr>
+            <a:spLocks noGrp="1"/>
+          </p:cNvSpPr>
+          <p:nvPr>
+            <p:ph type="ftr" sz="quarter" idx="11"/>
+          </p:nvPr>
+        </p:nvSpPr>
+        <p:spPr/>
+        <p:txBody>
+          <a:bodyPr/>
+          <a:lstStyle/>
+          <a:p>
+            <a:endParaRPr lang="en-GB"/>
+          </a:p>
+        </p:txBody>
+      </p:sp>
+      <p:sp>
+        <p:nvSpPr>
+          <p:cNvPr id="7" name="Slide Number Placeholder 6">
+            <a:extLst>
+              <a:ext uri="{FF2B5EF4-FFF2-40B4-BE49-F238E27FC236}">
+                <a16:creationId xmlns:a16="http://schemas.microsoft.com/office/drawing/2014/main" id="{2E133A96-6C73-0844-B8CB-27C2B5F4CFB1}"/>
+              </a:ext>
+            </a:extLst>
+          </p:cNvPr>
+          <p:cNvSpPr>
+            <a:spLocks noGrp="1"/>
+          </p:cNvSpPr>
+          <p:nvPr>
+            <p:ph type="sldNum" sz="quarter" idx="12"/>
+          </p:nvPr>
+        </p:nvSpPr>
+        <p:spPr/>
+        <p:txBody>
+          <a:bodyPr/>
+          <a:lstStyle/>
+          <a:p>
+            <a:fld id="{76BAB7ED-EDE9-4D4B-9A2D-30E18C47C16E}" type="slidenum">
+              <a:rPr lang="en-GB" smtClean="0"/>
+              <a:t>7</a:t>
+            </a:fld>
+            <a:endParaRPr lang="en-GB"/>
+          </a:p>
+        </p:txBody>
+      </p:sp>
+    </p:spTree>
+    <p:extLst>
+      <p:ext uri="{BB962C8B-B14F-4D97-AF65-F5344CB8AC3E}">
+        <p14:creationId xmlns:p14="http://schemas.microsoft.com/office/powerpoint/2010/main" val="2746636143"/>
+      </p:ext>
+    </p:extLst>
+  </p:cSld>
+  <p:clrMapOvr>
+    <a:masterClrMapping/>
+  </p:clrMapOvr>
+</p:sld>
+</file>
+
+<file path=ppt/slides/slide8.xml><?xml version="1.0" encoding="utf-8"?>
+<p:sld xmlns:a="http://schemas.openxmlformats.org/drawingml/2006/main" xmlns:r="http://schemas.openxmlformats.org/officeDocument/2006/relationships" xmlns:p="http://schemas.openxmlformats.org/presentationml/2006/main">
+  <p:cSld>
+    <p:spTree>
+      <p:nvGrpSpPr>
+        <p:cNvPr id="1" name=""/>
+        <p:cNvGrpSpPr/>
+        <p:nvPr/>
+      </p:nvGrpSpPr>
+      <p:grpSpPr>
+        <a:xfrm>
+          <a:off x="0" y="0"/>
+          <a:ext cx="0" cy="0"/>
+          <a:chOff x="0" y="0"/>
+          <a:chExt cx="0" cy="0"/>
+        </a:xfrm>
+      </p:grpSpPr>
+      <p:sp>
+        <p:nvSpPr>
+          <p:cNvPr id="8" name="Title 7">
+            <a:extLst>
+              <a:ext uri="{FF2B5EF4-FFF2-40B4-BE49-F238E27FC236}">
+                <a16:creationId xmlns:a16="http://schemas.microsoft.com/office/drawing/2014/main" id="{197044C3-CD23-D844-B780-26FABA91AD0F}"/>
+              </a:ext>
+            </a:extLst>
+          </p:cNvPr>
+          <p:cNvSpPr>
+            <a:spLocks noGrp="1"/>
+          </p:cNvSpPr>
+          <p:nvPr>
+            <p:ph type="title"/>
+          </p:nvPr>
+        </p:nvSpPr>
+        <p:spPr>
+          <a:xfrm>
+            <a:off x="550863" y="549276"/>
+            <a:ext cx="11125200" cy="745798"/>
+          </a:xfrm>
+        </p:spPr>
+        <p:txBody>
+          <a:bodyPr/>
+          <a:lstStyle/>
+          <a:p>
+            <a:r>
+              <a:rPr lang="fi-FI" dirty="0"/>
+              <a:t>API </a:t>
+            </a:r>
+            <a:r>
+              <a:rPr lang="fi-FI" dirty="0" err="1"/>
+              <a:t>documentation</a:t>
+            </a:r>
+            <a:endParaRPr lang="fi-FI" dirty="0"/>
+          </a:p>
+        </p:txBody>
+      </p:sp>
+      <p:sp>
+        <p:nvSpPr>
+          <p:cNvPr id="9" name="Content Placeholder 8">
+            <a:extLst>
+              <a:ext uri="{FF2B5EF4-FFF2-40B4-BE49-F238E27FC236}">
+                <a16:creationId xmlns:a16="http://schemas.microsoft.com/office/drawing/2014/main" id="{ACDE61D8-A75A-F94B-B57A-46F276C03311}"/>
+              </a:ext>
+            </a:extLst>
+          </p:cNvPr>
+          <p:cNvSpPr>
+            <a:spLocks noGrp="1"/>
+          </p:cNvSpPr>
+          <p:nvPr>
+            <p:ph sz="half" idx="2"/>
+          </p:nvPr>
+        </p:nvSpPr>
+        <p:spPr>
+          <a:xfrm>
+            <a:off x="550864" y="1295073"/>
+            <a:ext cx="11125198" cy="4618365"/>
+          </a:xfrm>
+        </p:spPr>
+        <p:txBody>
+          <a:bodyPr>
+            <a:normAutofit/>
+          </a:bodyPr>
+          <a:lstStyle/>
+          <a:p>
+            <a:r>
+              <a:rPr lang="fi-FI" dirty="0"/>
+              <a:t>Libraries </a:t>
+            </a:r>
+            <a:r>
+              <a:rPr lang="fi-FI" dirty="0" err="1"/>
+              <a:t>exist</a:t>
+            </a:r>
+            <a:r>
+              <a:rPr lang="fi-FI" dirty="0"/>
+              <a:t> for </a:t>
+            </a:r>
+            <a:r>
+              <a:rPr lang="fi-FI" dirty="0" err="1"/>
+              <a:t>making</a:t>
+            </a:r>
+            <a:r>
+              <a:rPr lang="fi-FI" dirty="0"/>
+              <a:t> API </a:t>
+            </a:r>
+            <a:r>
+              <a:rPr lang="fi-FI" dirty="0" err="1"/>
+              <a:t>documentation</a:t>
+            </a:r>
+            <a:r>
+              <a:rPr lang="fi-FI" dirty="0"/>
+              <a:t> </a:t>
+            </a:r>
+            <a:r>
+              <a:rPr lang="fi-FI" dirty="0" err="1"/>
+              <a:t>based</a:t>
+            </a:r>
+            <a:r>
+              <a:rPr lang="fi-FI" dirty="0"/>
+              <a:t> on </a:t>
+            </a:r>
+            <a:r>
+              <a:rPr lang="fi-FI" dirty="0" err="1"/>
+              <a:t>the</a:t>
+            </a:r>
+            <a:r>
+              <a:rPr lang="fi-FI" dirty="0"/>
+              <a:t> API </a:t>
+            </a:r>
+            <a:r>
+              <a:rPr lang="fi-FI" dirty="0" err="1"/>
+              <a:t>code</a:t>
+            </a:r>
+            <a:endParaRPr lang="fi-FI" dirty="0"/>
+          </a:p>
+          <a:p>
+            <a:r>
+              <a:rPr lang="fi-FI" dirty="0" err="1"/>
+              <a:t>We</a:t>
+            </a:r>
+            <a:r>
+              <a:rPr lang="fi-FI" dirty="0"/>
+              <a:t> just </a:t>
+            </a:r>
+            <a:r>
+              <a:rPr lang="fi-FI" dirty="0" err="1"/>
+              <a:t>need</a:t>
+            </a:r>
+            <a:r>
+              <a:rPr lang="fi-FI" dirty="0"/>
+              <a:t> to </a:t>
+            </a:r>
+            <a:r>
+              <a:rPr lang="fi-FI" dirty="0" err="1"/>
+              <a:t>add</a:t>
+            </a:r>
+            <a:r>
+              <a:rPr lang="fi-FI" dirty="0"/>
+              <a:t> </a:t>
+            </a:r>
+            <a:r>
+              <a:rPr lang="fi-FI" dirty="0" err="1"/>
+              <a:t>possible</a:t>
+            </a:r>
+            <a:r>
+              <a:rPr lang="fi-FI" dirty="0"/>
+              <a:t> </a:t>
+            </a:r>
+            <a:r>
+              <a:rPr lang="fi-FI" dirty="0" err="1"/>
+              <a:t>commentation</a:t>
+            </a:r>
+            <a:r>
+              <a:rPr lang="fi-FI" dirty="0"/>
+              <a:t> as some </a:t>
+            </a:r>
+            <a:r>
+              <a:rPr lang="fi-FI" dirty="0" err="1"/>
+              <a:t>kind</a:t>
+            </a:r>
+            <a:r>
+              <a:rPr lang="fi-FI" dirty="0"/>
+              <a:t> of </a:t>
+            </a:r>
+            <a:r>
+              <a:rPr lang="fi-FI" dirty="0" err="1"/>
+              <a:t>annotation</a:t>
+            </a:r>
+            <a:r>
+              <a:rPr lang="fi-FI" dirty="0"/>
+              <a:t> </a:t>
+            </a:r>
+            <a:r>
+              <a:rPr lang="fi-FI" dirty="0" err="1"/>
+              <a:t>or</a:t>
+            </a:r>
+            <a:r>
+              <a:rPr lang="fi-FI" dirty="0"/>
+              <a:t> </a:t>
+            </a:r>
+            <a:r>
+              <a:rPr lang="fi-FI" dirty="0" err="1"/>
+              <a:t>javadoc-kind</a:t>
+            </a:r>
+            <a:r>
+              <a:rPr lang="fi-FI" dirty="0"/>
+              <a:t> of </a:t>
+            </a:r>
+            <a:r>
+              <a:rPr lang="fi-FI" dirty="0" err="1"/>
+              <a:t>comments</a:t>
+            </a:r>
+            <a:endParaRPr lang="fi-FI" dirty="0"/>
+          </a:p>
+          <a:p>
+            <a:pPr lvl="1"/>
+            <a:r>
+              <a:rPr lang="fi-FI" dirty="0"/>
+              <a:t>(</a:t>
+            </a:r>
+            <a:r>
+              <a:rPr lang="fi-FI" dirty="0" err="1"/>
+              <a:t>Javadoc</a:t>
+            </a:r>
+            <a:r>
+              <a:rPr lang="fi-FI" dirty="0"/>
+              <a:t>: Write </a:t>
+            </a:r>
+            <a:r>
+              <a:rPr lang="fi-FI" dirty="0" err="1"/>
+              <a:t>comments</a:t>
+            </a:r>
+            <a:r>
+              <a:rPr lang="fi-FI" dirty="0"/>
+              <a:t> on </a:t>
+            </a:r>
+            <a:r>
+              <a:rPr lang="fi-FI" dirty="0" err="1"/>
+              <a:t>certain</a:t>
+            </a:r>
+            <a:r>
+              <a:rPr lang="fi-FI" dirty="0"/>
+              <a:t> </a:t>
+            </a:r>
+            <a:r>
+              <a:rPr lang="fi-FI" dirty="0" err="1"/>
+              <a:t>style</a:t>
+            </a:r>
+            <a:r>
+              <a:rPr lang="fi-FI" dirty="0"/>
+              <a:t> and </a:t>
+            </a:r>
+            <a:r>
+              <a:rPr lang="fi-FI" dirty="0" err="1"/>
+              <a:t>they</a:t>
+            </a:r>
+            <a:r>
+              <a:rPr lang="fi-FI" dirty="0"/>
+              <a:t> go to </a:t>
+            </a:r>
+            <a:r>
+              <a:rPr lang="fi-FI" dirty="0" err="1"/>
+              <a:t>the</a:t>
+            </a:r>
+            <a:r>
+              <a:rPr lang="fi-FI" dirty="0"/>
+              <a:t> </a:t>
+            </a:r>
+            <a:r>
+              <a:rPr lang="fi-FI" dirty="0" err="1"/>
+              <a:t>javadoc</a:t>
+            </a:r>
+            <a:r>
+              <a:rPr lang="fi-FI" dirty="0"/>
+              <a:t> </a:t>
+            </a:r>
+            <a:r>
+              <a:rPr lang="fi-FI" dirty="0" err="1"/>
+              <a:t>tool</a:t>
+            </a:r>
+            <a:r>
+              <a:rPr lang="fi-FI" dirty="0"/>
+              <a:t> </a:t>
+            </a:r>
+            <a:r>
+              <a:rPr lang="fi-FI" dirty="0" err="1"/>
+              <a:t>generated</a:t>
+            </a:r>
+            <a:r>
+              <a:rPr lang="fi-FI" dirty="0"/>
+              <a:t> HTML etc. </a:t>
+            </a:r>
+            <a:r>
+              <a:rPr lang="fi-FI" dirty="0" err="1"/>
+              <a:t>Documentation</a:t>
+            </a:r>
+            <a:r>
+              <a:rPr lang="fi-FI" dirty="0"/>
+              <a:t>)</a:t>
+            </a:r>
+          </a:p>
+          <a:p>
+            <a:r>
+              <a:rPr lang="fi-FI" dirty="0" err="1"/>
+              <a:t>Thus</a:t>
+            </a:r>
+            <a:r>
+              <a:rPr lang="fi-FI" dirty="0"/>
+              <a:t>, </a:t>
+            </a:r>
+            <a:r>
+              <a:rPr lang="fi-FI" dirty="0" err="1"/>
+              <a:t>maybe</a:t>
+            </a:r>
+            <a:r>
+              <a:rPr lang="fi-FI" dirty="0"/>
+              <a:t> </a:t>
+            </a:r>
+            <a:r>
+              <a:rPr lang="fi-FI" dirty="0" err="1"/>
+              <a:t>use</a:t>
+            </a:r>
+            <a:r>
+              <a:rPr lang="fi-FI" dirty="0"/>
+              <a:t> a </a:t>
+            </a:r>
+            <a:r>
+              <a:rPr lang="fi-FI" dirty="0" err="1"/>
+              <a:t>library</a:t>
+            </a:r>
+            <a:r>
+              <a:rPr lang="fi-FI" dirty="0"/>
+              <a:t> </a:t>
+            </a:r>
+            <a:r>
+              <a:rPr lang="fi-FI" dirty="0" err="1"/>
+              <a:t>instead</a:t>
+            </a:r>
+            <a:r>
+              <a:rPr lang="fi-FI" dirty="0"/>
+              <a:t> of non-</a:t>
+            </a:r>
+            <a:r>
+              <a:rPr lang="fi-FI" dirty="0" err="1"/>
+              <a:t>updating</a:t>
+            </a:r>
+            <a:r>
+              <a:rPr lang="fi-FI" dirty="0"/>
+              <a:t> Word </a:t>
+            </a:r>
+            <a:r>
+              <a:rPr lang="fi-FI" dirty="0" err="1"/>
+              <a:t>document</a:t>
+            </a:r>
+            <a:r>
+              <a:rPr lang="fi-FI" dirty="0"/>
+              <a:t>.</a:t>
+            </a:r>
+          </a:p>
+          <a:p>
+            <a:pPr lvl="1"/>
+            <a:r>
+              <a:rPr lang="fi-FI" dirty="0" err="1"/>
+              <a:t>Didn’t</a:t>
+            </a:r>
+            <a:r>
+              <a:rPr lang="fi-FI" dirty="0"/>
+              <a:t> </a:t>
+            </a:r>
+            <a:r>
+              <a:rPr lang="fi-FI" dirty="0" err="1"/>
+              <a:t>we</a:t>
+            </a:r>
+            <a:r>
+              <a:rPr lang="fi-FI" dirty="0"/>
+              <a:t> </a:t>
+            </a:r>
+            <a:r>
+              <a:rPr lang="fi-FI" dirty="0" err="1"/>
+              <a:t>agree</a:t>
+            </a:r>
+            <a:r>
+              <a:rPr lang="fi-FI" dirty="0"/>
+              <a:t> on </a:t>
+            </a:r>
+            <a:r>
+              <a:rPr lang="fi-FI" dirty="0" err="1"/>
+              <a:t>this</a:t>
+            </a:r>
+            <a:r>
+              <a:rPr lang="fi-FI" dirty="0"/>
+              <a:t> </a:t>
+            </a:r>
+            <a:r>
+              <a:rPr lang="fi-FI" dirty="0" err="1"/>
+              <a:t>presentation</a:t>
+            </a:r>
+            <a:r>
+              <a:rPr lang="fi-FI" dirty="0"/>
+              <a:t> </a:t>
+            </a:r>
+            <a:r>
+              <a:rPr lang="fi-FI" dirty="0" err="1"/>
+              <a:t>mostly</a:t>
+            </a:r>
+            <a:r>
+              <a:rPr lang="fi-FI" dirty="0"/>
+              <a:t> </a:t>
+            </a:r>
+            <a:r>
+              <a:rPr lang="fi-FI" dirty="0" err="1"/>
+              <a:t>that</a:t>
+            </a:r>
+            <a:r>
+              <a:rPr lang="fi-FI" dirty="0"/>
+              <a:t> </a:t>
+            </a:r>
+            <a:r>
+              <a:rPr lang="fi-FI" dirty="0" err="1"/>
+              <a:t>we</a:t>
+            </a:r>
+            <a:r>
+              <a:rPr lang="fi-FI" dirty="0"/>
+              <a:t> </a:t>
+            </a:r>
+            <a:r>
+              <a:rPr lang="fi-FI" dirty="0" err="1"/>
+              <a:t>can</a:t>
+            </a:r>
+            <a:r>
+              <a:rPr lang="fi-FI" dirty="0"/>
+              <a:t> </a:t>
+            </a:r>
+            <a:r>
+              <a:rPr lang="fi-FI" dirty="0" err="1"/>
+              <a:t>almost</a:t>
+            </a:r>
+            <a:r>
+              <a:rPr lang="fi-FI" dirty="0"/>
+              <a:t> </a:t>
+            </a:r>
+            <a:r>
+              <a:rPr lang="fi-FI" dirty="0" err="1"/>
+              <a:t>totally</a:t>
+            </a:r>
+            <a:r>
+              <a:rPr lang="fi-FI" dirty="0"/>
+              <a:t> </a:t>
+            </a:r>
+            <a:r>
+              <a:rPr lang="fi-FI" dirty="0" err="1"/>
+              <a:t>remove</a:t>
+            </a:r>
+            <a:r>
+              <a:rPr lang="fi-FI" dirty="0"/>
+              <a:t> non-</a:t>
+            </a:r>
+            <a:r>
+              <a:rPr lang="fi-FI" dirty="0" err="1"/>
+              <a:t>generated</a:t>
+            </a:r>
+            <a:r>
+              <a:rPr lang="fi-FI" dirty="0"/>
+              <a:t>, non-</a:t>
+            </a:r>
+            <a:r>
+              <a:rPr lang="fi-FI" dirty="0" err="1"/>
+              <a:t>code</a:t>
+            </a:r>
+            <a:r>
+              <a:rPr lang="fi-FI" dirty="0"/>
+              <a:t> </a:t>
+            </a:r>
+            <a:r>
+              <a:rPr lang="fi-FI" dirty="0" err="1"/>
+              <a:t>or</a:t>
+            </a:r>
+            <a:r>
+              <a:rPr lang="fi-FI" dirty="0"/>
+              <a:t> </a:t>
+            </a:r>
+            <a:r>
+              <a:rPr lang="fi-FI" dirty="0" err="1"/>
+              <a:t>script</a:t>
+            </a:r>
+            <a:r>
+              <a:rPr lang="fi-FI" dirty="0"/>
+              <a:t> </a:t>
+            </a:r>
+            <a:r>
+              <a:rPr lang="fi-FI" dirty="0" err="1"/>
+              <a:t>linked</a:t>
+            </a:r>
+            <a:r>
+              <a:rPr lang="fi-FI" dirty="0"/>
+              <a:t> </a:t>
+            </a:r>
+            <a:r>
+              <a:rPr lang="fi-FI" dirty="0" err="1"/>
+              <a:t>documentation</a:t>
+            </a:r>
+            <a:r>
+              <a:rPr lang="fi-FI" dirty="0"/>
+              <a:t>?</a:t>
+            </a:r>
+          </a:p>
+        </p:txBody>
+      </p:sp>
+      <p:sp>
+        <p:nvSpPr>
+          <p:cNvPr id="5" name="Date Placeholder 4">
+            <a:extLst>
+              <a:ext uri="{FF2B5EF4-FFF2-40B4-BE49-F238E27FC236}">
+                <a16:creationId xmlns:a16="http://schemas.microsoft.com/office/drawing/2014/main" id="{976244E2-AA76-2742-B2EC-FEC79276155C}"/>
+              </a:ext>
+            </a:extLst>
+          </p:cNvPr>
+          <p:cNvSpPr>
+            <a:spLocks noGrp="1"/>
+          </p:cNvSpPr>
+          <p:nvPr>
+            <p:ph type="dt" sz="half" idx="10"/>
+          </p:nvPr>
+        </p:nvSpPr>
+        <p:spPr/>
+        <p:txBody>
+          <a:bodyPr/>
+          <a:lstStyle/>
+          <a:p>
+            <a:fld id="{202E1EC2-47B8-044B-A09E-6A63B4D80C87}" type="datetime1">
+              <a:rPr lang="fi-FI" smtClean="0"/>
+              <a:t>31.10.2022</a:t>
+            </a:fld>
+            <a:endParaRPr lang="en-GB"/>
+          </a:p>
+        </p:txBody>
+      </p:sp>
+      <p:sp>
+        <p:nvSpPr>
+          <p:cNvPr id="6" name="Footer Placeholder 5">
+            <a:extLst>
+              <a:ext uri="{FF2B5EF4-FFF2-40B4-BE49-F238E27FC236}">
+                <a16:creationId xmlns:a16="http://schemas.microsoft.com/office/drawing/2014/main" id="{588CE607-4137-8840-8FEA-42EAC857E3A3}"/>
+              </a:ext>
+            </a:extLst>
+          </p:cNvPr>
+          <p:cNvSpPr>
+            <a:spLocks noGrp="1"/>
+          </p:cNvSpPr>
+          <p:nvPr>
+            <p:ph type="ftr" sz="quarter" idx="11"/>
+          </p:nvPr>
+        </p:nvSpPr>
+        <p:spPr/>
+        <p:txBody>
+          <a:bodyPr/>
+          <a:lstStyle/>
+          <a:p>
+            <a:endParaRPr lang="en-GB"/>
+          </a:p>
+        </p:txBody>
+      </p:sp>
+      <p:sp>
+        <p:nvSpPr>
+          <p:cNvPr id="7" name="Slide Number Placeholder 6">
+            <a:extLst>
+              <a:ext uri="{FF2B5EF4-FFF2-40B4-BE49-F238E27FC236}">
+                <a16:creationId xmlns:a16="http://schemas.microsoft.com/office/drawing/2014/main" id="{2E133A96-6C73-0844-B8CB-27C2B5F4CFB1}"/>
+              </a:ext>
+            </a:extLst>
+          </p:cNvPr>
+          <p:cNvSpPr>
+            <a:spLocks noGrp="1"/>
+          </p:cNvSpPr>
+          <p:nvPr>
+            <p:ph type="sldNum" sz="quarter" idx="12"/>
+          </p:nvPr>
+        </p:nvSpPr>
+        <p:spPr/>
+        <p:txBody>
+          <a:bodyPr/>
+          <a:lstStyle/>
+          <a:p>
+            <a:fld id="{76BAB7ED-EDE9-4D4B-9A2D-30E18C47C16E}" type="slidenum">
+              <a:rPr lang="en-GB" smtClean="0"/>
+              <a:t>8</a:t>
+            </a:fld>
+            <a:endParaRPr lang="en-GB"/>
+          </a:p>
+        </p:txBody>
+      </p:sp>
+    </p:spTree>
+    <p:extLst>
+      <p:ext uri="{BB962C8B-B14F-4D97-AF65-F5344CB8AC3E}">
+        <p14:creationId xmlns:p14="http://schemas.microsoft.com/office/powerpoint/2010/main" val="4259734418"/>
+      </p:ext>
+    </p:extLst>
+  </p:cSld>
+  <p:clrMapOvr>
+    <a:masterClrMapping/>
+  </p:clrMapOvr>
+</p:sld>
+</file>
+
 <file path=ppt/theme/theme1.xml><?xml version="1.0" encoding="utf-8"?>
 <a:theme xmlns:a="http://schemas.openxmlformats.org/drawingml/2006/main" name="Office Theme">
   <a:themeElements>
@@ -10373,6 +11862,24 @@
 </file>
 
 <file path=customXml/item1.xml><?xml version="1.0" encoding="utf-8"?>
+<?mso-contentType ?>
+<FormTemplates xmlns="http://schemas.microsoft.com/sharepoint/v3/contenttype/forms">
+  <Display>DocumentLibraryForm</Display>
+  <Edit>DocumentLibraryForm</Edit>
+  <New>DocumentLibraryForm</New>
+</FormTemplates>
+</file>
+
+<file path=customXml/item2.xml><?xml version="1.0" encoding="utf-8"?>
+<p:properties xmlns:p="http://schemas.microsoft.com/office/2006/metadata/properties" xmlns:xsi="http://www.w3.org/2001/XMLSchema-instance" xmlns:pc="http://schemas.microsoft.com/office/infopath/2007/PartnerControls">
+  <documentManagement>
+    <PublishingExpirationDate xmlns="http://schemas.microsoft.com/sharepoint/v3" xsi:nil="true"/>
+    <PublishingStartDate xmlns="http://schemas.microsoft.com/sharepoint/v3" xsi:nil="true"/>
+  </documentManagement>
+</p:properties>
+</file>
+
+<file path=customXml/item3.xml><?xml version="1.0" encoding="utf-8"?>
 <ct:contentTypeSchema xmlns:ct="http://schemas.microsoft.com/office/2006/metadata/contentType" xmlns:ma="http://schemas.microsoft.com/office/2006/metadata/properties/metaAttributes" ct:_="" ma:_="" ma:contentTypeName="Document" ma:contentTypeID="0x01010024C55B41993A414DABB8DD07ACBA0814" ma:contentTypeVersion="1" ma:contentTypeDescription="Create a new document." ma:contentTypeScope="" ma:versionID="3ea0c22b5866975a7b271665de4056c5">
   <xsd:schema xmlns:xsd="http://www.w3.org/2001/XMLSchema" xmlns:xs="http://www.w3.org/2001/XMLSchema" xmlns:p="http://schemas.microsoft.com/office/2006/metadata/properties" xmlns:ns1="http://schemas.microsoft.com/sharepoint/v3" targetNamespace="http://schemas.microsoft.com/office/2006/metadata/properties" ma:root="true" ma:fieldsID="ef2aa9ed40e72a78c3822fc753b43e87" ns1:_="">
     <xsd:import namespace="http://schemas.microsoft.com/sharepoint/v3"/>
@@ -10504,38 +12011,10 @@
 </ct:contentTypeSchema>
 </file>
 
-<file path=customXml/item2.xml><?xml version="1.0" encoding="utf-8"?>
-<p:properties xmlns:p="http://schemas.microsoft.com/office/2006/metadata/properties" xmlns:xsi="http://www.w3.org/2001/XMLSchema-instance" xmlns:pc="http://schemas.microsoft.com/office/infopath/2007/PartnerControls">
-  <documentManagement>
-    <PublishingExpirationDate xmlns="http://schemas.microsoft.com/sharepoint/v3" xsi:nil="true"/>
-    <PublishingStartDate xmlns="http://schemas.microsoft.com/sharepoint/v3" xsi:nil="true"/>
-  </documentManagement>
-</p:properties>
-</file>
-
-<file path=customXml/item3.xml><?xml version="1.0" encoding="utf-8"?>
-<?mso-contentType ?>
-<FormTemplates xmlns="http://schemas.microsoft.com/sharepoint/v3/contenttype/forms">
-  <Display>DocumentLibraryForm</Display>
-  <Edit>DocumentLibraryForm</Edit>
-  <New>DocumentLibraryForm</New>
-</FormTemplates>
-</file>
-
 <file path=customXml/itemProps1.xml><?xml version="1.0" encoding="utf-8"?>
-<ds:datastoreItem xmlns:ds="http://schemas.openxmlformats.org/officeDocument/2006/customXml" ds:itemID="{B9E4DC25-62AA-44A0-8D5C-DB44892588AF}">
+<ds:datastoreItem xmlns:ds="http://schemas.openxmlformats.org/officeDocument/2006/customXml" ds:itemID="{D546C03B-CD3A-4EA0-AAA4-0E00E896454E}">
   <ds:schemaRefs>
-    <ds:schemaRef ds:uri="http://schemas.microsoft.com/office/2006/metadata/contentType"/>
-    <ds:schemaRef ds:uri="http://schemas.microsoft.com/office/2006/metadata/properties/metaAttributes"/>
-    <ds:schemaRef ds:uri="http://www.w3.org/2001/XMLSchema"/>
-    <ds:schemaRef ds:uri="http://schemas.microsoft.com/office/2006/metadata/properties"/>
-    <ds:schemaRef ds:uri="http://schemas.microsoft.com/sharepoint/v3"/>
-    <ds:schemaRef ds:uri="http://schemas.microsoft.com/office/2006/documentManagement/types"/>
-    <ds:schemaRef ds:uri="http://schemas.microsoft.com/office/infopath/2007/PartnerControls"/>
-    <ds:schemaRef ds:uri="http://schemas.openxmlformats.org/package/2006/metadata/core-properties"/>
-    <ds:schemaRef ds:uri="http://purl.org/dc/elements/1.1/"/>
-    <ds:schemaRef ds:uri="http://purl.org/dc/terms/"/>
-    <ds:schemaRef ds:uri="http://schemas.microsoft.com/internal/obd"/>
+    <ds:schemaRef ds:uri="http://schemas.microsoft.com/sharepoint/v3/contenttype/forms"/>
   </ds:schemaRefs>
 </ds:datastoreItem>
 </file>
@@ -10557,9 +12036,19 @@
 </file>
 
 <file path=customXml/itemProps3.xml><?xml version="1.0" encoding="utf-8"?>
-<ds:datastoreItem xmlns:ds="http://schemas.openxmlformats.org/officeDocument/2006/customXml" ds:itemID="{D546C03B-CD3A-4EA0-AAA4-0E00E896454E}">
+<ds:datastoreItem xmlns:ds="http://schemas.openxmlformats.org/officeDocument/2006/customXml" ds:itemID="{B9E4DC25-62AA-44A0-8D5C-DB44892588AF}">
   <ds:schemaRefs>
-    <ds:schemaRef ds:uri="http://schemas.microsoft.com/sharepoint/v3/contenttype/forms"/>
+    <ds:schemaRef ds:uri="http://schemas.microsoft.com/office/2006/metadata/contentType"/>
+    <ds:schemaRef ds:uri="http://schemas.microsoft.com/office/2006/metadata/properties/metaAttributes"/>
+    <ds:schemaRef ds:uri="http://www.w3.org/2001/XMLSchema"/>
+    <ds:schemaRef ds:uri="http://schemas.microsoft.com/office/2006/metadata/properties"/>
+    <ds:schemaRef ds:uri="http://schemas.microsoft.com/sharepoint/v3"/>
+    <ds:schemaRef ds:uri="http://schemas.microsoft.com/office/2006/documentManagement/types"/>
+    <ds:schemaRef ds:uri="http://schemas.microsoft.com/office/infopath/2007/PartnerControls"/>
+    <ds:schemaRef ds:uri="http://schemas.openxmlformats.org/package/2006/metadata/core-properties"/>
+    <ds:schemaRef ds:uri="http://purl.org/dc/elements/1.1/"/>
+    <ds:schemaRef ds:uri="http://purl.org/dc/terms/"/>
+    <ds:schemaRef ds:uri="http://schemas.microsoft.com/internal/obd"/>
   </ds:schemaRefs>
 </ds:datastoreItem>
 </file>
</xml_diff>

<commit_message>
Project documentation philosophy first' complete version ready
</commit_message>
<xml_diff>
--- a/06_ohjelmistoarkkitehtuurit_ja_patternit/documentation_principles_for_sw_projects.pptx
+++ b/06_ohjelmistoarkkitehtuurit_ja_patternit/documentation_principles_for_sw_projects.pptx
@@ -7287,7 +7287,7 @@
             </a:r>
             <a:r>
               <a:rPr lang="fi-FI" dirty="0" err="1"/>
-              <a:t>table</a:t>
+              <a:t>Table</a:t>
             </a:r>
             <a:r>
               <a:rPr lang="fi-FI" dirty="0"/>
@@ -7295,7 +7295,7 @@
             </a:r>
             <a:r>
               <a:rPr lang="fi-FI" dirty="0" err="1"/>
-              <a:t>contents</a:t>
+              <a:t>Contents</a:t>
             </a:r>
             <a:r>
               <a:rPr lang="fi-FI" dirty="0"/>
@@ -8591,6 +8591,94 @@
             </a:r>
           </a:p>
           <a:p>
+            <a:pPr lvl="1"/>
+            <a:r>
+              <a:rPr lang="fi-FI" dirty="0" err="1"/>
+              <a:t>E.g</a:t>
+            </a:r>
+            <a:r>
+              <a:rPr lang="fi-FI" dirty="0"/>
+              <a:t>. .</a:t>
+            </a:r>
+            <a:r>
+              <a:rPr lang="fi-FI" dirty="0" err="1"/>
+              <a:t>env</a:t>
+            </a:r>
+            <a:r>
+              <a:rPr lang="fi-FI" dirty="0"/>
+              <a:t> </a:t>
+            </a:r>
+            <a:r>
+              <a:rPr lang="fi-FI" dirty="0" err="1"/>
+              <a:t>or</a:t>
+            </a:r>
+            <a:r>
+              <a:rPr lang="fi-FI" dirty="0"/>
+              <a:t> .</a:t>
+            </a:r>
+            <a:r>
+              <a:rPr lang="fi-FI" dirty="0" err="1"/>
+              <a:t>env.local</a:t>
+            </a:r>
+            <a:r>
+              <a:rPr lang="fi-FI" dirty="0"/>
+              <a:t> </a:t>
+            </a:r>
+            <a:r>
+              <a:rPr lang="fi-FI" dirty="0" err="1"/>
+              <a:t>file</a:t>
+            </a:r>
+            <a:r>
+              <a:rPr lang="fi-FI" dirty="0"/>
+              <a:t> </a:t>
+            </a:r>
+            <a:r>
+              <a:rPr lang="fi-FI" dirty="0" err="1"/>
+              <a:t>location</a:t>
+            </a:r>
+            <a:r>
+              <a:rPr lang="fi-FI" dirty="0"/>
+              <a:t> and </a:t>
+            </a:r>
+            <a:r>
+              <a:rPr lang="fi-FI" dirty="0" err="1"/>
+              <a:t>model</a:t>
+            </a:r>
+            <a:r>
+              <a:rPr lang="fi-FI" dirty="0"/>
+              <a:t> </a:t>
+            </a:r>
+            <a:r>
+              <a:rPr lang="fi-FI" dirty="0" err="1"/>
+              <a:t>structure</a:t>
+            </a:r>
+            <a:r>
+              <a:rPr lang="fi-FI" dirty="0"/>
+              <a:t> </a:t>
+            </a:r>
+            <a:r>
+              <a:rPr lang="fi-FI" dirty="0" err="1"/>
+              <a:t>with</a:t>
+            </a:r>
+            <a:r>
+              <a:rPr lang="fi-FI" dirty="0"/>
+              <a:t> </a:t>
+            </a:r>
+            <a:r>
+              <a:rPr lang="fi-FI" dirty="0" err="1"/>
+              <a:t>fake</a:t>
+            </a:r>
+            <a:r>
+              <a:rPr lang="fi-FI" dirty="0"/>
+              <a:t> </a:t>
+            </a:r>
+            <a:r>
+              <a:rPr lang="fi-FI" dirty="0" err="1"/>
+              <a:t>values</a:t>
+            </a:r>
+            <a:endParaRPr lang="fi-FI" dirty="0"/>
+          </a:p>
+          <a:p>
             <a:r>
               <a:rPr lang="fi-FI" dirty="0" err="1"/>
               <a:t>Be</a:t>
@@ -9117,6 +9205,112 @@
           <a:p>
             <a:r>
               <a:rPr lang="fi-FI" dirty="0" err="1"/>
+              <a:t>Thus</a:t>
+            </a:r>
+            <a:r>
+              <a:rPr lang="fi-FI" dirty="0"/>
+              <a:t>: </a:t>
+            </a:r>
+            <a:r>
+              <a:rPr lang="fi-FI" dirty="0" err="1"/>
+              <a:t>Less</a:t>
+            </a:r>
+            <a:r>
+              <a:rPr lang="fi-FI" dirty="0"/>
+              <a:t> </a:t>
+            </a:r>
+            <a:r>
+              <a:rPr lang="fi-FI" dirty="0" err="1"/>
+              <a:t>detail</a:t>
+            </a:r>
+            <a:r>
+              <a:rPr lang="fi-FI" dirty="0"/>
+              <a:t> </a:t>
+            </a:r>
+            <a:r>
+              <a:rPr lang="fi-FI" dirty="0" err="1"/>
+              <a:t>than</a:t>
+            </a:r>
+            <a:r>
+              <a:rPr lang="fi-FI" dirty="0"/>
+              <a:t> </a:t>
+            </a:r>
+            <a:r>
+              <a:rPr lang="fi-FI" dirty="0" err="1"/>
+              <a:t>e.g</a:t>
+            </a:r>
+            <a:r>
+              <a:rPr lang="fi-FI" dirty="0"/>
+              <a:t>. in </a:t>
+            </a:r>
+            <a:r>
+              <a:rPr lang="fi-FI" dirty="0" err="1"/>
+              <a:t>exam</a:t>
+            </a:r>
+            <a:r>
+              <a:rPr lang="fi-FI" dirty="0"/>
+              <a:t> </a:t>
+            </a:r>
+            <a:r>
+              <a:rPr lang="fi-FI" dirty="0" err="1"/>
+              <a:t>question</a:t>
+            </a:r>
+            <a:r>
+              <a:rPr lang="fi-FI" dirty="0"/>
+              <a:t> </a:t>
+            </a:r>
+            <a:r>
+              <a:rPr lang="fi-FI" dirty="0" err="1"/>
+              <a:t>explaining</a:t>
+            </a:r>
+            <a:r>
+              <a:rPr lang="fi-FI" dirty="0"/>
+              <a:t> </a:t>
+            </a:r>
+            <a:r>
+              <a:rPr lang="fi-FI" dirty="0" err="1"/>
+              <a:t>the</a:t>
+            </a:r>
+            <a:r>
+              <a:rPr lang="fi-FI" dirty="0"/>
+              <a:t> </a:t>
+            </a:r>
+            <a:r>
+              <a:rPr lang="fi-FI" dirty="0" err="1"/>
+              <a:t>architecture</a:t>
+            </a:r>
+            <a:r>
+              <a:rPr lang="fi-FI" dirty="0"/>
+              <a:t>, </a:t>
+            </a:r>
+            <a:r>
+              <a:rPr lang="fi-FI" dirty="0" err="1"/>
+              <a:t>which</a:t>
+            </a:r>
+            <a:r>
+              <a:rPr lang="fi-FI" dirty="0"/>
+              <a:t> is </a:t>
+            </a:r>
+            <a:r>
+              <a:rPr lang="fi-FI" dirty="0" err="1"/>
+              <a:t>proof</a:t>
+            </a:r>
+            <a:r>
+              <a:rPr lang="fi-FI" dirty="0"/>
+              <a:t> of </a:t>
+            </a:r>
+            <a:r>
+              <a:rPr lang="fi-FI" dirty="0" err="1"/>
+              <a:t>learning</a:t>
+            </a:r>
+            <a:r>
+              <a:rPr lang="fi-FI" dirty="0"/>
+              <a:t>.</a:t>
+            </a:r>
+          </a:p>
+          <a:p>
+            <a:r>
+              <a:rPr lang="fi-FI" dirty="0" err="1"/>
               <a:t>Possible</a:t>
             </a:r>
             <a:r>
@@ -9140,7 +9334,7 @@
               <a:t>: </a:t>
             </a:r>
             <a:r>
-              <a:rPr lang="fi-FI" dirty="0" err="1"/>
+              <a:rPr lang="fi-FI" b="1" dirty="0" err="1"/>
               <a:t>Frontend</a:t>
             </a:r>
             <a:r>
@@ -9189,7 +9383,7 @@
             </a:r>
             <a:r>
               <a:rPr lang="fi-FI" dirty="0" err="1"/>
-              <a:t>routig</a:t>
+              <a:t>routing</a:t>
             </a:r>
             <a:r>
               <a:rPr lang="fi-FI" dirty="0"/>
@@ -9342,7 +9536,13 @@
             </a:r>
             <a:r>
               <a:rPr lang="fi-FI" dirty="0"/>
-              <a:t>. And </a:t>
+              <a:t>. </a:t>
+            </a:r>
+          </a:p>
+          <a:p>
+            <a:r>
+              <a:rPr lang="fi-FI" dirty="0"/>
+              <a:t>And </a:t>
             </a:r>
             <a:r>
               <a:rPr lang="fi-FI" dirty="0" err="1"/>
@@ -9638,7 +9838,7 @@
           <a:p>
             <a:r>
               <a:rPr lang="en-US" dirty="0"/>
-              <a:t>Many tools offer generation of diagrams based on SQL DML Create table statements. </a:t>
+              <a:t>Many tools offer generation of diagrams based on SQL DDL Create table statements. </a:t>
             </a:r>
           </a:p>
           <a:p>
@@ -9679,21 +9879,53 @@
           <a:p>
             <a:r>
               <a:rPr lang="en-US" dirty="0"/>
-              <a:t>In addition to generated database diagrams we need some data dictionary for: </a:t>
+              <a:t>In addition to generated database diagrams we need some </a:t>
+            </a:r>
+            <a:r>
+              <a:rPr lang="en-US" b="1" i="1" dirty="0"/>
+              <a:t>data dictionary </a:t>
+            </a:r>
+            <a:r>
+              <a:rPr lang="en-US" dirty="0"/>
+              <a:t>for: </a:t>
             </a:r>
           </a:p>
           <a:p>
             <a:pPr lvl="1"/>
             <a:r>
               <a:rPr lang="en-US" dirty="0"/>
-              <a:t>a) avoiding using lot of aliases in project documentation, code and UI </a:t>
+              <a:t>a) </a:t>
+            </a:r>
+            <a:r>
+              <a:rPr lang="en-US" u="sng" dirty="0"/>
+              <a:t>avoided aliases/synonyms </a:t>
+            </a:r>
+            <a:r>
+              <a:rPr lang="en-US" dirty="0"/>
+              <a:t>in project documentation, code and UI (customer, </a:t>
+            </a:r>
+            <a:r>
+              <a:rPr lang="en-US" strike="sngStrike" dirty="0"/>
+              <a:t>client, contact, lead</a:t>
+            </a:r>
+            <a:r>
+              <a:rPr lang="en-US" dirty="0"/>
+              <a:t>)</a:t>
             </a:r>
           </a:p>
           <a:p>
             <a:pPr lvl="1"/>
             <a:r>
               <a:rPr lang="en-US" dirty="0"/>
-              <a:t>b) agreeing on the units/limits etc. </a:t>
+              <a:t>b) agreeing on the units/limits etc.  </a:t>
+            </a:r>
+            <a:r>
+              <a:rPr lang="en-US" dirty="0" err="1"/>
+              <a:t>flightHeight</a:t>
+            </a:r>
+            <a:r>
+              <a:rPr lang="en-US" dirty="0"/>
+              <a:t>: ft? m? km?</a:t>
             </a:r>
           </a:p>
           <a:p>
@@ -9706,19 +9938,22 @@
           <a:p>
             <a:r>
               <a:rPr lang="en-US" dirty="0"/>
-              <a:t>Many databases offer the COMMENT ON feature of the SQL standard. Comments on tables and columns. </a:t>
-            </a:r>
-          </a:p>
-          <a:p>
+              <a:t>Many databases offer the </a:t>
+            </a:r>
+            <a:r>
+              <a:rPr lang="en-US" b="1" dirty="0"/>
+              <a:t>COMMENT ON </a:t>
+            </a:r>
             <a:r>
               <a:rPr lang="en-US" dirty="0"/>
-              <a:t>Then we could avoid having separate database documents? All generated </a:t>
-            </a:r>
-            <a:r>
-              <a:rPr lang="en-US"/>
-              <a:t>from scripts?</a:t>
-            </a:r>
-            <a:endParaRPr lang="en-US" dirty="0"/>
+              <a:t>feature of the SQL standard. Comments on tables and columns. </a:t>
+            </a:r>
+          </a:p>
+          <a:p>
+            <a:r>
+              <a:rPr lang="en-US" dirty="0"/>
+              <a:t>Then we could avoid having separate database documents? All generated from scripts?</a:t>
+            </a:r>
           </a:p>
         </p:txBody>
       </p:sp>
@@ -10054,24 +10289,87 @@
               <a:t> </a:t>
             </a:r>
             <a:r>
-              <a:rPr lang="fi-FI" dirty="0" err="1"/>
+              <a:rPr lang="fi-FI" b="1" dirty="0" err="1"/>
               <a:t>structure</a:t>
             </a:r>
+            <a:endParaRPr lang="fi-FI" b="1" dirty="0"/>
+          </a:p>
+          <a:p>
+            <a:pPr lvl="1"/>
+            <a:r>
+              <a:rPr lang="fi-FI" b="1" dirty="0" err="1"/>
+              <a:t>Naming</a:t>
+            </a:r>
+            <a:r>
+              <a:rPr lang="fi-FI" dirty="0"/>
+              <a:t>: </a:t>
+            </a:r>
+            <a:r>
+              <a:rPr lang="fi-FI" dirty="0" err="1"/>
+              <a:t>Folders</a:t>
+            </a:r>
+            <a:r>
+              <a:rPr lang="fi-FI" dirty="0"/>
+              <a:t>, </a:t>
+            </a:r>
+            <a:r>
+              <a:rPr lang="fi-FI" dirty="0" err="1"/>
+              <a:t>files</a:t>
+            </a:r>
+            <a:r>
+              <a:rPr lang="fi-FI" dirty="0"/>
+              <a:t>, </a:t>
+            </a:r>
+            <a:r>
+              <a:rPr lang="fi-FI" dirty="0" err="1"/>
+              <a:t>classes</a:t>
+            </a:r>
+            <a:r>
+              <a:rPr lang="fi-FI" dirty="0"/>
+              <a:t>, </a:t>
+            </a:r>
+            <a:r>
+              <a:rPr lang="fi-FI" dirty="0" err="1"/>
+              <a:t>modules</a:t>
+            </a:r>
+            <a:r>
+              <a:rPr lang="fi-FI" dirty="0"/>
+              <a:t>, </a:t>
+            </a:r>
+            <a:r>
+              <a:rPr lang="fi-FI" dirty="0" err="1"/>
+              <a:t>functions</a:t>
+            </a:r>
+            <a:r>
+              <a:rPr lang="fi-FI" dirty="0"/>
+              <a:t>, </a:t>
+            </a:r>
+            <a:r>
+              <a:rPr lang="fi-FI" dirty="0" err="1"/>
+              <a:t>variables</a:t>
+            </a:r>
+            <a:r>
+              <a:rPr lang="fi-FI" dirty="0"/>
+              <a:t>, </a:t>
+            </a:r>
+            <a:r>
+              <a:rPr lang="fi-FI" dirty="0" err="1"/>
+              <a:t>attributes</a:t>
+            </a:r>
+            <a:r>
+              <a:rPr lang="fi-FI" dirty="0"/>
+              <a:t> of </a:t>
+            </a:r>
+            <a:r>
+              <a:rPr lang="fi-FI" dirty="0" err="1"/>
+              <a:t>objects</a:t>
+            </a:r>
             <a:endParaRPr lang="fi-FI" dirty="0"/>
           </a:p>
           <a:p>
-            <a:pPr lvl="1"/>
-            <a:r>
-              <a:rPr lang="fi-FI" dirty="0" err="1"/>
-              <a:t>Naming</a:t>
-            </a:r>
-            <a:r>
-              <a:rPr lang="fi-FI" dirty="0"/>
-              <a:t>: </a:t>
-            </a:r>
-            <a:r>
-              <a:rPr lang="fi-FI" dirty="0" err="1"/>
-              <a:t>Folders</a:t>
+            <a:r>
+              <a:rPr lang="fi-FI" dirty="0" err="1"/>
+              <a:t>Then</a:t>
             </a:r>
             <a:r>
               <a:rPr lang="fi-FI" dirty="0"/>
@@ -10079,7 +10377,23 @@
             </a:r>
             <a:r>
               <a:rPr lang="fi-FI" dirty="0" err="1"/>
-              <a:t>files</a:t>
+              <a:t>if</a:t>
+            </a:r>
+            <a:r>
+              <a:rPr lang="fi-FI" dirty="0"/>
+              <a:t> </a:t>
+            </a:r>
+            <a:r>
+              <a:rPr lang="fi-FI" dirty="0" err="1"/>
+              <a:t>still</a:t>
+            </a:r>
+            <a:r>
+              <a:rPr lang="fi-FI" dirty="0"/>
+              <a:t> </a:t>
+            </a:r>
+            <a:r>
+              <a:rPr lang="fi-FI" dirty="0" err="1"/>
+              <a:t>needed</a:t>
             </a:r>
             <a:r>
               <a:rPr lang="fi-FI" dirty="0"/>
@@ -10087,7 +10401,23 @@
             </a:r>
             <a:r>
               <a:rPr lang="fi-FI" dirty="0" err="1"/>
-              <a:t>classes</a:t>
+              <a:t>explain</a:t>
+            </a:r>
+            <a:r>
+              <a:rPr lang="fi-FI" dirty="0"/>
+              <a:t> </a:t>
+            </a:r>
+            <a:r>
+              <a:rPr lang="fi-FI" dirty="0" err="1"/>
+              <a:t>the</a:t>
+            </a:r>
+            <a:r>
+              <a:rPr lang="fi-FI" dirty="0"/>
+              <a:t> </a:t>
+            </a:r>
+            <a:r>
+              <a:rPr lang="fi-FI" dirty="0" err="1"/>
+              <a:t>confusing</a:t>
             </a:r>
             <a:r>
               <a:rPr lang="fi-FI" dirty="0"/>
@@ -10095,7 +10425,142 @@
             </a:r>
             <a:r>
               <a:rPr lang="fi-FI" dirty="0" err="1"/>
-              <a:t>modules</a:t>
+              <a:t>irregular</a:t>
+            </a:r>
+            <a:r>
+              <a:rPr lang="fi-FI" dirty="0"/>
+              <a:t>/</a:t>
+            </a:r>
+            <a:r>
+              <a:rPr lang="fi-FI" dirty="0" err="1"/>
+              <a:t>unconventional</a:t>
+            </a:r>
+            <a:r>
+              <a:rPr lang="fi-FI" dirty="0"/>
+              <a:t>/ </a:t>
+            </a:r>
+            <a:r>
+              <a:rPr lang="fi-FI" dirty="0" err="1"/>
+              <a:t>or</a:t>
+            </a:r>
+            <a:r>
+              <a:rPr lang="fi-FI" dirty="0"/>
+              <a:t> </a:t>
+            </a:r>
+            <a:r>
+              <a:rPr lang="fi-FI" dirty="0" err="1"/>
+              <a:t>complicated</a:t>
+            </a:r>
+            <a:r>
+              <a:rPr lang="fi-FI" dirty="0"/>
+              <a:t> </a:t>
+            </a:r>
+            <a:r>
+              <a:rPr lang="fi-FI" dirty="0" err="1"/>
+              <a:t>parts</a:t>
+            </a:r>
+            <a:r>
+              <a:rPr lang="fi-FI" dirty="0"/>
+              <a:t> </a:t>
+            </a:r>
+            <a:r>
+              <a:rPr lang="fi-FI" dirty="0" err="1"/>
+              <a:t>only</a:t>
+            </a:r>
+            <a:endParaRPr lang="fi-FI" dirty="0"/>
+          </a:p>
+          <a:p>
+            <a:r>
+              <a:rPr lang="fi-FI" dirty="0" err="1"/>
+              <a:t>Less</a:t>
+            </a:r>
+            <a:r>
+              <a:rPr lang="fi-FI" dirty="0"/>
+              <a:t> is </a:t>
+            </a:r>
+            <a:r>
+              <a:rPr lang="fi-FI" dirty="0" err="1"/>
+              <a:t>more</a:t>
+            </a:r>
+            <a:r>
+              <a:rPr lang="fi-FI" dirty="0"/>
+              <a:t>. </a:t>
+            </a:r>
+            <a:r>
+              <a:rPr lang="fi-FI" dirty="0" err="1"/>
+              <a:t>Quality</a:t>
+            </a:r>
+            <a:r>
+              <a:rPr lang="fi-FI" dirty="0"/>
+              <a:t> </a:t>
+            </a:r>
+            <a:r>
+              <a:rPr lang="fi-FI" dirty="0" err="1"/>
+              <a:t>over</a:t>
+            </a:r>
+            <a:r>
+              <a:rPr lang="fi-FI" dirty="0"/>
+              <a:t> </a:t>
+            </a:r>
+            <a:r>
+              <a:rPr lang="fi-FI" dirty="0" err="1"/>
+              <a:t>quantity</a:t>
+            </a:r>
+            <a:r>
+              <a:rPr lang="fi-FI" dirty="0"/>
+              <a:t>. </a:t>
+            </a:r>
+            <a:r>
+              <a:rPr lang="fi-FI" dirty="0" err="1"/>
+              <a:t>Think</a:t>
+            </a:r>
+            <a:r>
+              <a:rPr lang="fi-FI" dirty="0"/>
+              <a:t> </a:t>
+            </a:r>
+            <a:r>
+              <a:rPr lang="fi-FI" dirty="0" err="1"/>
+              <a:t>from</a:t>
+            </a:r>
+            <a:r>
+              <a:rPr lang="fi-FI" dirty="0"/>
+              <a:t> </a:t>
+            </a:r>
+            <a:r>
+              <a:rPr lang="fi-FI" dirty="0" err="1"/>
+              <a:t>reader’s</a:t>
+            </a:r>
+            <a:r>
+              <a:rPr lang="fi-FI" dirty="0"/>
+              <a:t> </a:t>
+            </a:r>
+            <a:r>
+              <a:rPr lang="fi-FI" dirty="0" err="1"/>
+              <a:t>point</a:t>
+            </a:r>
+            <a:r>
+              <a:rPr lang="fi-FI" dirty="0"/>
+              <a:t> of </a:t>
+            </a:r>
+            <a:r>
+              <a:rPr lang="fi-FI" dirty="0" err="1"/>
+              <a:t>view</a:t>
+            </a:r>
+            <a:r>
+              <a:rPr lang="fi-FI" dirty="0"/>
+              <a:t> and </a:t>
+            </a:r>
+            <a:r>
+              <a:rPr lang="fi-FI" dirty="0" err="1"/>
+              <a:t>starting</a:t>
+            </a:r>
+            <a:r>
+              <a:rPr lang="fi-FI" dirty="0"/>
+              <a:t> </a:t>
+            </a:r>
+            <a:r>
+              <a:rPr lang="fi-FI" dirty="0" err="1"/>
+              <a:t>point</a:t>
             </a:r>
             <a:r>
               <a:rPr lang="fi-FI" dirty="0"/>
@@ -10103,7 +10568,49 @@
             </a:r>
             <a:r>
               <a:rPr lang="fi-FI" dirty="0" err="1"/>
-              <a:t>functions</a:t>
+              <a:t>not</a:t>
+            </a:r>
+            <a:r>
+              <a:rPr lang="fi-FI" dirty="0"/>
+              <a:t> </a:t>
+            </a:r>
+            <a:r>
+              <a:rPr lang="fi-FI" dirty="0" err="1"/>
+              <a:t>yours</a:t>
+            </a:r>
+            <a:r>
+              <a:rPr lang="fi-FI" dirty="0"/>
+              <a:t>.</a:t>
+            </a:r>
+          </a:p>
+          <a:p>
+            <a:r>
+              <a:rPr lang="fi-FI" dirty="0" err="1"/>
+              <a:t>Try</a:t>
+            </a:r>
+            <a:r>
+              <a:rPr lang="fi-FI" dirty="0"/>
+              <a:t> to </a:t>
+            </a:r>
+            <a:r>
+              <a:rPr lang="fi-FI" dirty="0" err="1"/>
+              <a:t>understand</a:t>
+            </a:r>
+            <a:r>
+              <a:rPr lang="fi-FI" dirty="0"/>
+              <a:t> </a:t>
+            </a:r>
+            <a:r>
+              <a:rPr lang="fi-FI" dirty="0" err="1"/>
+              <a:t>thing</a:t>
+            </a:r>
+            <a:r>
+              <a:rPr lang="fi-FI" dirty="0"/>
+              <a:t> </a:t>
+            </a:r>
+            <a:r>
+              <a:rPr lang="fi-FI" dirty="0" err="1"/>
+              <a:t>incorrectly</a:t>
             </a:r>
             <a:r>
               <a:rPr lang="fi-FI" dirty="0"/>
@@ -10111,7 +10618,15 @@
             </a:r>
             <a:r>
               <a:rPr lang="fi-FI" dirty="0" err="1"/>
-              <a:t>variables</a:t>
+              <a:t>if</a:t>
+            </a:r>
+            <a:r>
+              <a:rPr lang="fi-FI" dirty="0"/>
+              <a:t> </a:t>
+            </a:r>
+            <a:r>
+              <a:rPr lang="fi-FI" dirty="0" err="1"/>
+              <a:t>possible</a:t>
             </a:r>
             <a:r>
               <a:rPr lang="fi-FI" dirty="0"/>
@@ -10119,22 +10634,49 @@
             </a:r>
             <a:r>
               <a:rPr lang="fi-FI" dirty="0" err="1"/>
-              <a:t>attributes</a:t>
-            </a:r>
-            <a:r>
-              <a:rPr lang="fi-FI" dirty="0"/>
-              <a:t> of </a:t>
-            </a:r>
-            <a:r>
-              <a:rPr lang="fi-FI" dirty="0" err="1"/>
-              <a:t>objects</a:t>
-            </a:r>
-            <a:endParaRPr lang="fi-FI" dirty="0"/>
-          </a:p>
-          <a:p>
-            <a:r>
-              <a:rPr lang="fi-FI" dirty="0" err="1"/>
-              <a:t>Then</a:t>
+              <a:t>improve</a:t>
+            </a:r>
+            <a:r>
+              <a:rPr lang="fi-FI" dirty="0"/>
+              <a:t>.</a:t>
+            </a:r>
+          </a:p>
+          <a:p>
+            <a:r>
+              <a:rPr lang="fi-FI" dirty="0" err="1"/>
+              <a:t>Sometimes</a:t>
+            </a:r>
+            <a:r>
+              <a:rPr lang="fi-FI" dirty="0"/>
+              <a:t> </a:t>
+            </a:r>
+            <a:r>
+              <a:rPr lang="fi-FI" dirty="0" err="1"/>
+              <a:t>writing</a:t>
+            </a:r>
+            <a:r>
+              <a:rPr lang="fi-FI" dirty="0"/>
+              <a:t> </a:t>
+            </a:r>
+            <a:r>
+              <a:rPr lang="fi-FI" dirty="0" err="1"/>
+              <a:t>longer</a:t>
+            </a:r>
+            <a:r>
+              <a:rPr lang="fi-FI" dirty="0"/>
+              <a:t> </a:t>
+            </a:r>
+            <a:r>
+              <a:rPr lang="fi-FI" dirty="0" err="1"/>
+              <a:t>code</a:t>
+            </a:r>
+            <a:r>
+              <a:rPr lang="fi-FI" dirty="0"/>
+              <a:t> </a:t>
+            </a:r>
+            <a:r>
+              <a:rPr lang="fi-FI" dirty="0" err="1"/>
+              <a:t>helps</a:t>
             </a:r>
             <a:r>
               <a:rPr lang="fi-FI" dirty="0"/>
@@ -10142,23 +10684,23 @@
             </a:r>
             <a:r>
               <a:rPr lang="fi-FI" dirty="0" err="1"/>
-              <a:t>if</a:t>
-            </a:r>
-            <a:r>
-              <a:rPr lang="fi-FI" dirty="0"/>
-              <a:t> </a:t>
-            </a:r>
-            <a:r>
-              <a:rPr lang="fi-FI" dirty="0" err="1"/>
-              <a:t>still</a:t>
-            </a:r>
-            <a:r>
-              <a:rPr lang="fi-FI" dirty="0"/>
-              <a:t> </a:t>
-            </a:r>
-            <a:r>
-              <a:rPr lang="fi-FI" dirty="0" err="1"/>
-              <a:t>needed</a:t>
+              <a:t>optimize</a:t>
+            </a:r>
+            <a:r>
+              <a:rPr lang="fi-FI" dirty="0"/>
+              <a:t> </a:t>
+            </a:r>
+            <a:r>
+              <a:rPr lang="fi-FI" dirty="0" err="1"/>
+              <a:t>reading</a:t>
+            </a:r>
+            <a:r>
+              <a:rPr lang="fi-FI" dirty="0"/>
+              <a:t> </a:t>
+            </a:r>
+            <a:r>
+              <a:rPr lang="fi-FI" dirty="0" err="1"/>
+              <a:t>speed</a:t>
             </a:r>
             <a:r>
               <a:rPr lang="fi-FI" dirty="0"/>
@@ -10166,15 +10708,7 @@
             </a:r>
             <a:r>
               <a:rPr lang="fi-FI" dirty="0" err="1"/>
-              <a:t>only</a:t>
-            </a:r>
-            <a:r>
-              <a:rPr lang="fi-FI" dirty="0"/>
-              <a:t> </a:t>
-            </a:r>
-            <a:r>
-              <a:rPr lang="fi-FI" dirty="0" err="1"/>
-              <a:t>explain</a:t>
+              <a:t>never</a:t>
             </a:r>
             <a:r>
               <a:rPr lang="fi-FI" dirty="0"/>
@@ -10190,62 +10724,25 @@
             </a:r>
             <a:r>
               <a:rPr lang="fi-FI" dirty="0" err="1"/>
-              <a:t>confusing</a:t>
-            </a:r>
-            <a:r>
-              <a:rPr lang="fi-FI" dirty="0"/>
-              <a:t>, </a:t>
-            </a:r>
-            <a:r>
-              <a:rPr lang="fi-FI" dirty="0" err="1"/>
-              <a:t>irregular</a:t>
-            </a:r>
-            <a:r>
-              <a:rPr lang="fi-FI" dirty="0"/>
-              <a:t>/</a:t>
-            </a:r>
-            <a:r>
-              <a:rPr lang="fi-FI" dirty="0" err="1"/>
-              <a:t>unconventional</a:t>
-            </a:r>
-            <a:r>
-              <a:rPr lang="fi-FI" dirty="0"/>
-              <a:t>/ </a:t>
-            </a:r>
-            <a:r>
-              <a:rPr lang="fi-FI" dirty="0" err="1"/>
-              <a:t>or</a:t>
-            </a:r>
-            <a:r>
-              <a:rPr lang="fi-FI" dirty="0"/>
-              <a:t> </a:t>
-            </a:r>
-            <a:r>
-              <a:rPr lang="fi-FI" dirty="0" err="1"/>
-              <a:t>complicated</a:t>
-            </a:r>
-            <a:r>
-              <a:rPr lang="fi-FI" dirty="0"/>
-              <a:t> </a:t>
-            </a:r>
-            <a:r>
-              <a:rPr lang="fi-FI" dirty="0" err="1"/>
-              <a:t>parts</a:t>
-            </a:r>
-            <a:endParaRPr lang="fi-FI" dirty="0"/>
-          </a:p>
-          <a:p>
-            <a:r>
-              <a:rPr lang="fi-FI" dirty="0" err="1"/>
-              <a:t>Less</a:t>
-            </a:r>
-            <a:r>
-              <a:rPr lang="fi-FI" dirty="0"/>
-              <a:t> is </a:t>
-            </a:r>
-            <a:r>
-              <a:rPr lang="fi-FI" dirty="0" err="1"/>
-              <a:t>more</a:t>
+              <a:t>writing</a:t>
+            </a:r>
+            <a:r>
+              <a:rPr lang="fi-FI" dirty="0"/>
+              <a:t> </a:t>
+            </a:r>
+            <a:r>
+              <a:rPr lang="fi-FI" dirty="0" err="1"/>
+              <a:t>speed</a:t>
+            </a:r>
+            <a:r>
+              <a:rPr lang="fi-FI" dirty="0"/>
+              <a:t>.</a:t>
+            </a:r>
+          </a:p>
+          <a:p>
+            <a:r>
+              <a:rPr lang="fi-FI" dirty="0" err="1"/>
+              <a:t>E.g</a:t>
             </a:r>
             <a:r>
               <a:rPr lang="fi-FI" dirty="0"/>
@@ -10253,31 +10750,7 @@
             </a:r>
             <a:r>
               <a:rPr lang="fi-FI" dirty="0" err="1"/>
-              <a:t>Quality</a:t>
-            </a:r>
-            <a:r>
-              <a:rPr lang="fi-FI" dirty="0"/>
-              <a:t> </a:t>
-            </a:r>
-            <a:r>
-              <a:rPr lang="fi-FI" dirty="0" err="1"/>
-              <a:t>over</a:t>
-            </a:r>
-            <a:r>
-              <a:rPr lang="fi-FI" dirty="0"/>
-              <a:t> </a:t>
-            </a:r>
-            <a:r>
-              <a:rPr lang="fi-FI" dirty="0" err="1"/>
-              <a:t>quantity</a:t>
-            </a:r>
-            <a:r>
-              <a:rPr lang="fi-FI" dirty="0"/>
-              <a:t>. </a:t>
-            </a:r>
-            <a:r>
-              <a:rPr lang="fi-FI" dirty="0" err="1"/>
-              <a:t>Think</a:t>
+              <a:t>changing</a:t>
             </a:r>
             <a:r>
               <a:rPr lang="fi-FI" dirty="0"/>
@@ -10293,183 +10766,15 @@
             </a:r>
             <a:r>
               <a:rPr lang="fi-FI" dirty="0" err="1"/>
-              <a:t>reader’s</a:t>
-            </a:r>
-            <a:r>
-              <a:rPr lang="fi-FI" dirty="0"/>
-              <a:t> </a:t>
-            </a:r>
-            <a:r>
-              <a:rPr lang="fi-FI" dirty="0" err="1"/>
-              <a:t>point</a:t>
-            </a:r>
-            <a:r>
-              <a:rPr lang="fi-FI" dirty="0"/>
-              <a:t> of </a:t>
-            </a:r>
-            <a:r>
-              <a:rPr lang="fi-FI" dirty="0" err="1"/>
-              <a:t>view</a:t>
-            </a:r>
-            <a:r>
-              <a:rPr lang="fi-FI" dirty="0"/>
-              <a:t> and </a:t>
-            </a:r>
-            <a:r>
-              <a:rPr lang="fi-FI" dirty="0" err="1"/>
-              <a:t>starting</a:t>
-            </a:r>
-            <a:r>
-              <a:rPr lang="fi-FI" dirty="0"/>
-              <a:t> </a:t>
-            </a:r>
-            <a:r>
-              <a:rPr lang="fi-FI" dirty="0" err="1"/>
-              <a:t>point</a:t>
-            </a:r>
-            <a:r>
-              <a:rPr lang="fi-FI" dirty="0"/>
-              <a:t>, </a:t>
-            </a:r>
-            <a:r>
-              <a:rPr lang="fi-FI" dirty="0" err="1"/>
-              <a:t>not</a:t>
-            </a:r>
-            <a:r>
-              <a:rPr lang="fi-FI" dirty="0"/>
-              <a:t> </a:t>
-            </a:r>
-            <a:r>
-              <a:rPr lang="fi-FI" dirty="0" err="1"/>
-              <a:t>yours</a:t>
-            </a:r>
-            <a:r>
-              <a:rPr lang="fi-FI" dirty="0"/>
-              <a:t>.</a:t>
-            </a:r>
-          </a:p>
-          <a:p>
-            <a:r>
-              <a:rPr lang="fi-FI" dirty="0" err="1"/>
-              <a:t>Sometimes</a:t>
-            </a:r>
-            <a:r>
-              <a:rPr lang="fi-FI" dirty="0"/>
-              <a:t> </a:t>
-            </a:r>
-            <a:r>
-              <a:rPr lang="fi-FI" dirty="0" err="1"/>
-              <a:t>writing</a:t>
-            </a:r>
-            <a:r>
-              <a:rPr lang="fi-FI" dirty="0"/>
-              <a:t> </a:t>
-            </a:r>
-            <a:r>
-              <a:rPr lang="fi-FI" dirty="0" err="1"/>
-              <a:t>longer</a:t>
-            </a:r>
-            <a:r>
-              <a:rPr lang="fi-FI" dirty="0"/>
-              <a:t> </a:t>
-            </a:r>
-            <a:r>
-              <a:rPr lang="fi-FI" dirty="0" err="1"/>
-              <a:t>code</a:t>
-            </a:r>
-            <a:r>
-              <a:rPr lang="fi-FI" dirty="0"/>
-              <a:t> </a:t>
-            </a:r>
-            <a:r>
-              <a:rPr lang="fi-FI" dirty="0" err="1"/>
-              <a:t>helps</a:t>
-            </a:r>
-            <a:r>
-              <a:rPr lang="fi-FI" dirty="0"/>
-              <a:t>, </a:t>
-            </a:r>
-            <a:r>
-              <a:rPr lang="fi-FI" dirty="0" err="1"/>
-              <a:t>optimize</a:t>
-            </a:r>
-            <a:r>
-              <a:rPr lang="fi-FI" dirty="0"/>
-              <a:t> </a:t>
-            </a:r>
-            <a:r>
-              <a:rPr lang="fi-FI" dirty="0" err="1"/>
-              <a:t>reading</a:t>
-            </a:r>
-            <a:r>
-              <a:rPr lang="fi-FI" dirty="0"/>
-              <a:t> </a:t>
-            </a:r>
-            <a:r>
-              <a:rPr lang="fi-FI" dirty="0" err="1"/>
-              <a:t>speed</a:t>
-            </a:r>
-            <a:r>
-              <a:rPr lang="fi-FI" dirty="0"/>
-              <a:t>, </a:t>
-            </a:r>
-            <a:r>
-              <a:rPr lang="fi-FI" dirty="0" err="1"/>
-              <a:t>never</a:t>
-            </a:r>
-            <a:r>
-              <a:rPr lang="fi-FI" dirty="0"/>
-              <a:t> </a:t>
-            </a:r>
-            <a:r>
-              <a:rPr lang="fi-FI" dirty="0" err="1"/>
-              <a:t>writing</a:t>
-            </a:r>
-            <a:r>
-              <a:rPr lang="fi-FI" dirty="0"/>
-              <a:t> </a:t>
-            </a:r>
-            <a:r>
-              <a:rPr lang="fi-FI" dirty="0" err="1"/>
-              <a:t>speed</a:t>
-            </a:r>
-            <a:r>
-              <a:rPr lang="fi-FI" dirty="0"/>
-              <a:t>.</a:t>
-            </a:r>
-          </a:p>
-          <a:p>
-            <a:r>
-              <a:rPr lang="fi-FI" dirty="0" err="1"/>
-              <a:t>E.g</a:t>
-            </a:r>
-            <a:r>
-              <a:rPr lang="fi-FI" dirty="0"/>
-              <a:t>. </a:t>
-            </a:r>
-            <a:r>
-              <a:rPr lang="fi-FI" dirty="0" err="1"/>
-              <a:t>changing</a:t>
-            </a:r>
-            <a:r>
-              <a:rPr lang="fi-FI" dirty="0"/>
-              <a:t> </a:t>
-            </a:r>
-            <a:r>
-              <a:rPr lang="fi-FI" dirty="0" err="1"/>
-              <a:t>from</a:t>
-            </a:r>
-            <a:r>
-              <a:rPr lang="fi-FI" dirty="0"/>
-              <a:t> </a:t>
-            </a:r>
-            <a:r>
-              <a:rPr lang="fi-FI" dirty="0" err="1"/>
               <a:t>the</a:t>
             </a:r>
             <a:r>
               <a:rPr lang="fi-FI" dirty="0"/>
-              <a:t> a ? b : c </a:t>
+              <a:t> </a:t>
+            </a:r>
+            <a:r>
+              <a:rPr lang="fi-FI" b="1" dirty="0"/>
+              <a:t>a ? b : c </a:t>
             </a:r>
             <a:r>
               <a:rPr lang="fi-FI" dirty="0" err="1"/>
@@ -10488,7 +10793,7 @@
               <a:t> to </a:t>
             </a:r>
             <a:r>
-              <a:rPr lang="fi-FI" dirty="0" err="1"/>
+              <a:rPr lang="fi-FI" b="1" dirty="0" err="1"/>
               <a:t>if-else</a:t>
             </a:r>
             <a:r>
@@ -10800,7 +11105,7 @@
             </a:r>
             <a:r>
               <a:rPr lang="fi-FI" dirty="0" err="1"/>
-              <a:t>making</a:t>
+              <a:t>generating</a:t>
             </a:r>
             <a:r>
               <a:rPr lang="fi-FI" dirty="0"/>
@@ -10828,62 +11133,279 @@
             </a:r>
             <a:r>
               <a:rPr lang="fi-FI" dirty="0"/>
-              <a:t> API </a:t>
-            </a:r>
-            <a:r>
-              <a:rPr lang="fi-FI" dirty="0" err="1"/>
-              <a:t>code</a:t>
+              <a:t> API (</a:t>
+            </a:r>
+            <a:r>
+              <a:rPr lang="fi-FI" dirty="0" err="1"/>
+              <a:t>the</a:t>
+            </a:r>
+            <a:r>
+              <a:rPr lang="fi-FI" dirty="0"/>
+              <a:t> </a:t>
+            </a:r>
+            <a:r>
+              <a:rPr lang="fi-FI" dirty="0" err="1"/>
+              <a:t>interface</a:t>
+            </a:r>
+            <a:r>
+              <a:rPr lang="fi-FI" dirty="0"/>
+              <a:t>)</a:t>
+            </a:r>
+          </a:p>
+          <a:p>
+            <a:r>
+              <a:rPr lang="fi-FI" dirty="0" err="1"/>
+              <a:t>We</a:t>
+            </a:r>
+            <a:r>
+              <a:rPr lang="fi-FI" dirty="0"/>
+              <a:t> just </a:t>
+            </a:r>
+            <a:r>
+              <a:rPr lang="fi-FI" dirty="0" err="1"/>
+              <a:t>need</a:t>
+            </a:r>
+            <a:r>
+              <a:rPr lang="fi-FI" dirty="0"/>
+              <a:t> to </a:t>
+            </a:r>
+            <a:r>
+              <a:rPr lang="fi-FI" dirty="0" err="1"/>
+              <a:t>add</a:t>
+            </a:r>
+            <a:r>
+              <a:rPr lang="fi-FI" dirty="0"/>
+              <a:t> </a:t>
+            </a:r>
+            <a:r>
+              <a:rPr lang="fi-FI" dirty="0" err="1"/>
+              <a:t>possible</a:t>
+            </a:r>
+            <a:r>
+              <a:rPr lang="fi-FI" dirty="0"/>
+              <a:t> </a:t>
+            </a:r>
+            <a:r>
+              <a:rPr lang="fi-FI" dirty="0" err="1"/>
+              <a:t>commentation</a:t>
+            </a:r>
+            <a:r>
+              <a:rPr lang="fi-FI" dirty="0"/>
+              <a:t> as some </a:t>
+            </a:r>
+            <a:r>
+              <a:rPr lang="fi-FI" dirty="0" err="1"/>
+              <a:t>kind</a:t>
+            </a:r>
+            <a:r>
+              <a:rPr lang="fi-FI" dirty="0"/>
+              <a:t> of </a:t>
+            </a:r>
+            <a:r>
+              <a:rPr lang="fi-FI" dirty="0" err="1"/>
+              <a:t>annotation</a:t>
+            </a:r>
+            <a:r>
+              <a:rPr lang="fi-FI" dirty="0"/>
+              <a:t> </a:t>
+            </a:r>
+            <a:r>
+              <a:rPr lang="fi-FI" dirty="0" err="1"/>
+              <a:t>or</a:t>
+            </a:r>
+            <a:r>
+              <a:rPr lang="fi-FI" dirty="0"/>
+              <a:t> </a:t>
+            </a:r>
+            <a:r>
+              <a:rPr lang="fi-FI" dirty="0" err="1"/>
+              <a:t>javadoc-kind</a:t>
+            </a:r>
+            <a:r>
+              <a:rPr lang="fi-FI" dirty="0"/>
+              <a:t> of </a:t>
+            </a:r>
+            <a:r>
+              <a:rPr lang="fi-FI" dirty="0" err="1"/>
+              <a:t>comments</a:t>
             </a:r>
             <a:endParaRPr lang="fi-FI" dirty="0"/>
           </a:p>
           <a:p>
-            <a:r>
-              <a:rPr lang="fi-FI" dirty="0" err="1"/>
-              <a:t>We</a:t>
-            </a:r>
-            <a:r>
-              <a:rPr lang="fi-FI" dirty="0"/>
-              <a:t> just </a:t>
-            </a:r>
-            <a:r>
-              <a:rPr lang="fi-FI" dirty="0" err="1"/>
-              <a:t>need</a:t>
-            </a:r>
-            <a:r>
-              <a:rPr lang="fi-FI" dirty="0"/>
-              <a:t> to </a:t>
-            </a:r>
-            <a:r>
-              <a:rPr lang="fi-FI" dirty="0" err="1"/>
-              <a:t>add</a:t>
-            </a:r>
-            <a:r>
-              <a:rPr lang="fi-FI" dirty="0"/>
-              <a:t> </a:t>
-            </a:r>
-            <a:r>
-              <a:rPr lang="fi-FI" dirty="0" err="1"/>
-              <a:t>possible</a:t>
-            </a:r>
-            <a:r>
-              <a:rPr lang="fi-FI" dirty="0"/>
-              <a:t> </a:t>
-            </a:r>
-            <a:r>
-              <a:rPr lang="fi-FI" dirty="0" err="1"/>
-              <a:t>commentation</a:t>
-            </a:r>
-            <a:r>
-              <a:rPr lang="fi-FI" dirty="0"/>
-              <a:t> as some </a:t>
-            </a:r>
-            <a:r>
-              <a:rPr lang="fi-FI" dirty="0" err="1"/>
-              <a:t>kind</a:t>
-            </a:r>
-            <a:r>
-              <a:rPr lang="fi-FI" dirty="0"/>
-              <a:t> of </a:t>
+            <a:pPr lvl="1"/>
+            <a:r>
+              <a:rPr lang="fi-FI" dirty="0"/>
+              <a:t>(</a:t>
+            </a:r>
+            <a:r>
+              <a:rPr lang="fi-FI" dirty="0" err="1"/>
+              <a:t>Javadoc</a:t>
+            </a:r>
+            <a:r>
+              <a:rPr lang="fi-FI" dirty="0"/>
+              <a:t>: Write </a:t>
+            </a:r>
+            <a:r>
+              <a:rPr lang="fi-FI" dirty="0" err="1"/>
+              <a:t>comments</a:t>
+            </a:r>
+            <a:r>
+              <a:rPr lang="fi-FI" dirty="0"/>
+              <a:t> on </a:t>
+            </a:r>
+            <a:r>
+              <a:rPr lang="fi-FI" dirty="0" err="1"/>
+              <a:t>certain</a:t>
+            </a:r>
+            <a:r>
+              <a:rPr lang="fi-FI" dirty="0"/>
+              <a:t> </a:t>
+            </a:r>
+            <a:r>
+              <a:rPr lang="fi-FI" dirty="0" err="1"/>
+              <a:t>style</a:t>
+            </a:r>
+            <a:r>
+              <a:rPr lang="fi-FI" dirty="0"/>
+              <a:t> and </a:t>
+            </a:r>
+            <a:r>
+              <a:rPr lang="fi-FI" dirty="0" err="1"/>
+              <a:t>they</a:t>
+            </a:r>
+            <a:r>
+              <a:rPr lang="fi-FI" dirty="0"/>
+              <a:t> go to </a:t>
+            </a:r>
+            <a:r>
+              <a:rPr lang="fi-FI" dirty="0" err="1"/>
+              <a:t>the</a:t>
+            </a:r>
+            <a:r>
+              <a:rPr lang="fi-FI" dirty="0"/>
+              <a:t> </a:t>
+            </a:r>
+            <a:r>
+              <a:rPr lang="fi-FI" dirty="0" err="1"/>
+              <a:t>javadoc</a:t>
+            </a:r>
+            <a:r>
+              <a:rPr lang="fi-FI" dirty="0"/>
+              <a:t> </a:t>
+            </a:r>
+            <a:r>
+              <a:rPr lang="fi-FI" dirty="0" err="1"/>
+              <a:t>tool</a:t>
+            </a:r>
+            <a:r>
+              <a:rPr lang="fi-FI" dirty="0"/>
+              <a:t> </a:t>
+            </a:r>
+            <a:r>
+              <a:rPr lang="fi-FI" dirty="0" err="1"/>
+              <a:t>generated</a:t>
+            </a:r>
+            <a:r>
+              <a:rPr lang="fi-FI" dirty="0"/>
+              <a:t> HTML etc. </a:t>
+            </a:r>
+            <a:r>
+              <a:rPr lang="fi-FI" dirty="0" err="1"/>
+              <a:t>Documentation</a:t>
+            </a:r>
+            <a:r>
+              <a:rPr lang="fi-FI" dirty="0"/>
+              <a:t>)</a:t>
+            </a:r>
+          </a:p>
+          <a:p>
+            <a:pPr lvl="1"/>
+            <a:r>
+              <a:rPr lang="fi-FI" dirty="0"/>
+              <a:t>Microsoft </a:t>
+            </a:r>
+            <a:r>
+              <a:rPr lang="fi-FI" dirty="0" err="1"/>
+              <a:t>had</a:t>
+            </a:r>
+            <a:r>
+              <a:rPr lang="fi-FI" dirty="0"/>
+              <a:t> </a:t>
+            </a:r>
+            <a:r>
+              <a:rPr lang="fi-FI" dirty="0" err="1"/>
+              <a:t>similar</a:t>
+            </a:r>
+            <a:r>
+              <a:rPr lang="fi-FI" dirty="0"/>
+              <a:t> </a:t>
+            </a:r>
+            <a:r>
+              <a:rPr lang="fi-FI" dirty="0" err="1"/>
+              <a:t>thing</a:t>
+            </a:r>
+            <a:r>
+              <a:rPr lang="fi-FI" dirty="0"/>
+              <a:t> </a:t>
+            </a:r>
+            <a:r>
+              <a:rPr lang="fi-FI" dirty="0" err="1"/>
+              <a:t>called</a:t>
+            </a:r>
+            <a:r>
+              <a:rPr lang="fi-FI" dirty="0"/>
+              <a:t> ”XML </a:t>
+            </a:r>
+            <a:r>
+              <a:rPr lang="fi-FI" dirty="0" err="1"/>
+              <a:t>comments</a:t>
+            </a:r>
+            <a:r>
+              <a:rPr lang="fi-FI" dirty="0"/>
+              <a:t>”</a:t>
+            </a:r>
+          </a:p>
+          <a:p>
+            <a:pPr lvl="1"/>
+            <a:r>
+              <a:rPr lang="fi-FI" dirty="0" err="1"/>
+              <a:t>Someting</a:t>
+            </a:r>
+            <a:r>
+              <a:rPr lang="fi-FI" dirty="0"/>
+              <a:t> </a:t>
+            </a:r>
+            <a:r>
+              <a:rPr lang="fi-FI" dirty="0" err="1"/>
+              <a:t>like</a:t>
+            </a:r>
+            <a:r>
+              <a:rPr lang="fi-FI" dirty="0"/>
+              <a:t> /** **/ </a:t>
+            </a:r>
+            <a:r>
+              <a:rPr lang="fi-FI" dirty="0" err="1"/>
+              <a:t>instead</a:t>
+            </a:r>
+            <a:r>
+              <a:rPr lang="fi-FI" dirty="0"/>
+              <a:t> of /* */  and </a:t>
+            </a:r>
+            <a:r>
+              <a:rPr lang="fi-FI" dirty="0" err="1"/>
+              <a:t>with</a:t>
+            </a:r>
+            <a:r>
+              <a:rPr lang="fi-FI" dirty="0"/>
+              <a:t> </a:t>
+            </a:r>
+            <a:r>
+              <a:rPr lang="fi-FI" dirty="0" err="1"/>
+              <a:t>parameter</a:t>
+            </a:r>
+            <a:r>
+              <a:rPr lang="fi-FI" dirty="0"/>
+              <a:t> </a:t>
             </a:r>
             <a:r>
               <a:rPr lang="fi-FI" dirty="0" err="1"/>
@@ -10895,114 +11417,11 @@
             </a:r>
             <a:r>
               <a:rPr lang="fi-FI" dirty="0" err="1"/>
-              <a:t>or</a:t>
-            </a:r>
-            <a:r>
-              <a:rPr lang="fi-FI" dirty="0"/>
-              <a:t> </a:t>
-            </a:r>
-            <a:r>
-              <a:rPr lang="fi-FI" dirty="0" err="1"/>
-              <a:t>javadoc-kind</a:t>
-            </a:r>
-            <a:r>
-              <a:rPr lang="fi-FI" dirty="0"/>
-              <a:t> of </a:t>
-            </a:r>
-            <a:r>
-              <a:rPr lang="fi-FI" dirty="0" err="1"/>
               <a:t>comments</a:t>
             </a:r>
             <a:endParaRPr lang="fi-FI" dirty="0"/>
           </a:p>
           <a:p>
-            <a:pPr lvl="1"/>
-            <a:r>
-              <a:rPr lang="fi-FI" dirty="0"/>
-              <a:t>(</a:t>
-            </a:r>
-            <a:r>
-              <a:rPr lang="fi-FI" dirty="0" err="1"/>
-              <a:t>Javadoc</a:t>
-            </a:r>
-            <a:r>
-              <a:rPr lang="fi-FI" dirty="0"/>
-              <a:t>: Write </a:t>
-            </a:r>
-            <a:r>
-              <a:rPr lang="fi-FI" dirty="0" err="1"/>
-              <a:t>comments</a:t>
-            </a:r>
-            <a:r>
-              <a:rPr lang="fi-FI" dirty="0"/>
-              <a:t> on </a:t>
-            </a:r>
-            <a:r>
-              <a:rPr lang="fi-FI" dirty="0" err="1"/>
-              <a:t>certain</a:t>
-            </a:r>
-            <a:r>
-              <a:rPr lang="fi-FI" dirty="0"/>
-              <a:t> </a:t>
-            </a:r>
-            <a:r>
-              <a:rPr lang="fi-FI" dirty="0" err="1"/>
-              <a:t>style</a:t>
-            </a:r>
-            <a:r>
-              <a:rPr lang="fi-FI" dirty="0"/>
-              <a:t> and </a:t>
-            </a:r>
-            <a:r>
-              <a:rPr lang="fi-FI" dirty="0" err="1"/>
-              <a:t>they</a:t>
-            </a:r>
-            <a:r>
-              <a:rPr lang="fi-FI" dirty="0"/>
-              <a:t> go to </a:t>
-            </a:r>
-            <a:r>
-              <a:rPr lang="fi-FI" dirty="0" err="1"/>
-              <a:t>the</a:t>
-            </a:r>
-            <a:r>
-              <a:rPr lang="fi-FI" dirty="0"/>
-              <a:t> </a:t>
-            </a:r>
-            <a:r>
-              <a:rPr lang="fi-FI" dirty="0" err="1"/>
-              <a:t>javadoc</a:t>
-            </a:r>
-            <a:r>
-              <a:rPr lang="fi-FI" dirty="0"/>
-              <a:t> </a:t>
-            </a:r>
-            <a:r>
-              <a:rPr lang="fi-FI" dirty="0" err="1"/>
-              <a:t>tool</a:t>
-            </a:r>
-            <a:r>
-              <a:rPr lang="fi-FI" dirty="0"/>
-              <a:t> </a:t>
-            </a:r>
-            <a:r>
-              <a:rPr lang="fi-FI" dirty="0" err="1"/>
-              <a:t>generated</a:t>
-            </a:r>
-            <a:r>
-              <a:rPr lang="fi-FI" dirty="0"/>
-              <a:t> HTML etc. </a:t>
-            </a:r>
-            <a:r>
-              <a:rPr lang="fi-FI" dirty="0" err="1"/>
-              <a:t>Documentation</a:t>
-            </a:r>
-            <a:r>
-              <a:rPr lang="fi-FI" dirty="0"/>
-              <a:t>)</a:t>
-            </a:r>
-          </a:p>
-          <a:p>
             <a:r>
               <a:rPr lang="fi-FI" dirty="0" err="1"/>
               <a:t>Thus</a:t>
@@ -11061,9 +11480,29 @@
             </a:r>
           </a:p>
           <a:p>
-            <a:pPr lvl="1"/>
-            <a:r>
-              <a:rPr lang="fi-FI" dirty="0" err="1"/>
+            <a:pPr marL="504000" lvl="1" indent="0">
+              <a:buNone/>
+            </a:pPr>
+            <a:endParaRPr lang="fi-FI" dirty="0"/>
+          </a:p>
+          <a:p>
+            <a:pPr marL="504000" lvl="1" indent="0">
+              <a:buNone/>
+            </a:pPr>
+            <a:endParaRPr lang="fi-FI" dirty="0"/>
+          </a:p>
+          <a:p>
+            <a:pPr marL="504000" lvl="1" indent="0">
+              <a:buNone/>
+            </a:pPr>
+            <a:endParaRPr lang="fi-FI"/>
+          </a:p>
+          <a:p>
+            <a:pPr marL="504000" lvl="1" indent="0">
+              <a:buNone/>
+            </a:pPr>
+            <a:r>
+              <a:rPr lang="fi-FI"/>
               <a:t>Didn’t</a:t>
             </a:r>
             <a:r>
@@ -11862,24 +12301,6 @@
 </file>
 
 <file path=customXml/item1.xml><?xml version="1.0" encoding="utf-8"?>
-<?mso-contentType ?>
-<FormTemplates xmlns="http://schemas.microsoft.com/sharepoint/v3/contenttype/forms">
-  <Display>DocumentLibraryForm</Display>
-  <Edit>DocumentLibraryForm</Edit>
-  <New>DocumentLibraryForm</New>
-</FormTemplates>
-</file>
-
-<file path=customXml/item2.xml><?xml version="1.0" encoding="utf-8"?>
-<p:properties xmlns:p="http://schemas.microsoft.com/office/2006/metadata/properties" xmlns:xsi="http://www.w3.org/2001/XMLSchema-instance" xmlns:pc="http://schemas.microsoft.com/office/infopath/2007/PartnerControls">
-  <documentManagement>
-    <PublishingExpirationDate xmlns="http://schemas.microsoft.com/sharepoint/v3" xsi:nil="true"/>
-    <PublishingStartDate xmlns="http://schemas.microsoft.com/sharepoint/v3" xsi:nil="true"/>
-  </documentManagement>
-</p:properties>
-</file>
-
-<file path=customXml/item3.xml><?xml version="1.0" encoding="utf-8"?>
 <ct:contentTypeSchema xmlns:ct="http://schemas.microsoft.com/office/2006/metadata/contentType" xmlns:ma="http://schemas.microsoft.com/office/2006/metadata/properties/metaAttributes" ct:_="" ma:_="" ma:contentTypeName="Document" ma:contentTypeID="0x01010024C55B41993A414DABB8DD07ACBA0814" ma:contentTypeVersion="1" ma:contentTypeDescription="Create a new document." ma:contentTypeScope="" ma:versionID="3ea0c22b5866975a7b271665de4056c5">
   <xsd:schema xmlns:xsd="http://www.w3.org/2001/XMLSchema" xmlns:xs="http://www.w3.org/2001/XMLSchema" xmlns:p="http://schemas.microsoft.com/office/2006/metadata/properties" xmlns:ns1="http://schemas.microsoft.com/sharepoint/v3" targetNamespace="http://schemas.microsoft.com/office/2006/metadata/properties" ma:root="true" ma:fieldsID="ef2aa9ed40e72a78c3822fc753b43e87" ns1:_="">
     <xsd:import namespace="http://schemas.microsoft.com/sharepoint/v3"/>
@@ -12011,10 +12432,38 @@
 </ct:contentTypeSchema>
 </file>
 
+<file path=customXml/item2.xml><?xml version="1.0" encoding="utf-8"?>
+<p:properties xmlns:p="http://schemas.microsoft.com/office/2006/metadata/properties" xmlns:xsi="http://www.w3.org/2001/XMLSchema-instance" xmlns:pc="http://schemas.microsoft.com/office/infopath/2007/PartnerControls">
+  <documentManagement>
+    <PublishingExpirationDate xmlns="http://schemas.microsoft.com/sharepoint/v3" xsi:nil="true"/>
+    <PublishingStartDate xmlns="http://schemas.microsoft.com/sharepoint/v3" xsi:nil="true"/>
+  </documentManagement>
+</p:properties>
+</file>
+
+<file path=customXml/item3.xml><?xml version="1.0" encoding="utf-8"?>
+<?mso-contentType ?>
+<FormTemplates xmlns="http://schemas.microsoft.com/sharepoint/v3/contenttype/forms">
+  <Display>DocumentLibraryForm</Display>
+  <Edit>DocumentLibraryForm</Edit>
+  <New>DocumentLibraryForm</New>
+</FormTemplates>
+</file>
+
 <file path=customXml/itemProps1.xml><?xml version="1.0" encoding="utf-8"?>
-<ds:datastoreItem xmlns:ds="http://schemas.openxmlformats.org/officeDocument/2006/customXml" ds:itemID="{D546C03B-CD3A-4EA0-AAA4-0E00E896454E}">
+<ds:datastoreItem xmlns:ds="http://schemas.openxmlformats.org/officeDocument/2006/customXml" ds:itemID="{B9E4DC25-62AA-44A0-8D5C-DB44892588AF}">
   <ds:schemaRefs>
-    <ds:schemaRef ds:uri="http://schemas.microsoft.com/sharepoint/v3/contenttype/forms"/>
+    <ds:schemaRef ds:uri="http://schemas.microsoft.com/office/2006/metadata/contentType"/>
+    <ds:schemaRef ds:uri="http://schemas.microsoft.com/office/2006/metadata/properties/metaAttributes"/>
+    <ds:schemaRef ds:uri="http://www.w3.org/2001/XMLSchema"/>
+    <ds:schemaRef ds:uri="http://schemas.microsoft.com/office/2006/metadata/properties"/>
+    <ds:schemaRef ds:uri="http://schemas.microsoft.com/sharepoint/v3"/>
+    <ds:schemaRef ds:uri="http://schemas.microsoft.com/office/2006/documentManagement/types"/>
+    <ds:schemaRef ds:uri="http://schemas.microsoft.com/office/infopath/2007/PartnerControls"/>
+    <ds:schemaRef ds:uri="http://schemas.openxmlformats.org/package/2006/metadata/core-properties"/>
+    <ds:schemaRef ds:uri="http://purl.org/dc/elements/1.1/"/>
+    <ds:schemaRef ds:uri="http://purl.org/dc/terms/"/>
+    <ds:schemaRef ds:uri="http://schemas.microsoft.com/internal/obd"/>
   </ds:schemaRefs>
 </ds:datastoreItem>
 </file>
@@ -12036,19 +12485,9 @@
 </file>
 
 <file path=customXml/itemProps3.xml><?xml version="1.0" encoding="utf-8"?>
-<ds:datastoreItem xmlns:ds="http://schemas.openxmlformats.org/officeDocument/2006/customXml" ds:itemID="{B9E4DC25-62AA-44A0-8D5C-DB44892588AF}">
+<ds:datastoreItem xmlns:ds="http://schemas.openxmlformats.org/officeDocument/2006/customXml" ds:itemID="{D546C03B-CD3A-4EA0-AAA4-0E00E896454E}">
   <ds:schemaRefs>
-    <ds:schemaRef ds:uri="http://schemas.microsoft.com/office/2006/metadata/contentType"/>
-    <ds:schemaRef ds:uri="http://schemas.microsoft.com/office/2006/metadata/properties/metaAttributes"/>
-    <ds:schemaRef ds:uri="http://www.w3.org/2001/XMLSchema"/>
-    <ds:schemaRef ds:uri="http://schemas.microsoft.com/office/2006/metadata/properties"/>
-    <ds:schemaRef ds:uri="http://schemas.microsoft.com/sharepoint/v3"/>
-    <ds:schemaRef ds:uri="http://schemas.microsoft.com/office/2006/documentManagement/types"/>
-    <ds:schemaRef ds:uri="http://schemas.microsoft.com/office/infopath/2007/PartnerControls"/>
-    <ds:schemaRef ds:uri="http://schemas.openxmlformats.org/package/2006/metadata/core-properties"/>
-    <ds:schemaRef ds:uri="http://purl.org/dc/elements/1.1/"/>
-    <ds:schemaRef ds:uri="http://purl.org/dc/terms/"/>
-    <ds:schemaRef ds:uri="http://schemas.microsoft.com/internal/obd"/>
+    <ds:schemaRef ds:uri="http://schemas.microsoft.com/sharepoint/v3/contenttype/forms"/>
   </ds:schemaRefs>
 </ds:datastoreItem>
 </file>
</xml_diff>

<commit_message>
Typos from the documentation hint doc
</commit_message>
<xml_diff>
--- a/06_ohjelmistoarkkitehtuurit_ja_patternit/documentation_principles_for_sw_projects.pptx
+++ b/06_ohjelmistoarkkitehtuurit_ja_patternit/documentation_principles_for_sw_projects.pptx
@@ -1198,7 +1198,7 @@
           <a:p>
             <a:fld id="{5645C365-1C26-6946-87AF-75D6A7DF4277}" type="datetimeFigureOut">
               <a:rPr lang="en-GB" smtClean="0"/>
-              <a:t>31/10/2022</a:t>
+              <a:t>03/11/2022</a:t>
             </a:fld>
             <a:endParaRPr lang="en-GB"/>
           </a:p>
@@ -1697,7 +1697,7 @@
           <a:p>
             <a:fld id="{35B864B8-8D08-7B43-B4FB-B2FB41A5D9E3}" type="datetime1">
               <a:rPr lang="fi-FI" smtClean="0"/>
-              <a:t>31.10.2022</a:t>
+              <a:t>3.11.2022</a:t>
             </a:fld>
             <a:endParaRPr lang="en-GB" dirty="0"/>
           </a:p>
@@ -2024,7 +2024,7 @@
           <a:p>
             <a:fld id="{D5AEA85A-FC56-D34C-9AA6-ECC3D2586F37}" type="datetime1">
               <a:rPr lang="fi-FI" smtClean="0"/>
-              <a:t>31.10.2022</a:t>
+              <a:t>3.11.2022</a:t>
             </a:fld>
             <a:endParaRPr lang="en-GB" dirty="0"/>
           </a:p>
@@ -2234,7 +2234,7 @@
           <a:p>
             <a:fld id="{E6BC6EEF-E660-7844-8930-418AFF95EA40}" type="datetime1">
               <a:rPr lang="fi-FI" smtClean="0"/>
-              <a:t>31.10.2022</a:t>
+              <a:t>3.11.2022</a:t>
             </a:fld>
             <a:endParaRPr lang="en-GB" dirty="0"/>
           </a:p>
@@ -2543,7 +2543,7 @@
           <a:p>
             <a:fld id="{4E10C7EC-C1C1-9849-A573-7692478FCD52}" type="datetime1">
               <a:rPr lang="fi-FI" smtClean="0"/>
-              <a:t>31.10.2022</a:t>
+              <a:t>3.11.2022</a:t>
             </a:fld>
             <a:endParaRPr lang="en-GB" dirty="0"/>
           </a:p>
@@ -2816,7 +2816,7 @@
           <a:p>
             <a:fld id="{844FF3FE-30BE-2040-9151-6FBC4992BF4F}" type="datetime1">
               <a:rPr lang="fi-FI" smtClean="0"/>
-              <a:t>31.10.2022</a:t>
+              <a:t>3.11.2022</a:t>
             </a:fld>
             <a:endParaRPr lang="en-GB" dirty="0"/>
           </a:p>
@@ -3056,7 +3056,7 @@
           <a:p>
             <a:fld id="{11EDCD7B-6966-E249-89F2-D46BDFBF56BE}" type="datetime1">
               <a:rPr lang="fi-FI" smtClean="0"/>
-              <a:t>31.10.2022</a:t>
+              <a:t>3.11.2022</a:t>
             </a:fld>
             <a:endParaRPr lang="en-GB" dirty="0"/>
           </a:p>
@@ -3349,7 +3349,7 @@
           <a:p>
             <a:fld id="{11EDCD7B-6966-E249-89F2-D46BDFBF56BE}" type="datetime1">
               <a:rPr lang="fi-FI" smtClean="0"/>
-              <a:t>31.10.2022</a:t>
+              <a:t>3.11.2022</a:t>
             </a:fld>
             <a:endParaRPr lang="en-GB" dirty="0"/>
           </a:p>
@@ -3788,7 +3788,7 @@
           <a:p>
             <a:fld id="{844FF3FE-30BE-2040-9151-6FBC4992BF4F}" type="datetime1">
               <a:rPr lang="fi-FI" smtClean="0"/>
-              <a:t>31.10.2022</a:t>
+              <a:t>3.11.2022</a:t>
             </a:fld>
             <a:endParaRPr lang="en-GB" dirty="0"/>
           </a:p>
@@ -4016,7 +4016,7 @@
           <a:p>
             <a:fld id="{11EDCD7B-6966-E249-89F2-D46BDFBF56BE}" type="datetime1">
               <a:rPr lang="fi-FI" smtClean="0"/>
-              <a:t>31.10.2022</a:t>
+              <a:t>3.11.2022</a:t>
             </a:fld>
             <a:endParaRPr lang="en-GB" dirty="0"/>
           </a:p>
@@ -4431,7 +4431,7 @@
           <a:p>
             <a:fld id="{B62E192A-D52B-F541-B2AA-4AEB9388F1F7}" type="datetime1">
               <a:rPr lang="fi-FI" smtClean="0"/>
-              <a:t>31.10.2022</a:t>
+              <a:t>3.11.2022</a:t>
             </a:fld>
             <a:endParaRPr lang="en-GB" dirty="0"/>
           </a:p>
@@ -4731,7 +4731,7 @@
           <a:p>
             <a:fld id="{EEA4FAA2-2B3E-264C-A42F-2D6D3EF33A3C}" type="datetime1">
               <a:rPr lang="fi-FI" smtClean="0"/>
-              <a:t>31.10.2022</a:t>
+              <a:t>3.11.2022</a:t>
             </a:fld>
             <a:endParaRPr lang="en-GB" dirty="0"/>
           </a:p>
@@ -5634,7 +5634,7 @@
           <a:p>
             <a:fld id="{B3114A65-8017-1743-A85A-B2A4BB835AE9}" type="datetime1">
               <a:rPr lang="fi-FI" smtClean="0"/>
-              <a:t>31.10.2022</a:t>
+              <a:t>3.11.2022</a:t>
             </a:fld>
             <a:endParaRPr lang="en-GB" dirty="0"/>
           </a:p>
@@ -5862,7 +5862,7 @@
           <a:p>
             <a:fld id="{11EDCD7B-6966-E249-89F2-D46BDFBF56BE}" type="datetime1">
               <a:rPr lang="fi-FI" smtClean="0"/>
-              <a:t>31.10.2022</a:t>
+              <a:t>3.11.2022</a:t>
             </a:fld>
             <a:endParaRPr lang="en-GB" dirty="0"/>
           </a:p>
@@ -6154,7 +6154,7 @@
           <a:p>
             <a:fld id="{45F98643-D206-614D-B596-3C8548138211}" type="datetime1">
               <a:rPr lang="fi-FI" smtClean="0"/>
-              <a:t>31.10.2022</a:t>
+              <a:t>3.11.2022</a:t>
             </a:fld>
             <a:endParaRPr lang="en-GB" dirty="0"/>
           </a:p>
@@ -6794,7 +6794,7 @@
           <a:p>
             <a:fld id="{30BF63A1-919F-FB49-ABA8-182126D24C50}" type="datetime1">
               <a:rPr lang="fi-FI" smtClean="0"/>
-              <a:t>31.10.2022</a:t>
+              <a:t>3.11.2022</a:t>
             </a:fld>
             <a:endParaRPr lang="en-GB" dirty="0"/>
           </a:p>
@@ -6882,7 +6882,7 @@
             <a:pPr lvl="0"/>
             <a:r>
               <a:rPr lang="en-US" dirty="0"/>
-              <a:t>Principles or goals</a:t>
+              <a:t>Principles or goals for good SW documentation</a:t>
             </a:r>
             <a:endParaRPr lang="fi-FI" dirty="0"/>
           </a:p>
@@ -6907,7 +6907,7 @@
         <p:spPr>
           <a:xfrm>
             <a:off x="550864" y="1295073"/>
-            <a:ext cx="11125198" cy="4618365"/>
+            <a:ext cx="11125198" cy="4931887"/>
           </a:xfrm>
         </p:spPr>
         <p:txBody>
@@ -6917,638 +6917,98 @@
           <a:lstStyle/>
           <a:p>
             <a:r>
-              <a:rPr lang="fi-FI" dirty="0" err="1"/>
+              <a:rPr lang="en-US" dirty="0"/>
               <a:t>Maintainable</a:t>
             </a:r>
-            <a:endParaRPr lang="fi-FI" dirty="0"/>
-          </a:p>
-          <a:p>
-            <a:r>
-              <a:rPr lang="fi-FI" dirty="0" err="1"/>
-              <a:t>Generate</a:t>
-            </a:r>
-            <a:r>
-              <a:rPr lang="fi-FI" dirty="0"/>
-              <a:t> </a:t>
-            </a:r>
-            <a:r>
-              <a:rPr lang="fi-FI" dirty="0" err="1"/>
-              <a:t>what</a:t>
-            </a:r>
-            <a:r>
-              <a:rPr lang="fi-FI" dirty="0"/>
-              <a:t> </a:t>
-            </a:r>
-            <a:r>
-              <a:rPr lang="fi-FI" dirty="0" err="1"/>
-              <a:t>you</a:t>
-            </a:r>
-            <a:r>
-              <a:rPr lang="fi-FI" dirty="0"/>
-              <a:t> </a:t>
-            </a:r>
-            <a:r>
-              <a:rPr lang="fi-FI" dirty="0" err="1"/>
-              <a:t>can</a:t>
-            </a:r>
-            <a:r>
-              <a:rPr lang="fi-FI" dirty="0"/>
-              <a:t> </a:t>
-            </a:r>
-            <a:r>
-              <a:rPr lang="fi-FI" dirty="0" err="1"/>
-              <a:t>generate</a:t>
-            </a:r>
-            <a:r>
-              <a:rPr lang="fi-FI" dirty="0"/>
-              <a:t> </a:t>
-            </a:r>
-            <a:r>
-              <a:rPr lang="fi-FI" dirty="0" err="1"/>
-              <a:t>automatically</a:t>
-            </a:r>
-            <a:endParaRPr lang="fi-FI" dirty="0"/>
-          </a:p>
-          <a:p>
-            <a:r>
-              <a:rPr lang="fi-FI" dirty="0" err="1"/>
-              <a:t>Only</a:t>
-            </a:r>
-            <a:r>
-              <a:rPr lang="fi-FI" dirty="0"/>
-              <a:t> to </a:t>
-            </a:r>
-            <a:r>
-              <a:rPr lang="fi-FI" dirty="0" err="1"/>
-              <a:t>the</a:t>
-            </a:r>
-            <a:r>
-              <a:rPr lang="fi-FI" dirty="0"/>
-              <a:t> </a:t>
-            </a:r>
-            <a:r>
-              <a:rPr lang="fi-FI" dirty="0" err="1"/>
-              <a:t>needed</a:t>
-            </a:r>
-            <a:r>
-              <a:rPr lang="fi-FI" dirty="0"/>
-              <a:t> </a:t>
-            </a:r>
-            <a:r>
-              <a:rPr lang="fi-FI" dirty="0" err="1"/>
-              <a:t>level</a:t>
-            </a:r>
-            <a:endParaRPr lang="fi-FI" dirty="0"/>
-          </a:p>
-          <a:p>
-            <a:r>
-              <a:rPr lang="fi-FI" dirty="0" err="1"/>
-              <a:t>Avoid</a:t>
-            </a:r>
-            <a:r>
-              <a:rPr lang="fi-FI" dirty="0"/>
-              <a:t> </a:t>
-            </a:r>
-            <a:r>
-              <a:rPr lang="fi-FI" dirty="0" err="1"/>
-              <a:t>documentation</a:t>
-            </a:r>
-            <a:r>
-              <a:rPr lang="fi-FI" dirty="0"/>
-              <a:t> </a:t>
-            </a:r>
-            <a:r>
-              <a:rPr lang="fi-FI" dirty="0" err="1"/>
-              <a:t>that</a:t>
-            </a:r>
-            <a:r>
-              <a:rPr lang="fi-FI" dirty="0"/>
-              <a:t> </a:t>
-            </a:r>
-            <a:r>
-              <a:rPr lang="fi-FI" dirty="0" err="1"/>
-              <a:t>can</a:t>
-            </a:r>
-            <a:r>
-              <a:rPr lang="fi-FI" dirty="0"/>
-              <a:t> </a:t>
-            </a:r>
-            <a:r>
-              <a:rPr lang="fi-FI" dirty="0" err="1"/>
-              <a:t>be</a:t>
-            </a:r>
-            <a:r>
-              <a:rPr lang="fi-FI" dirty="0"/>
-              <a:t> made </a:t>
-            </a:r>
-            <a:r>
-              <a:rPr lang="fi-FI" dirty="0" err="1"/>
-              <a:t>unnecessary</a:t>
-            </a:r>
-            <a:r>
-              <a:rPr lang="fi-FI" dirty="0"/>
-              <a:t> </a:t>
-            </a:r>
-            <a:r>
-              <a:rPr lang="fi-FI" dirty="0" err="1"/>
-              <a:t>by</a:t>
-            </a:r>
-            <a:r>
-              <a:rPr lang="fi-FI" dirty="0"/>
-              <a:t> </a:t>
-            </a:r>
-            <a:r>
-              <a:rPr lang="fi-FI" dirty="0" err="1"/>
-              <a:t>other</a:t>
-            </a:r>
-            <a:r>
-              <a:rPr lang="fi-FI" dirty="0"/>
-              <a:t> </a:t>
-            </a:r>
-            <a:r>
-              <a:rPr lang="fi-FI" dirty="0" err="1"/>
-              <a:t>means</a:t>
-            </a:r>
-            <a:endParaRPr lang="fi-FI" dirty="0"/>
-          </a:p>
-          <a:p>
-            <a:r>
-              <a:rPr lang="fi-FI" dirty="0"/>
-              <a:t>School </a:t>
-            </a:r>
-            <a:r>
-              <a:rPr lang="fi-FI" dirty="0" err="1"/>
-              <a:t>methods</a:t>
-            </a:r>
-            <a:r>
-              <a:rPr lang="fi-FI" dirty="0"/>
-              <a:t> </a:t>
-            </a:r>
-            <a:r>
-              <a:rPr lang="fi-FI" dirty="0" err="1"/>
-              <a:t>are</a:t>
-            </a:r>
-            <a:r>
-              <a:rPr lang="fi-FI" dirty="0"/>
-              <a:t> </a:t>
-            </a:r>
-            <a:r>
-              <a:rPr lang="fi-FI" dirty="0" err="1"/>
-              <a:t>often</a:t>
-            </a:r>
-            <a:r>
-              <a:rPr lang="fi-FI" dirty="0"/>
-              <a:t> </a:t>
-            </a:r>
-            <a:r>
-              <a:rPr lang="fi-FI" dirty="0" err="1"/>
-              <a:t>different</a:t>
-            </a:r>
-            <a:r>
-              <a:rPr lang="fi-FI" dirty="0"/>
-              <a:t> </a:t>
-            </a:r>
-            <a:r>
-              <a:rPr lang="fi-FI" dirty="0" err="1"/>
-              <a:t>ones</a:t>
-            </a:r>
-            <a:r>
-              <a:rPr lang="fi-FI" dirty="0"/>
-              <a:t>, as </a:t>
-            </a:r>
-            <a:r>
-              <a:rPr lang="fi-FI" dirty="0" err="1"/>
-              <a:t>they</a:t>
-            </a:r>
-            <a:r>
-              <a:rPr lang="fi-FI" dirty="0"/>
-              <a:t> </a:t>
-            </a:r>
-            <a:r>
-              <a:rPr lang="fi-FI" dirty="0" err="1"/>
-              <a:t>often</a:t>
-            </a:r>
-            <a:r>
-              <a:rPr lang="fi-FI" dirty="0"/>
-              <a:t> </a:t>
-            </a:r>
-            <a:r>
-              <a:rPr lang="fi-FI" dirty="0" err="1"/>
-              <a:t>form</a:t>
-            </a:r>
-            <a:r>
-              <a:rPr lang="fi-FI" dirty="0"/>
-              <a:t> </a:t>
-            </a:r>
-            <a:r>
-              <a:rPr lang="fi-FI" dirty="0" err="1"/>
-              <a:t>part</a:t>
-            </a:r>
-            <a:r>
-              <a:rPr lang="fi-FI" dirty="0"/>
-              <a:t> of </a:t>
-            </a:r>
-            <a:r>
-              <a:rPr lang="fi-FI" dirty="0" err="1"/>
-              <a:t>learning</a:t>
-            </a:r>
-            <a:r>
-              <a:rPr lang="fi-FI" dirty="0"/>
-              <a:t> </a:t>
-            </a:r>
-            <a:r>
-              <a:rPr lang="fi-FI" dirty="0" err="1"/>
-              <a:t>process</a:t>
-            </a:r>
-            <a:endParaRPr lang="fi-FI" dirty="0"/>
-          </a:p>
-          <a:p>
-            <a:r>
-              <a:rPr lang="fi-FI" dirty="0"/>
-              <a:t>In </a:t>
-            </a:r>
-            <a:r>
-              <a:rPr lang="fi-FI" dirty="0" err="1"/>
-              <a:t>real</a:t>
-            </a:r>
-            <a:r>
-              <a:rPr lang="fi-FI" dirty="0"/>
-              <a:t> </a:t>
-            </a:r>
-            <a:r>
-              <a:rPr lang="fi-FI" dirty="0" err="1"/>
-              <a:t>project</a:t>
-            </a:r>
-            <a:r>
-              <a:rPr lang="fi-FI" dirty="0"/>
-              <a:t> </a:t>
-            </a:r>
-            <a:r>
-              <a:rPr lang="fi-FI" dirty="0" err="1"/>
-              <a:t>add</a:t>
-            </a:r>
-            <a:r>
-              <a:rPr lang="fi-FI" dirty="0"/>
-              <a:t> </a:t>
-            </a:r>
-            <a:r>
-              <a:rPr lang="fi-FI" dirty="0" err="1"/>
-              <a:t>only</a:t>
-            </a:r>
-            <a:r>
-              <a:rPr lang="fi-FI" dirty="0"/>
-              <a:t> </a:t>
-            </a:r>
-            <a:r>
-              <a:rPr lang="fi-FI" dirty="0" err="1"/>
-              <a:t>that</a:t>
-            </a:r>
-            <a:r>
-              <a:rPr lang="fi-FI" dirty="0"/>
-              <a:t> </a:t>
-            </a:r>
-            <a:r>
-              <a:rPr lang="fi-FI" dirty="0" err="1"/>
-              <a:t>documentation</a:t>
-            </a:r>
-            <a:r>
-              <a:rPr lang="fi-FI" dirty="0"/>
-              <a:t> and </a:t>
-            </a:r>
-            <a:r>
-              <a:rPr lang="fi-FI" dirty="0" err="1"/>
-              <a:t>visualization</a:t>
-            </a:r>
-            <a:r>
-              <a:rPr lang="fi-FI" dirty="0"/>
-              <a:t> </a:t>
-            </a:r>
-            <a:r>
-              <a:rPr lang="fi-FI" dirty="0" err="1"/>
-              <a:t>that</a:t>
-            </a:r>
-            <a:r>
-              <a:rPr lang="fi-FI" dirty="0"/>
-              <a:t> is </a:t>
-            </a:r>
-            <a:r>
-              <a:rPr lang="fi-FI" dirty="0" err="1"/>
-              <a:t>necessary</a:t>
-            </a:r>
-            <a:endParaRPr lang="fi-FI" dirty="0"/>
-          </a:p>
-          <a:p>
-            <a:r>
-              <a:rPr lang="fi-FI" dirty="0" err="1"/>
-              <a:t>Link</a:t>
-            </a:r>
-            <a:r>
-              <a:rPr lang="fi-FI" dirty="0"/>
-              <a:t> </a:t>
-            </a:r>
-            <a:r>
-              <a:rPr lang="fi-FI" dirty="0" err="1"/>
-              <a:t>when</a:t>
-            </a:r>
-            <a:r>
-              <a:rPr lang="fi-FI" dirty="0"/>
-              <a:t> </a:t>
-            </a:r>
-            <a:r>
-              <a:rPr lang="fi-FI" dirty="0" err="1"/>
-              <a:t>information</a:t>
-            </a:r>
-            <a:r>
-              <a:rPr lang="fi-FI" dirty="0"/>
-              <a:t> is </a:t>
-            </a:r>
-            <a:r>
-              <a:rPr lang="fi-FI" dirty="0" err="1"/>
-              <a:t>available</a:t>
-            </a:r>
-            <a:r>
-              <a:rPr lang="fi-FI" dirty="0"/>
-              <a:t> </a:t>
-            </a:r>
-            <a:r>
-              <a:rPr lang="fi-FI" dirty="0" err="1"/>
-              <a:t>elsewhere</a:t>
-            </a:r>
-            <a:endParaRPr lang="fi-FI" dirty="0"/>
-          </a:p>
-          <a:p>
-            <a:r>
-              <a:rPr lang="fi-FI" dirty="0" err="1"/>
-              <a:t>Provide</a:t>
-            </a:r>
-            <a:r>
-              <a:rPr lang="fi-FI" dirty="0"/>
-              <a:t> </a:t>
-            </a:r>
-            <a:r>
-              <a:rPr lang="fi-FI" dirty="0" err="1"/>
-              <a:t>Table</a:t>
-            </a:r>
-            <a:r>
-              <a:rPr lang="fi-FI" dirty="0"/>
-              <a:t> of </a:t>
-            </a:r>
-            <a:r>
-              <a:rPr lang="fi-FI" dirty="0" err="1"/>
-              <a:t>Contents</a:t>
-            </a:r>
-            <a:r>
-              <a:rPr lang="fi-FI" dirty="0"/>
-              <a:t> </a:t>
-            </a:r>
-            <a:r>
-              <a:rPr lang="fi-FI" dirty="0" err="1"/>
-              <a:t>where</a:t>
-            </a:r>
-            <a:r>
-              <a:rPr lang="fi-FI" dirty="0"/>
-              <a:t> </a:t>
-            </a:r>
-            <a:r>
-              <a:rPr lang="fi-FI" dirty="0" err="1"/>
-              <a:t>each</a:t>
-            </a:r>
-            <a:r>
-              <a:rPr lang="fi-FI" dirty="0"/>
-              <a:t> </a:t>
-            </a:r>
-            <a:r>
-              <a:rPr lang="fi-FI" dirty="0" err="1"/>
-              <a:t>developer</a:t>
-            </a:r>
-            <a:r>
-              <a:rPr lang="fi-FI" dirty="0"/>
-              <a:t> </a:t>
-            </a:r>
-            <a:r>
-              <a:rPr lang="fi-FI" dirty="0" err="1"/>
-              <a:t>can</a:t>
-            </a:r>
-            <a:r>
-              <a:rPr lang="fi-FI" dirty="0"/>
-              <a:t> </a:t>
-            </a:r>
-            <a:r>
-              <a:rPr lang="fi-FI" dirty="0" err="1"/>
-              <a:t>find</a:t>
-            </a:r>
-            <a:r>
-              <a:rPr lang="fi-FI" dirty="0"/>
-              <a:t> just </a:t>
-            </a:r>
-            <a:r>
-              <a:rPr lang="fi-FI" dirty="0" err="1"/>
-              <a:t>the</a:t>
-            </a:r>
-            <a:r>
-              <a:rPr lang="fi-FI" dirty="0"/>
-              <a:t> </a:t>
-            </a:r>
-            <a:r>
-              <a:rPr lang="fi-FI" dirty="0" err="1"/>
-              <a:t>interesting</a:t>
-            </a:r>
-            <a:r>
-              <a:rPr lang="fi-FI" dirty="0"/>
-              <a:t> </a:t>
-            </a:r>
-            <a:r>
-              <a:rPr lang="fi-FI" dirty="0" err="1"/>
-              <a:t>parts</a:t>
-            </a:r>
-            <a:endParaRPr lang="fi-FI" dirty="0"/>
+          </a:p>
+          <a:p>
+            <a:r>
+              <a:rPr lang="en-US" dirty="0"/>
+              <a:t>=&gt; Generate what you can generate automatically</a:t>
+            </a:r>
+          </a:p>
+          <a:p>
+            <a:r>
+              <a:rPr lang="en-US" dirty="0"/>
+              <a:t>Document only to the needed level</a:t>
+            </a:r>
+          </a:p>
+          <a:p>
+            <a:r>
+              <a:rPr lang="en-US" dirty="0"/>
+              <a:t>Avoid documentation that can be made unnecessary by other means</a:t>
+            </a:r>
+          </a:p>
+          <a:p>
+            <a:r>
+              <a:rPr lang="en-US" dirty="0"/>
+              <a:t>School methods are often different ones, as they often introduce phases of some step-wise learning process</a:t>
+            </a:r>
           </a:p>
           <a:p>
             <a:pPr lvl="1"/>
             <a:r>
-              <a:rPr lang="fi-FI" dirty="0" err="1"/>
-              <a:t>Divide</a:t>
-            </a:r>
-            <a:r>
-              <a:rPr lang="fi-FI" dirty="0"/>
-              <a:t> </a:t>
-            </a:r>
-            <a:r>
-              <a:rPr lang="fi-FI" dirty="0" err="1"/>
-              <a:t>the</a:t>
-            </a:r>
-            <a:r>
-              <a:rPr lang="fi-FI" dirty="0"/>
-              <a:t> </a:t>
-            </a:r>
-            <a:r>
-              <a:rPr lang="fi-FI" dirty="0" err="1"/>
-              <a:t>content</a:t>
-            </a:r>
-            <a:r>
-              <a:rPr lang="fi-FI" dirty="0"/>
-              <a:t> to </a:t>
-            </a:r>
-            <a:r>
-              <a:rPr lang="fi-FI" dirty="0" err="1"/>
-              <a:t>shorter</a:t>
-            </a:r>
-            <a:r>
-              <a:rPr lang="fi-FI" dirty="0"/>
-              <a:t> </a:t>
-            </a:r>
-            <a:r>
-              <a:rPr lang="fi-FI" dirty="0" err="1"/>
-              <a:t>modules</a:t>
-            </a:r>
-            <a:r>
-              <a:rPr lang="fi-FI" dirty="0"/>
-              <a:t> for </a:t>
-            </a:r>
-            <a:r>
-              <a:rPr lang="fi-FI" dirty="0" err="1"/>
-              <a:t>easier</a:t>
-            </a:r>
-            <a:r>
-              <a:rPr lang="fi-FI" dirty="0"/>
-              <a:t> </a:t>
-            </a:r>
-            <a:r>
-              <a:rPr lang="fi-FI" dirty="0" err="1"/>
-              <a:t>learning</a:t>
-            </a:r>
-            <a:r>
-              <a:rPr lang="fi-FI" dirty="0"/>
-              <a:t> </a:t>
-            </a:r>
-            <a:r>
-              <a:rPr lang="fi-FI" dirty="0" err="1"/>
-              <a:t>but</a:t>
-            </a:r>
-            <a:r>
-              <a:rPr lang="fi-FI" dirty="0"/>
-              <a:t> </a:t>
-            </a:r>
-            <a:r>
-              <a:rPr lang="fi-FI" dirty="0" err="1"/>
-              <a:t>also</a:t>
-            </a:r>
-            <a:r>
-              <a:rPr lang="fi-FI" dirty="0"/>
-              <a:t> for </a:t>
-            </a:r>
-            <a:r>
-              <a:rPr lang="fi-FI" dirty="0" err="1"/>
-              <a:t>selection</a:t>
-            </a:r>
-            <a:r>
-              <a:rPr lang="fi-FI" dirty="0"/>
-              <a:t> </a:t>
-            </a:r>
-            <a:r>
-              <a:rPr lang="fi-FI" dirty="0" err="1"/>
-              <a:t>based</a:t>
-            </a:r>
-            <a:r>
-              <a:rPr lang="fi-FI" dirty="0"/>
-              <a:t> on </a:t>
-            </a:r>
-            <a:r>
-              <a:rPr lang="fi-FI" dirty="0" err="1"/>
-              <a:t>need</a:t>
-            </a:r>
-            <a:r>
-              <a:rPr lang="fi-FI" dirty="0"/>
-              <a:t> and </a:t>
-            </a:r>
-            <a:r>
-              <a:rPr lang="fi-FI" dirty="0" err="1"/>
-              <a:t>interest</a:t>
-            </a:r>
-            <a:endParaRPr lang="fi-FI" dirty="0"/>
-          </a:p>
-          <a:p>
-            <a:r>
-              <a:rPr lang="fi-FI" dirty="0" err="1"/>
-              <a:t>Optimize</a:t>
-            </a:r>
-            <a:r>
-              <a:rPr lang="fi-FI" dirty="0"/>
-              <a:t> </a:t>
-            </a:r>
-            <a:r>
-              <a:rPr lang="fi-FI" dirty="0" err="1"/>
-              <a:t>understanding</a:t>
-            </a:r>
-            <a:r>
-              <a:rPr lang="fi-FI" dirty="0"/>
-              <a:t> and </a:t>
-            </a:r>
-            <a:r>
-              <a:rPr lang="fi-FI" dirty="0" err="1"/>
-              <a:t>project</a:t>
-            </a:r>
-            <a:r>
-              <a:rPr lang="fi-FI" dirty="0"/>
-              <a:t> </a:t>
-            </a:r>
-            <a:r>
-              <a:rPr lang="fi-FI" dirty="0" err="1"/>
-              <a:t>reading</a:t>
-            </a:r>
-            <a:r>
-              <a:rPr lang="fi-FI" dirty="0"/>
-              <a:t> </a:t>
-            </a:r>
-            <a:r>
-              <a:rPr lang="fi-FI" dirty="0" err="1"/>
-              <a:t>speed</a:t>
-            </a:r>
-            <a:r>
-              <a:rPr lang="fi-FI" dirty="0"/>
-              <a:t>, </a:t>
-            </a:r>
-            <a:r>
-              <a:rPr lang="fi-FI" dirty="0" err="1"/>
-              <a:t>not</a:t>
-            </a:r>
-            <a:r>
-              <a:rPr lang="fi-FI" dirty="0"/>
-              <a:t> </a:t>
-            </a:r>
-            <a:r>
-              <a:rPr lang="fi-FI" dirty="0" err="1"/>
-              <a:t>project</a:t>
-            </a:r>
-            <a:r>
-              <a:rPr lang="fi-FI" dirty="0"/>
-              <a:t> </a:t>
-            </a:r>
-            <a:r>
-              <a:rPr lang="fi-FI" dirty="0" err="1"/>
-              <a:t>writing</a:t>
-            </a:r>
-            <a:r>
-              <a:rPr lang="fi-FI" dirty="0"/>
-              <a:t> </a:t>
-            </a:r>
-            <a:r>
-              <a:rPr lang="fi-FI" dirty="0" err="1"/>
-              <a:t>speed</a:t>
-            </a:r>
-            <a:endParaRPr lang="fi-FI" dirty="0"/>
-          </a:p>
-          <a:p>
-            <a:endParaRPr lang="fi-FI" dirty="0"/>
+              <a:rPr lang="en-US" dirty="0"/>
+              <a:t>Nothing bad in that, and while learning even necessary. But leads often to unmaintained and bloated documentation</a:t>
+            </a:r>
+          </a:p>
+          <a:p>
+            <a:r>
+              <a:rPr lang="en-US" dirty="0"/>
+              <a:t>In real project add only the documentation and visualization that is necessary</a:t>
+            </a:r>
+          </a:p>
+          <a:p>
+            <a:r>
+              <a:rPr lang="en-US" dirty="0"/>
+              <a:t>Just link if the information is available elsewhere</a:t>
+            </a:r>
+          </a:p>
+          <a:p>
+            <a:r>
+              <a:rPr lang="en-US" dirty="0"/>
+              <a:t>Provide Table of Contents where each developer can find just the interesting parts</a:t>
+            </a:r>
+          </a:p>
+          <a:p>
+            <a:pPr lvl="1"/>
+            <a:r>
+              <a:rPr lang="en-US" dirty="0"/>
+              <a:t>Divide the content to shorter modules for easier learning but also for selection based on need and interest</a:t>
+            </a:r>
+          </a:p>
+          <a:p>
+            <a:r>
+              <a:rPr lang="en-US" dirty="0"/>
+              <a:t>Optimize understanding and project reading speed, ’never’ project writing speed</a:t>
+            </a:r>
+          </a:p>
+          <a:p>
+            <a:pPr lvl="1"/>
+            <a:r>
+              <a:rPr lang="en-US" dirty="0"/>
+              <a:t>(Exception: Of course there might be elegant shorter solutions </a:t>
+            </a:r>
+            <a:r>
+              <a:rPr lang="en-US" dirty="0" err="1"/>
+              <a:t>evailable</a:t>
+            </a:r>
+            <a:r>
+              <a:rPr lang="en-US" dirty="0"/>
+              <a:t>)</a:t>
+            </a:r>
+          </a:p>
+          <a:p>
+            <a:endParaRPr lang="en-US" dirty="0"/>
           </a:p>
           <a:p>
             <a:pPr marL="0" indent="0">
               <a:buNone/>
             </a:pPr>
-            <a:endParaRPr lang="fi-FI" dirty="0"/>
-          </a:p>
-          <a:p>
-            <a:endParaRPr lang="fi-FI" dirty="0"/>
+            <a:endParaRPr lang="en-US" dirty="0"/>
+          </a:p>
+          <a:p>
+            <a:endParaRPr lang="en-US" dirty="0"/>
           </a:p>
         </p:txBody>
       </p:sp>
@@ -7575,7 +7035,7 @@
           <a:p>
             <a:fld id="{202E1EC2-47B8-044B-A09E-6A63B4D80C87}" type="datetime1">
               <a:rPr lang="fi-FI" smtClean="0"/>
-              <a:t>31.10.2022</a:t>
+              <a:t>3.11.2022</a:t>
             </a:fld>
             <a:endParaRPr lang="en-GB"/>
           </a:p>
@@ -7729,78 +7189,33 @@
           <a:lstStyle/>
           <a:p>
             <a:r>
-              <a:rPr lang="fi-FI" dirty="0"/>
-              <a:t>Environment and </a:t>
-            </a:r>
-            <a:r>
-              <a:rPr lang="fi-FI" dirty="0" err="1"/>
-              <a:t>project</a:t>
-            </a:r>
-            <a:r>
-              <a:rPr lang="fi-FI" dirty="0"/>
-              <a:t> </a:t>
-            </a:r>
-            <a:r>
-              <a:rPr lang="fi-FI" dirty="0" err="1"/>
-              <a:t>information</a:t>
-            </a:r>
-            <a:endParaRPr lang="fi-FI" dirty="0"/>
-          </a:p>
-          <a:p>
-            <a:r>
-              <a:rPr lang="fi-FI" dirty="0"/>
-              <a:t>Architecture </a:t>
-            </a:r>
-            <a:r>
-              <a:rPr lang="fi-FI" dirty="0" err="1"/>
-              <a:t>introduction</a:t>
-            </a:r>
-            <a:endParaRPr lang="fi-FI" dirty="0"/>
-          </a:p>
-          <a:p>
-            <a:r>
-              <a:rPr lang="fi-FI" dirty="0" err="1"/>
-              <a:t>Database</a:t>
-            </a:r>
-            <a:r>
-              <a:rPr lang="fi-FI" dirty="0"/>
-              <a:t> design and </a:t>
-            </a:r>
-            <a:r>
-              <a:rPr lang="fi-FI" dirty="0" err="1"/>
-              <a:t>visualization</a:t>
-            </a:r>
-            <a:endParaRPr lang="fi-FI" dirty="0"/>
-          </a:p>
-          <a:p>
-            <a:r>
-              <a:rPr lang="fi-FI" dirty="0"/>
-              <a:t>Program </a:t>
-            </a:r>
-            <a:r>
-              <a:rPr lang="fi-FI" dirty="0" err="1"/>
-              <a:t>code</a:t>
-            </a:r>
-            <a:r>
-              <a:rPr lang="fi-FI" dirty="0"/>
-              <a:t> </a:t>
-            </a:r>
-            <a:r>
-              <a:rPr lang="fi-FI" dirty="0" err="1"/>
-              <a:t>comments</a:t>
-            </a:r>
-            <a:endParaRPr lang="fi-FI" dirty="0"/>
-          </a:p>
-          <a:p>
-            <a:r>
-              <a:rPr lang="fi-FI" dirty="0"/>
-              <a:t>API </a:t>
-            </a:r>
-            <a:r>
-              <a:rPr lang="fi-FI" dirty="0" err="1"/>
-              <a:t>documentation</a:t>
-            </a:r>
-            <a:endParaRPr lang="fi-FI" dirty="0"/>
+              <a:rPr lang="en-US" dirty="0"/>
+              <a:t>Environment, tool and project information</a:t>
+            </a:r>
+          </a:p>
+          <a:p>
+            <a:r>
+              <a:rPr lang="en-US" dirty="0"/>
+              <a:t>Architecture introduction</a:t>
+            </a:r>
+          </a:p>
+          <a:p>
+            <a:r>
+              <a:rPr lang="en-US" dirty="0"/>
+              <a:t>Data model - database design and visualization</a:t>
+            </a:r>
+          </a:p>
+          <a:p>
+            <a:r>
+              <a:rPr lang="en-US" dirty="0"/>
+              <a:t>Program code comments</a:t>
+            </a:r>
+          </a:p>
+          <a:p>
+            <a:r>
+              <a:rPr lang="en-US" dirty="0"/>
+              <a:t>API documentation</a:t>
+            </a:r>
           </a:p>
         </p:txBody>
       </p:sp>
@@ -7827,7 +7242,7 @@
           <a:p>
             <a:fld id="{202E1EC2-47B8-044B-A09E-6A63B4D80C87}" type="datetime1">
               <a:rPr lang="fi-FI" smtClean="0"/>
-              <a:t>31.10.2022</a:t>
+              <a:t>3.11.2022</a:t>
             </a:fld>
             <a:endParaRPr lang="en-GB"/>
           </a:p>
@@ -7947,7 +7362,15 @@
           <a:p>
             <a:r>
               <a:rPr lang="fi-FI" dirty="0"/>
-              <a:t>Environment and </a:t>
+              <a:t>Environment, </a:t>
+            </a:r>
+            <a:r>
+              <a:rPr lang="fi-FI" dirty="0" err="1"/>
+              <a:t>tool</a:t>
+            </a:r>
+            <a:r>
+              <a:rPr lang="fi-FI" dirty="0"/>
+              <a:t> and </a:t>
             </a:r>
             <a:r>
               <a:rPr lang="fi-FI" dirty="0" err="1"/>
@@ -7994,774 +7417,68 @@
           <a:lstStyle/>
           <a:p>
             <a:r>
-              <a:rPr lang="fi-FI" b="1" dirty="0" err="1"/>
-              <a:t>Hand-over</a:t>
-            </a:r>
-            <a:r>
-              <a:rPr lang="fi-FI" dirty="0"/>
-              <a:t> is </a:t>
-            </a:r>
-            <a:r>
-              <a:rPr lang="fi-FI" dirty="0" err="1"/>
-              <a:t>importantant</a:t>
-            </a:r>
-            <a:r>
-              <a:rPr lang="fi-FI" dirty="0"/>
-              <a:t> in </a:t>
-            </a:r>
-            <a:r>
-              <a:rPr lang="fi-FI" dirty="0" err="1"/>
-              <a:t>all</a:t>
-            </a:r>
-            <a:r>
-              <a:rPr lang="fi-FI" dirty="0"/>
-              <a:t> </a:t>
-            </a:r>
-            <a:r>
-              <a:rPr lang="fi-FI" dirty="0" err="1"/>
-              <a:t>projects</a:t>
-            </a:r>
-            <a:r>
-              <a:rPr lang="fi-FI" dirty="0"/>
-              <a:t>. </a:t>
-            </a:r>
-            <a:r>
-              <a:rPr lang="fi-FI" dirty="0" err="1"/>
-              <a:t>We</a:t>
-            </a:r>
-            <a:r>
-              <a:rPr lang="fi-FI" dirty="0"/>
-              <a:t> </a:t>
-            </a:r>
-            <a:r>
-              <a:rPr lang="fi-FI" dirty="0" err="1"/>
-              <a:t>never</a:t>
-            </a:r>
-            <a:r>
-              <a:rPr lang="fi-FI" dirty="0"/>
-              <a:t> </a:t>
-            </a:r>
-            <a:r>
-              <a:rPr lang="fi-FI" dirty="0" err="1"/>
-              <a:t>know</a:t>
-            </a:r>
-            <a:r>
-              <a:rPr lang="fi-FI" dirty="0"/>
-              <a:t> </a:t>
-            </a:r>
-            <a:r>
-              <a:rPr lang="fi-FI" dirty="0" err="1"/>
-              <a:t>who</a:t>
-            </a:r>
-            <a:r>
-              <a:rPr lang="fi-FI" dirty="0"/>
-              <a:t> </a:t>
-            </a:r>
-            <a:r>
-              <a:rPr lang="fi-FI" dirty="0" err="1"/>
-              <a:t>might</a:t>
-            </a:r>
-            <a:r>
-              <a:rPr lang="fi-FI" dirty="0"/>
-              <a:t> </a:t>
-            </a:r>
-            <a:r>
-              <a:rPr lang="fi-FI" dirty="0" err="1"/>
-              <a:t>continue</a:t>
-            </a:r>
-            <a:r>
-              <a:rPr lang="fi-FI" dirty="0"/>
-              <a:t> </a:t>
-            </a:r>
-            <a:r>
-              <a:rPr lang="fi-FI" dirty="0" err="1"/>
-              <a:t>with</a:t>
-            </a:r>
-            <a:r>
-              <a:rPr lang="fi-FI" dirty="0"/>
-              <a:t> </a:t>
-            </a:r>
-            <a:r>
-              <a:rPr lang="fi-FI" dirty="0" err="1"/>
-              <a:t>the</a:t>
-            </a:r>
-            <a:r>
-              <a:rPr lang="fi-FI" dirty="0"/>
-              <a:t> </a:t>
-            </a:r>
-            <a:r>
-              <a:rPr lang="fi-FI" dirty="0" err="1"/>
-              <a:t>project</a:t>
-            </a:r>
-            <a:endParaRPr lang="fi-FI" dirty="0"/>
-          </a:p>
-          <a:p>
-            <a:r>
-              <a:rPr lang="fi-FI" dirty="0"/>
-              <a:t>README.md is </a:t>
-            </a:r>
-            <a:r>
-              <a:rPr lang="fi-FI" dirty="0" err="1"/>
-              <a:t>our</a:t>
-            </a:r>
-            <a:r>
-              <a:rPr lang="fi-FI" dirty="0"/>
-              <a:t> </a:t>
-            </a:r>
-            <a:r>
-              <a:rPr lang="fi-FI" dirty="0" err="1"/>
-              <a:t>project</a:t>
-            </a:r>
-            <a:r>
-              <a:rPr lang="fi-FI" dirty="0"/>
-              <a:t> de-facto </a:t>
-            </a:r>
-            <a:r>
-              <a:rPr lang="fi-FI" dirty="0" err="1"/>
-              <a:t>standard</a:t>
-            </a:r>
-            <a:r>
-              <a:rPr lang="fi-FI" dirty="0"/>
-              <a:t>.</a:t>
+              <a:rPr lang="en-US" b="1" dirty="0"/>
+              <a:t>Handover</a:t>
+            </a:r>
+            <a:r>
+              <a:rPr lang="en-US" dirty="0"/>
+              <a:t> is important in all projects. We never know who might continue with the project</a:t>
+            </a:r>
+          </a:p>
+          <a:p>
+            <a:r>
+              <a:rPr lang="en-US" dirty="0"/>
+              <a:t>README.md is our project information de-facto standard.</a:t>
             </a:r>
           </a:p>
           <a:p>
             <a:pPr lvl="1"/>
             <a:r>
-              <a:rPr lang="fi-FI" dirty="0"/>
-              <a:t>Some </a:t>
-            </a:r>
-            <a:r>
-              <a:rPr lang="fi-FI" dirty="0" err="1"/>
-              <a:t>Markdown</a:t>
-            </a:r>
-            <a:r>
-              <a:rPr lang="fi-FI" dirty="0"/>
-              <a:t> </a:t>
-            </a:r>
-            <a:r>
-              <a:rPr lang="fi-FI" dirty="0" err="1"/>
-              <a:t>markup</a:t>
-            </a:r>
-            <a:r>
-              <a:rPr lang="fi-FI" dirty="0"/>
-              <a:t> </a:t>
-            </a:r>
-            <a:r>
-              <a:rPr lang="fi-FI" dirty="0" err="1"/>
-              <a:t>examples</a:t>
-            </a:r>
-            <a:r>
-              <a:rPr lang="fi-FI" dirty="0"/>
-              <a:t> </a:t>
-            </a:r>
-            <a:r>
-              <a:rPr lang="fi-FI" dirty="0" err="1"/>
-              <a:t>given</a:t>
-            </a:r>
-            <a:r>
-              <a:rPr lang="fi-FI" dirty="0"/>
-              <a:t> on </a:t>
-            </a:r>
-            <a:r>
-              <a:rPr lang="fi-FI" dirty="0" err="1"/>
-              <a:t>the</a:t>
-            </a:r>
-            <a:r>
-              <a:rPr lang="fi-FI" dirty="0"/>
-              <a:t> </a:t>
-            </a:r>
-            <a:r>
-              <a:rPr lang="fi-FI" dirty="0" err="1"/>
-              <a:t>course</a:t>
-            </a:r>
-            <a:r>
-              <a:rPr lang="fi-FI" dirty="0"/>
-              <a:t>. </a:t>
-            </a:r>
-            <a:r>
-              <a:rPr lang="fi-FI" dirty="0" err="1"/>
-              <a:t>Check</a:t>
-            </a:r>
-            <a:r>
-              <a:rPr lang="fi-FI" dirty="0"/>
-              <a:t> it out. </a:t>
-            </a:r>
-            <a:r>
-              <a:rPr lang="fi-FI" dirty="0" err="1"/>
-              <a:t>Test</a:t>
-            </a:r>
-            <a:r>
-              <a:rPr lang="fi-FI" dirty="0"/>
-              <a:t> </a:t>
-            </a:r>
-            <a:r>
-              <a:rPr lang="fi-FI" dirty="0" err="1"/>
-              <a:t>whether</a:t>
-            </a:r>
-            <a:r>
-              <a:rPr lang="fi-FI" dirty="0"/>
-              <a:t> </a:t>
-            </a:r>
-            <a:r>
-              <a:rPr lang="fi-FI" dirty="0" err="1"/>
-              <a:t>works</a:t>
-            </a:r>
-            <a:r>
-              <a:rPr lang="fi-FI" dirty="0"/>
-              <a:t> on </a:t>
-            </a:r>
-            <a:r>
-              <a:rPr lang="fi-FI" dirty="0" err="1"/>
-              <a:t>Github</a:t>
-            </a:r>
-            <a:r>
-              <a:rPr lang="fi-FI" dirty="0"/>
-              <a:t> </a:t>
-            </a:r>
-            <a:r>
-              <a:rPr lang="fi-FI" dirty="0" err="1"/>
-              <a:t>pages</a:t>
-            </a:r>
-            <a:r>
-              <a:rPr lang="fi-FI" dirty="0"/>
-              <a:t>.</a:t>
-            </a:r>
-          </a:p>
-          <a:p>
-            <a:r>
-              <a:rPr lang="fi-FI" dirty="0"/>
-              <a:t>Make </a:t>
-            </a:r>
-            <a:r>
-              <a:rPr lang="fi-FI" dirty="0" err="1"/>
-              <a:t>your</a:t>
-            </a:r>
-            <a:r>
-              <a:rPr lang="fi-FI" dirty="0"/>
-              <a:t> </a:t>
-            </a:r>
-            <a:r>
-              <a:rPr lang="fi-FI" dirty="0" err="1"/>
-              <a:t>project</a:t>
-            </a:r>
-            <a:r>
-              <a:rPr lang="fi-FI" dirty="0"/>
-              <a:t> </a:t>
-            </a:r>
-            <a:r>
-              <a:rPr lang="fi-FI" dirty="0" err="1"/>
-              <a:t>installation</a:t>
-            </a:r>
-            <a:r>
-              <a:rPr lang="fi-FI" dirty="0"/>
-              <a:t> and </a:t>
-            </a:r>
-            <a:r>
-              <a:rPr lang="fi-FI" dirty="0" err="1"/>
-              <a:t>configuration</a:t>
-            </a:r>
-            <a:r>
-              <a:rPr lang="fi-FI" dirty="0"/>
-              <a:t> </a:t>
-            </a:r>
-            <a:r>
-              <a:rPr lang="fi-FI" dirty="0" err="1"/>
-              <a:t>clear</a:t>
-            </a:r>
-            <a:r>
-              <a:rPr lang="fi-FI" dirty="0"/>
-              <a:t> to </a:t>
-            </a:r>
-            <a:r>
-              <a:rPr lang="fi-FI" dirty="0" err="1"/>
-              <a:t>the</a:t>
-            </a:r>
-            <a:r>
-              <a:rPr lang="fi-FI" dirty="0"/>
-              <a:t> </a:t>
-            </a:r>
-            <a:r>
-              <a:rPr lang="fi-FI" dirty="0" err="1"/>
-              <a:t>reader</a:t>
-            </a:r>
-            <a:r>
-              <a:rPr lang="fi-FI" dirty="0"/>
-              <a:t>. An </a:t>
-            </a:r>
-            <a:r>
-              <a:rPr lang="fi-FI" dirty="0" err="1"/>
-              <a:t>average</a:t>
-            </a:r>
-            <a:r>
-              <a:rPr lang="fi-FI" dirty="0"/>
-              <a:t> IT </a:t>
-            </a:r>
-            <a:r>
-              <a:rPr lang="fi-FI" dirty="0" err="1"/>
-              <a:t>professional</a:t>
-            </a:r>
-            <a:r>
-              <a:rPr lang="fi-FI" dirty="0"/>
-              <a:t> </a:t>
-            </a:r>
-            <a:r>
-              <a:rPr lang="fi-FI" dirty="0" err="1"/>
-              <a:t>has</a:t>
-            </a:r>
-            <a:r>
-              <a:rPr lang="fi-FI" dirty="0"/>
-              <a:t> to </a:t>
-            </a:r>
-            <a:r>
-              <a:rPr lang="fi-FI" dirty="0" err="1"/>
-              <a:t>be</a:t>
-            </a:r>
-            <a:r>
-              <a:rPr lang="fi-FI" dirty="0"/>
-              <a:t> </a:t>
-            </a:r>
-            <a:r>
-              <a:rPr lang="fi-FI" dirty="0" err="1"/>
-              <a:t>able</a:t>
-            </a:r>
-            <a:r>
-              <a:rPr lang="fi-FI" dirty="0"/>
-              <a:t> to </a:t>
-            </a:r>
-            <a:r>
-              <a:rPr lang="fi-FI" dirty="0" err="1"/>
-              <a:t>setup</a:t>
-            </a:r>
-            <a:r>
-              <a:rPr lang="fi-FI" dirty="0"/>
-              <a:t> </a:t>
-            </a:r>
-            <a:r>
-              <a:rPr lang="fi-FI" dirty="0" err="1"/>
-              <a:t>everything</a:t>
-            </a:r>
-            <a:r>
-              <a:rPr lang="fi-FI" dirty="0"/>
-              <a:t> </a:t>
-            </a:r>
-            <a:r>
-              <a:rPr lang="fi-FI" dirty="0" err="1"/>
-              <a:t>without</a:t>
-            </a:r>
-            <a:r>
-              <a:rPr lang="fi-FI" dirty="0"/>
-              <a:t> </a:t>
-            </a:r>
-            <a:r>
-              <a:rPr lang="fi-FI" dirty="0" err="1"/>
-              <a:t>further</a:t>
-            </a:r>
-            <a:r>
-              <a:rPr lang="fi-FI" dirty="0"/>
-              <a:t> </a:t>
-            </a:r>
-            <a:r>
-              <a:rPr lang="fi-FI" dirty="0" err="1"/>
-              <a:t>assistance</a:t>
-            </a:r>
-            <a:r>
-              <a:rPr lang="fi-FI" dirty="0"/>
-              <a:t>!</a:t>
-            </a:r>
-          </a:p>
-          <a:p>
-            <a:r>
-              <a:rPr lang="fi-FI" dirty="0" err="1"/>
-              <a:t>Don’t</a:t>
-            </a:r>
-            <a:r>
-              <a:rPr lang="fi-FI" dirty="0"/>
-              <a:t> </a:t>
-            </a:r>
-            <a:r>
-              <a:rPr lang="fi-FI" dirty="0" err="1"/>
-              <a:t>write</a:t>
-            </a:r>
-            <a:r>
-              <a:rPr lang="fi-FI" dirty="0"/>
-              <a:t> </a:t>
-            </a:r>
-            <a:r>
-              <a:rPr lang="fi-FI" dirty="0" err="1"/>
-              <a:t>redundant</a:t>
-            </a:r>
-            <a:r>
-              <a:rPr lang="fi-FI" dirty="0"/>
-              <a:t> </a:t>
-            </a:r>
-            <a:r>
-              <a:rPr lang="fi-FI" dirty="0" err="1"/>
-              <a:t>information</a:t>
-            </a:r>
-            <a:r>
-              <a:rPr lang="fi-FI" dirty="0"/>
-              <a:t>. </a:t>
-            </a:r>
-            <a:r>
-              <a:rPr lang="fi-FI" dirty="0" err="1"/>
-              <a:t>Thus</a:t>
-            </a:r>
-            <a:r>
-              <a:rPr lang="fi-FI" dirty="0"/>
-              <a:t> no </a:t>
-            </a:r>
-            <a:r>
-              <a:rPr lang="fi-FI" dirty="0" err="1"/>
-              <a:t>instructions</a:t>
-            </a:r>
-            <a:r>
-              <a:rPr lang="fi-FI" dirty="0"/>
-              <a:t> on </a:t>
-            </a:r>
-            <a:r>
-              <a:rPr lang="fi-FI" dirty="0" err="1"/>
-              <a:t>how</a:t>
-            </a:r>
-            <a:r>
-              <a:rPr lang="fi-FI" dirty="0"/>
-              <a:t> to </a:t>
-            </a:r>
-            <a:r>
-              <a:rPr lang="fi-FI" dirty="0" err="1"/>
-              <a:t>e.g</a:t>
-            </a:r>
-            <a:r>
-              <a:rPr lang="fi-FI" dirty="0"/>
-              <a:t>. </a:t>
-            </a:r>
-            <a:r>
-              <a:rPr lang="fi-FI" dirty="0" err="1"/>
-              <a:t>install</a:t>
-            </a:r>
-            <a:r>
-              <a:rPr lang="fi-FI" dirty="0"/>
-              <a:t> </a:t>
-            </a:r>
-            <a:r>
-              <a:rPr lang="fi-FI" dirty="0" err="1"/>
-              <a:t>Docker</a:t>
-            </a:r>
-            <a:r>
-              <a:rPr lang="fi-FI" dirty="0"/>
-              <a:t>. Just </a:t>
-            </a:r>
-            <a:r>
-              <a:rPr lang="fi-FI" dirty="0" err="1"/>
-              <a:t>list</a:t>
-            </a:r>
-            <a:r>
-              <a:rPr lang="fi-FI" dirty="0"/>
-              <a:t> it as </a:t>
-            </a:r>
-            <a:r>
-              <a:rPr lang="fi-FI" dirty="0" err="1"/>
-              <a:t>pre-requisites</a:t>
-            </a:r>
-            <a:r>
-              <a:rPr lang="fi-FI" dirty="0"/>
-              <a:t> and </a:t>
-            </a:r>
-            <a:r>
-              <a:rPr lang="fi-FI" dirty="0" err="1"/>
-              <a:t>possibly</a:t>
-            </a:r>
-            <a:r>
-              <a:rPr lang="fi-FI" dirty="0"/>
-              <a:t> </a:t>
-            </a:r>
-            <a:r>
-              <a:rPr lang="fi-FI" dirty="0" err="1"/>
-              <a:t>give</a:t>
-            </a:r>
-            <a:r>
-              <a:rPr lang="fi-FI" dirty="0"/>
-              <a:t> </a:t>
-            </a:r>
-            <a:r>
-              <a:rPr lang="fi-FI" dirty="0" err="1"/>
-              <a:t>link</a:t>
-            </a:r>
-            <a:r>
-              <a:rPr lang="fi-FI" dirty="0"/>
-              <a:t> to </a:t>
-            </a:r>
-            <a:r>
-              <a:rPr lang="fi-FI" dirty="0" err="1"/>
-              <a:t>elsewhere</a:t>
-            </a:r>
-            <a:r>
-              <a:rPr lang="fi-FI" dirty="0"/>
-              <a:t>. </a:t>
-            </a:r>
-          </a:p>
-          <a:p>
-            <a:r>
-              <a:rPr lang="fi-FI" dirty="0" err="1"/>
-              <a:t>Remember</a:t>
-            </a:r>
-            <a:r>
-              <a:rPr lang="fi-FI" dirty="0"/>
-              <a:t> to </a:t>
-            </a:r>
-            <a:r>
-              <a:rPr lang="fi-FI" dirty="0" err="1"/>
-              <a:t>explain</a:t>
-            </a:r>
-            <a:r>
-              <a:rPr lang="fi-FI" dirty="0"/>
-              <a:t> </a:t>
-            </a:r>
-            <a:r>
-              <a:rPr lang="fi-FI" dirty="0" err="1"/>
-              <a:t>the</a:t>
-            </a:r>
-            <a:r>
-              <a:rPr lang="fi-FI" dirty="0"/>
-              <a:t> </a:t>
-            </a:r>
-            <a:r>
-              <a:rPr lang="fi-FI" dirty="0" err="1"/>
-              <a:t>gitignored</a:t>
-            </a:r>
-            <a:r>
-              <a:rPr lang="fi-FI" dirty="0"/>
-              <a:t> </a:t>
-            </a:r>
-            <a:r>
-              <a:rPr lang="fi-FI" dirty="0" err="1"/>
-              <a:t>secrets</a:t>
-            </a:r>
-            <a:r>
-              <a:rPr lang="fi-FI" dirty="0"/>
-              <a:t> </a:t>
-            </a:r>
-            <a:r>
-              <a:rPr lang="fi-FI" dirty="0" err="1"/>
-              <a:t>config</a:t>
-            </a:r>
-            <a:r>
-              <a:rPr lang="fi-FI" dirty="0"/>
-              <a:t>! (</a:t>
-            </a:r>
-            <a:r>
-              <a:rPr lang="fi-FI" dirty="0" err="1"/>
-              <a:t>But</a:t>
-            </a:r>
-            <a:r>
-              <a:rPr lang="fi-FI" dirty="0"/>
-              <a:t> no </a:t>
-            </a:r>
-            <a:r>
-              <a:rPr lang="fi-FI" dirty="0" err="1"/>
-              <a:t>real</a:t>
-            </a:r>
-            <a:r>
-              <a:rPr lang="fi-FI" dirty="0"/>
-              <a:t> </a:t>
-            </a:r>
-            <a:r>
-              <a:rPr lang="fi-FI" dirty="0" err="1"/>
-              <a:t>values</a:t>
-            </a:r>
-            <a:r>
-              <a:rPr lang="fi-FI" dirty="0"/>
-              <a:t> to </a:t>
-            </a:r>
-            <a:r>
-              <a:rPr lang="fi-FI" dirty="0" err="1"/>
-              <a:t>the</a:t>
-            </a:r>
-            <a:r>
-              <a:rPr lang="fi-FI" dirty="0"/>
-              <a:t> git repo (</a:t>
-            </a:r>
-            <a:r>
-              <a:rPr lang="fi-FI" dirty="0" err="1"/>
-              <a:t>history</a:t>
-            </a:r>
-            <a:r>
-              <a:rPr lang="fi-FI" dirty="0"/>
-              <a:t>)!)</a:t>
+              <a:rPr lang="en-US" dirty="0"/>
+              <a:t>Some Markdown markup examples given on the course. Check them out. Test whether works on GitHub pages.</a:t>
+            </a:r>
+          </a:p>
+          <a:p>
+            <a:r>
+              <a:rPr lang="en-US" dirty="0"/>
+              <a:t>Make your project installation and configuration clear to the reader. An average IT professional has to be able to setup everything without further assistance!</a:t>
+            </a:r>
+          </a:p>
+          <a:p>
+            <a:r>
+              <a:rPr lang="en-US" dirty="0"/>
+              <a:t>Don’t write redundant information. Thus no instructions on how to e.g. install Docker. Just list it as pre-requisites and possibly give link to elsewhere. </a:t>
+            </a:r>
+          </a:p>
+          <a:p>
+            <a:r>
+              <a:rPr lang="en-US" dirty="0"/>
+              <a:t>Remember to explain the git-ignored secrets config! (But no real values to the git repo (history)!)</a:t>
             </a:r>
           </a:p>
           <a:p>
             <a:pPr lvl="1"/>
             <a:r>
-              <a:rPr lang="fi-FI" dirty="0" err="1"/>
-              <a:t>E.g</a:t>
-            </a:r>
-            <a:r>
-              <a:rPr lang="fi-FI" dirty="0"/>
-              <a:t>. .</a:t>
-            </a:r>
-            <a:r>
-              <a:rPr lang="fi-FI" dirty="0" err="1"/>
-              <a:t>env</a:t>
-            </a:r>
-            <a:r>
-              <a:rPr lang="fi-FI" dirty="0"/>
-              <a:t> </a:t>
-            </a:r>
-            <a:r>
-              <a:rPr lang="fi-FI" dirty="0" err="1"/>
-              <a:t>or</a:t>
-            </a:r>
-            <a:r>
-              <a:rPr lang="fi-FI" dirty="0"/>
-              <a:t> .</a:t>
-            </a:r>
-            <a:r>
-              <a:rPr lang="fi-FI" dirty="0" err="1"/>
+              <a:rPr lang="en-US" dirty="0"/>
+              <a:t>E.g. .env or .</a:t>
+            </a:r>
+            <a:r>
+              <a:rPr lang="en-US" dirty="0" err="1"/>
               <a:t>env.local</a:t>
             </a:r>
             <a:r>
-              <a:rPr lang="fi-FI" dirty="0"/>
-              <a:t> </a:t>
-            </a:r>
-            <a:r>
-              <a:rPr lang="fi-FI" dirty="0" err="1"/>
-              <a:t>file</a:t>
-            </a:r>
-            <a:r>
-              <a:rPr lang="fi-FI" dirty="0"/>
-              <a:t> </a:t>
-            </a:r>
-            <a:r>
-              <a:rPr lang="fi-FI" dirty="0" err="1"/>
-              <a:t>location</a:t>
-            </a:r>
-            <a:r>
-              <a:rPr lang="fi-FI" dirty="0"/>
-              <a:t> and </a:t>
-            </a:r>
-            <a:r>
-              <a:rPr lang="fi-FI" dirty="0" err="1"/>
-              <a:t>model</a:t>
-            </a:r>
-            <a:r>
-              <a:rPr lang="fi-FI" dirty="0"/>
-              <a:t> </a:t>
-            </a:r>
-            <a:r>
-              <a:rPr lang="fi-FI" dirty="0" err="1"/>
-              <a:t>structure</a:t>
-            </a:r>
-            <a:r>
-              <a:rPr lang="fi-FI" dirty="0"/>
-              <a:t> </a:t>
-            </a:r>
-            <a:r>
-              <a:rPr lang="fi-FI" dirty="0" err="1"/>
-              <a:t>with</a:t>
-            </a:r>
-            <a:r>
-              <a:rPr lang="fi-FI" dirty="0"/>
-              <a:t> </a:t>
-            </a:r>
-            <a:r>
-              <a:rPr lang="fi-FI" dirty="0" err="1"/>
-              <a:t>fake</a:t>
-            </a:r>
-            <a:r>
-              <a:rPr lang="fi-FI" dirty="0"/>
-              <a:t> </a:t>
-            </a:r>
-            <a:r>
-              <a:rPr lang="fi-FI" dirty="0" err="1"/>
-              <a:t>values</a:t>
-            </a:r>
-            <a:endParaRPr lang="fi-FI" dirty="0"/>
-          </a:p>
-          <a:p>
-            <a:r>
-              <a:rPr lang="fi-FI" dirty="0" err="1"/>
-              <a:t>Be</a:t>
-            </a:r>
-            <a:r>
-              <a:rPr lang="fi-FI" dirty="0"/>
-              <a:t> </a:t>
-            </a:r>
-            <a:r>
-              <a:rPr lang="fi-FI" dirty="0" err="1"/>
-              <a:t>modular</a:t>
-            </a:r>
-            <a:r>
-              <a:rPr lang="fi-FI" dirty="0"/>
-              <a:t> in </a:t>
-            </a:r>
-            <a:r>
-              <a:rPr lang="fi-FI" dirty="0" err="1"/>
-              <a:t>your</a:t>
-            </a:r>
-            <a:r>
-              <a:rPr lang="fi-FI" dirty="0"/>
-              <a:t> </a:t>
-            </a:r>
-            <a:r>
-              <a:rPr lang="fi-FI" dirty="0" err="1"/>
-              <a:t>explanations</a:t>
-            </a:r>
-            <a:r>
-              <a:rPr lang="fi-FI" dirty="0"/>
-              <a:t>, </a:t>
-            </a:r>
-            <a:r>
-              <a:rPr lang="fi-FI" dirty="0" err="1"/>
-              <a:t>link</a:t>
-            </a:r>
-            <a:r>
-              <a:rPr lang="fi-FI" dirty="0"/>
-              <a:t> to </a:t>
-            </a:r>
-            <a:r>
-              <a:rPr lang="fi-FI" dirty="0" err="1"/>
-              <a:t>to</a:t>
-            </a:r>
-            <a:r>
-              <a:rPr lang="fi-FI" dirty="0"/>
-              <a:t> </a:t>
-            </a:r>
-            <a:r>
-              <a:rPr lang="fi-FI" dirty="0" err="1"/>
-              <a:t>other</a:t>
-            </a:r>
-            <a:r>
-              <a:rPr lang="fi-FI" dirty="0"/>
-              <a:t> .md </a:t>
-            </a:r>
-            <a:r>
-              <a:rPr lang="fi-FI" dirty="0" err="1"/>
-              <a:t>files</a:t>
-            </a:r>
-            <a:r>
-              <a:rPr lang="fi-FI" dirty="0"/>
-              <a:t> in </a:t>
-            </a:r>
-            <a:r>
-              <a:rPr lang="fi-FI" dirty="0" err="1"/>
-              <a:t>the</a:t>
-            </a:r>
-            <a:r>
-              <a:rPr lang="fi-FI" dirty="0"/>
-              <a:t> </a:t>
-            </a:r>
-            <a:r>
-              <a:rPr lang="fi-FI" dirty="0" err="1"/>
-              <a:t>project</a:t>
-            </a:r>
-            <a:r>
-              <a:rPr lang="fi-FI" dirty="0"/>
-              <a:t>.</a:t>
-            </a:r>
-          </a:p>
-          <a:p>
-            <a:endParaRPr lang="fi-FI" dirty="0"/>
+              <a:rPr lang="en-US" dirty="0"/>
+              <a:t> file location and model structure with fake values</a:t>
+            </a:r>
+          </a:p>
+          <a:p>
+            <a:r>
+              <a:rPr lang="en-US" dirty="0"/>
+              <a:t>Be modular in your explanations, link to the other .md files in the project.</a:t>
+            </a:r>
+          </a:p>
+          <a:p>
+            <a:endParaRPr lang="en-US" dirty="0"/>
           </a:p>
         </p:txBody>
       </p:sp>
@@ -8788,7 +7505,7 @@
           <a:p>
             <a:fld id="{202E1EC2-47B8-044B-A09E-6A63B4D80C87}" type="datetime1">
               <a:rPr lang="fi-FI" smtClean="0"/>
-              <a:t>31.10.2022</a:t>
+              <a:t>3.11.2022</a:t>
             </a:fld>
             <a:endParaRPr lang="en-GB"/>
           </a:p>
@@ -8945,692 +7662,91 @@
           <a:lstStyle/>
           <a:p>
             <a:r>
-              <a:rPr lang="fi-FI" dirty="0" err="1"/>
-              <a:t>Give</a:t>
-            </a:r>
-            <a:r>
-              <a:rPr lang="fi-FI" dirty="0"/>
-              <a:t> just </a:t>
-            </a:r>
-            <a:r>
-              <a:rPr lang="fi-FI" dirty="0" err="1"/>
-              <a:t>the</a:t>
-            </a:r>
-            <a:r>
-              <a:rPr lang="fi-FI" dirty="0"/>
-              <a:t> </a:t>
-            </a:r>
-            <a:r>
-              <a:rPr lang="fi-FI" dirty="0" err="1"/>
-              <a:t>big</a:t>
-            </a:r>
-            <a:r>
-              <a:rPr lang="fi-FI" dirty="0"/>
-              <a:t> </a:t>
-            </a:r>
-            <a:r>
-              <a:rPr lang="fi-FI" dirty="0" err="1"/>
-              <a:t>picture</a:t>
-            </a:r>
-            <a:r>
-              <a:rPr lang="fi-FI" dirty="0"/>
-              <a:t>, </a:t>
-            </a:r>
-            <a:r>
-              <a:rPr lang="fi-FI" dirty="0" err="1"/>
-              <a:t>put</a:t>
-            </a:r>
-            <a:r>
-              <a:rPr lang="fi-FI" dirty="0"/>
-              <a:t> </a:t>
-            </a:r>
-            <a:r>
-              <a:rPr lang="fi-FI" dirty="0" err="1"/>
-              <a:t>the</a:t>
-            </a:r>
-            <a:r>
-              <a:rPr lang="fi-FI" dirty="0"/>
-              <a:t> </a:t>
-            </a:r>
-            <a:r>
-              <a:rPr lang="fi-FI" dirty="0" err="1"/>
-              <a:t>reader</a:t>
-            </a:r>
-            <a:r>
-              <a:rPr lang="fi-FI" dirty="0"/>
-              <a:t> on </a:t>
-            </a:r>
-            <a:r>
-              <a:rPr lang="fi-FI" dirty="0" err="1"/>
-              <a:t>the</a:t>
-            </a:r>
-            <a:r>
-              <a:rPr lang="fi-FI" dirty="0"/>
-              <a:t> </a:t>
-            </a:r>
-            <a:r>
-              <a:rPr lang="fi-FI" dirty="0" err="1"/>
-              <a:t>map</a:t>
-            </a:r>
-            <a:endParaRPr lang="fi-FI" dirty="0"/>
-          </a:p>
-          <a:p>
-            <a:r>
-              <a:rPr lang="fi-FI" dirty="0" err="1"/>
-              <a:t>It’s</a:t>
-            </a:r>
-            <a:r>
-              <a:rPr lang="fi-FI" dirty="0"/>
-              <a:t> a </a:t>
-            </a:r>
-            <a:r>
-              <a:rPr lang="fi-FI" dirty="0" err="1"/>
-              <a:t>lot</a:t>
-            </a:r>
-            <a:r>
-              <a:rPr lang="fi-FI" dirty="0"/>
-              <a:t> </a:t>
-            </a:r>
-            <a:r>
-              <a:rPr lang="fi-FI" dirty="0" err="1"/>
-              <a:t>easier</a:t>
-            </a:r>
-            <a:r>
-              <a:rPr lang="fi-FI" dirty="0"/>
-              <a:t> to </a:t>
-            </a:r>
-            <a:r>
-              <a:rPr lang="fi-FI" dirty="0" err="1"/>
-              <a:t>study</a:t>
-            </a:r>
-            <a:r>
-              <a:rPr lang="fi-FI" dirty="0"/>
-              <a:t> </a:t>
-            </a:r>
-            <a:r>
-              <a:rPr lang="fi-FI" dirty="0" err="1"/>
-              <a:t>the</a:t>
-            </a:r>
-            <a:r>
-              <a:rPr lang="fi-FI" dirty="0"/>
-              <a:t> </a:t>
-            </a:r>
-            <a:r>
-              <a:rPr lang="fi-FI" dirty="0" err="1"/>
-              <a:t>project</a:t>
-            </a:r>
-            <a:r>
-              <a:rPr lang="fi-FI" dirty="0"/>
-              <a:t> </a:t>
-            </a:r>
-            <a:r>
-              <a:rPr lang="fi-FI" dirty="0" err="1"/>
-              <a:t>folders</a:t>
-            </a:r>
-            <a:r>
-              <a:rPr lang="fi-FI" dirty="0"/>
-              <a:t> and </a:t>
-            </a:r>
-            <a:r>
-              <a:rPr lang="fi-FI" dirty="0" err="1"/>
-              <a:t>code</a:t>
-            </a:r>
-            <a:r>
-              <a:rPr lang="fi-FI" dirty="0"/>
-              <a:t> </a:t>
-            </a:r>
-            <a:r>
-              <a:rPr lang="fi-FI" dirty="0" err="1"/>
-              <a:t>when</a:t>
-            </a:r>
-            <a:r>
-              <a:rPr lang="fi-FI" dirty="0"/>
-              <a:t> </a:t>
-            </a:r>
-            <a:r>
-              <a:rPr lang="fi-FI" dirty="0" err="1"/>
-              <a:t>you</a:t>
-            </a:r>
-            <a:r>
-              <a:rPr lang="fi-FI" dirty="0"/>
-              <a:t> </a:t>
-            </a:r>
-            <a:r>
-              <a:rPr lang="fi-FI" dirty="0" err="1"/>
-              <a:t>have</a:t>
-            </a:r>
-            <a:r>
-              <a:rPr lang="fi-FI" dirty="0"/>
-              <a:t> some </a:t>
-            </a:r>
-            <a:r>
-              <a:rPr lang="fi-FI" dirty="0" err="1"/>
-              <a:t>kind</a:t>
-            </a:r>
-            <a:r>
-              <a:rPr lang="fi-FI" dirty="0"/>
-              <a:t> of idea </a:t>
-            </a:r>
-            <a:r>
-              <a:rPr lang="fi-FI" dirty="0" err="1"/>
-              <a:t>what</a:t>
-            </a:r>
-            <a:r>
-              <a:rPr lang="fi-FI" dirty="0"/>
-              <a:t> to look for</a:t>
-            </a:r>
-          </a:p>
-          <a:p>
-            <a:r>
-              <a:rPr lang="fi-FI" dirty="0" err="1"/>
-              <a:t>Maybe</a:t>
-            </a:r>
-            <a:r>
-              <a:rPr lang="fi-FI" dirty="0"/>
-              <a:t> some </a:t>
-            </a:r>
-            <a:r>
-              <a:rPr lang="fi-FI" dirty="0" err="1"/>
-              <a:t>rough</a:t>
-            </a:r>
-            <a:r>
-              <a:rPr lang="fi-FI" dirty="0"/>
-              <a:t> </a:t>
-            </a:r>
-            <a:r>
-              <a:rPr lang="fi-FI" dirty="0" err="1"/>
-              <a:t>visualization</a:t>
-            </a:r>
-            <a:r>
-              <a:rPr lang="fi-FI" dirty="0"/>
-              <a:t> of </a:t>
-            </a:r>
-            <a:r>
-              <a:rPr lang="fi-FI" dirty="0" err="1"/>
-              <a:t>the</a:t>
-            </a:r>
-            <a:r>
-              <a:rPr lang="fi-FI" dirty="0"/>
-              <a:t> </a:t>
-            </a:r>
-            <a:r>
-              <a:rPr lang="fi-FI" dirty="0" err="1"/>
-              <a:t>architecture</a:t>
-            </a:r>
-            <a:r>
-              <a:rPr lang="fi-FI" dirty="0"/>
-              <a:t> and </a:t>
-            </a:r>
-            <a:r>
-              <a:rPr lang="fi-FI" dirty="0" err="1"/>
-              <a:t>very</a:t>
-            </a:r>
-            <a:r>
-              <a:rPr lang="fi-FI" dirty="0"/>
-              <a:t> </a:t>
-            </a:r>
-            <a:r>
-              <a:rPr lang="fi-FI" dirty="0" err="1"/>
-              <a:t>brief</a:t>
-            </a:r>
-            <a:r>
-              <a:rPr lang="fi-FI" dirty="0"/>
-              <a:t> </a:t>
-            </a:r>
-            <a:r>
-              <a:rPr lang="fi-FI" dirty="0" err="1"/>
-              <a:t>explanations</a:t>
-            </a:r>
-            <a:r>
-              <a:rPr lang="fi-FI" dirty="0"/>
-              <a:t> of </a:t>
-            </a:r>
-            <a:r>
-              <a:rPr lang="fi-FI" dirty="0" err="1"/>
-              <a:t>each</a:t>
-            </a:r>
-            <a:r>
-              <a:rPr lang="fi-FI" dirty="0"/>
-              <a:t> </a:t>
-            </a:r>
-            <a:r>
-              <a:rPr lang="fi-FI" dirty="0" err="1"/>
-              <a:t>part</a:t>
-            </a:r>
-            <a:r>
-              <a:rPr lang="fi-FI" dirty="0"/>
-              <a:t>?</a:t>
-            </a:r>
-          </a:p>
-          <a:p>
-            <a:r>
-              <a:rPr lang="fi-FI" dirty="0" err="1"/>
-              <a:t>Thus</a:t>
-            </a:r>
-            <a:r>
-              <a:rPr lang="fi-FI" dirty="0"/>
-              <a:t>: </a:t>
-            </a:r>
-            <a:r>
-              <a:rPr lang="fi-FI" dirty="0" err="1"/>
-              <a:t>Less</a:t>
-            </a:r>
-            <a:r>
-              <a:rPr lang="fi-FI" dirty="0"/>
-              <a:t> </a:t>
-            </a:r>
-            <a:r>
-              <a:rPr lang="fi-FI" dirty="0" err="1"/>
-              <a:t>detail</a:t>
-            </a:r>
-            <a:r>
-              <a:rPr lang="fi-FI" dirty="0"/>
-              <a:t> </a:t>
-            </a:r>
-            <a:r>
-              <a:rPr lang="fi-FI" dirty="0" err="1"/>
-              <a:t>than</a:t>
-            </a:r>
-            <a:r>
-              <a:rPr lang="fi-FI" dirty="0"/>
-              <a:t> </a:t>
-            </a:r>
-            <a:r>
-              <a:rPr lang="fi-FI" dirty="0" err="1"/>
-              <a:t>e.g</a:t>
-            </a:r>
-            <a:r>
-              <a:rPr lang="fi-FI" dirty="0"/>
-              <a:t>. in </a:t>
-            </a:r>
-            <a:r>
-              <a:rPr lang="fi-FI" dirty="0" err="1"/>
-              <a:t>exam</a:t>
-            </a:r>
-            <a:r>
-              <a:rPr lang="fi-FI" dirty="0"/>
-              <a:t> </a:t>
-            </a:r>
-            <a:r>
-              <a:rPr lang="fi-FI" dirty="0" err="1"/>
-              <a:t>question</a:t>
-            </a:r>
-            <a:r>
-              <a:rPr lang="fi-FI" dirty="0"/>
-              <a:t> </a:t>
-            </a:r>
-            <a:r>
-              <a:rPr lang="fi-FI" dirty="0" err="1"/>
-              <a:t>explaining</a:t>
-            </a:r>
-            <a:r>
-              <a:rPr lang="fi-FI" dirty="0"/>
-              <a:t> </a:t>
-            </a:r>
-            <a:r>
-              <a:rPr lang="fi-FI" dirty="0" err="1"/>
-              <a:t>the</a:t>
-            </a:r>
-            <a:r>
-              <a:rPr lang="fi-FI" dirty="0"/>
-              <a:t> </a:t>
-            </a:r>
-            <a:r>
-              <a:rPr lang="fi-FI" dirty="0" err="1"/>
-              <a:t>architecture</a:t>
-            </a:r>
-            <a:r>
-              <a:rPr lang="fi-FI" dirty="0"/>
-              <a:t>, </a:t>
-            </a:r>
-            <a:r>
-              <a:rPr lang="fi-FI" dirty="0" err="1"/>
-              <a:t>which</a:t>
-            </a:r>
-            <a:r>
-              <a:rPr lang="fi-FI" dirty="0"/>
-              <a:t> is </a:t>
-            </a:r>
-            <a:r>
-              <a:rPr lang="fi-FI" dirty="0" err="1"/>
-              <a:t>proof</a:t>
-            </a:r>
-            <a:r>
-              <a:rPr lang="fi-FI" dirty="0"/>
-              <a:t> of </a:t>
-            </a:r>
-            <a:r>
-              <a:rPr lang="fi-FI" dirty="0" err="1"/>
-              <a:t>learning</a:t>
-            </a:r>
-            <a:r>
-              <a:rPr lang="fi-FI" dirty="0"/>
-              <a:t>.</a:t>
-            </a:r>
-          </a:p>
-          <a:p>
-            <a:r>
-              <a:rPr lang="fi-FI" dirty="0" err="1"/>
-              <a:t>Possible</a:t>
-            </a:r>
-            <a:r>
-              <a:rPr lang="fi-FI" dirty="0"/>
-              <a:t> just in </a:t>
-            </a:r>
-            <a:r>
-              <a:rPr lang="fi-FI" dirty="0" err="1"/>
-              <a:t>this</a:t>
-            </a:r>
-            <a:r>
-              <a:rPr lang="fi-FI" dirty="0"/>
-              <a:t> </a:t>
-            </a:r>
-            <a:r>
-              <a:rPr lang="fi-FI" dirty="0" err="1"/>
-              <a:t>level</a:t>
-            </a:r>
-            <a:r>
-              <a:rPr lang="fi-FI" dirty="0"/>
-              <a:t>: </a:t>
-            </a:r>
-            <a:r>
-              <a:rPr lang="fi-FI" b="1" dirty="0" err="1"/>
+              <a:rPr lang="en-US" dirty="0"/>
+              <a:t>Give just the big picture, put the reader on the map</a:t>
+            </a:r>
+          </a:p>
+          <a:p>
+            <a:r>
+              <a:rPr lang="en-US" dirty="0"/>
+              <a:t>It’s a lot easier to study the project folders and code when one has some kind of idea what to look for</a:t>
+            </a:r>
+          </a:p>
+          <a:p>
+            <a:r>
+              <a:rPr lang="en-US" dirty="0"/>
+              <a:t>Maybe some rough visualization of the architecture and very brief explanations of each part or module?</a:t>
+            </a:r>
+          </a:p>
+          <a:p>
+            <a:r>
+              <a:rPr lang="en-US" dirty="0"/>
+              <a:t>Thus: Less detail than e.g. in exam question explaining the architecture, which is proof of learning.</a:t>
+            </a:r>
+          </a:p>
+          <a:p>
+            <a:r>
+              <a:rPr lang="en-US" dirty="0"/>
+              <a:t>Possible just in this level: </a:t>
+            </a:r>
+            <a:r>
+              <a:rPr lang="en-US" b="1" dirty="0"/>
               <a:t>Frontend</a:t>
             </a:r>
             <a:r>
-              <a:rPr lang="fi-FI" dirty="0"/>
-              <a:t>: </a:t>
-            </a:r>
-            <a:r>
-              <a:rPr lang="fi-FI" dirty="0" err="1"/>
-              <a:t>React</a:t>
-            </a:r>
-            <a:r>
-              <a:rPr lang="fi-FI" dirty="0"/>
-              <a:t>, </a:t>
-            </a:r>
-            <a:r>
-              <a:rPr lang="fi-FI" dirty="0" err="1"/>
+              <a:rPr lang="en-US" dirty="0"/>
+              <a:t>: React, </a:t>
+            </a:r>
+            <a:r>
+              <a:rPr lang="en-US" dirty="0" err="1"/>
               <a:t>MaterialUI</a:t>
             </a:r>
             <a:r>
-              <a:rPr lang="fi-FI" dirty="0"/>
-              <a:t>, AJAX </a:t>
-            </a:r>
-            <a:r>
-              <a:rPr lang="fi-FI" dirty="0" err="1"/>
-              <a:t>with</a:t>
-            </a:r>
-            <a:r>
-              <a:rPr lang="fi-FI" dirty="0"/>
-              <a:t> </a:t>
-            </a:r>
-            <a:r>
-              <a:rPr lang="fi-FI" dirty="0" err="1"/>
+              <a:rPr lang="en-US" dirty="0"/>
+              <a:t>, AJAX with </a:t>
+            </a:r>
+            <a:r>
+              <a:rPr lang="en-US" dirty="0" err="1"/>
               <a:t>Axios</a:t>
             </a:r>
             <a:r>
-              <a:rPr lang="fi-FI" dirty="0"/>
-              <a:t>, </a:t>
-            </a:r>
-            <a:r>
-              <a:rPr lang="fi-FI" dirty="0" err="1"/>
-              <a:t>react-router-dom</a:t>
-            </a:r>
-            <a:r>
-              <a:rPr lang="fi-FI" dirty="0"/>
-              <a:t> (v6 </a:t>
-            </a:r>
-            <a:r>
-              <a:rPr lang="fi-FI" dirty="0" err="1"/>
-              <a:t>routing</a:t>
-            </a:r>
-            <a:r>
-              <a:rPr lang="fi-FI" dirty="0"/>
-              <a:t> </a:t>
-            </a:r>
-            <a:r>
-              <a:rPr lang="fi-FI" dirty="0" err="1"/>
-              <a:t>contexts</a:t>
-            </a:r>
-            <a:r>
-              <a:rPr lang="fi-FI" dirty="0"/>
-              <a:t> </a:t>
-            </a:r>
-            <a:r>
-              <a:rPr lang="fi-FI" dirty="0" err="1"/>
-              <a:t>used</a:t>
-            </a:r>
-            <a:r>
-              <a:rPr lang="fi-FI" dirty="0"/>
-              <a:t>). </a:t>
+              <a:rPr lang="en-US" dirty="0"/>
+              <a:t>, react-router-</a:t>
+            </a:r>
+            <a:r>
+              <a:rPr lang="en-US" dirty="0" err="1"/>
+              <a:t>dom</a:t>
+            </a:r>
+            <a:r>
+              <a:rPr lang="en-US" dirty="0"/>
+              <a:t> (v6 routing contexts used). </a:t>
             </a:r>
           </a:p>
           <a:p>
             <a:pPr lvl="1"/>
             <a:r>
-              <a:rPr lang="fi-FI" dirty="0" err="1"/>
-              <a:t>Would</a:t>
-            </a:r>
-            <a:r>
-              <a:rPr lang="fi-FI" dirty="0"/>
-              <a:t> it </a:t>
-            </a:r>
-            <a:r>
-              <a:rPr lang="fi-FI" dirty="0" err="1"/>
-              <a:t>be</a:t>
-            </a:r>
-            <a:r>
-              <a:rPr lang="fi-FI" dirty="0"/>
-              <a:t> </a:t>
-            </a:r>
-            <a:r>
-              <a:rPr lang="fi-FI" dirty="0" err="1"/>
-              <a:t>possible</a:t>
-            </a:r>
-            <a:r>
-              <a:rPr lang="fi-FI" dirty="0"/>
-              <a:t> to </a:t>
-            </a:r>
-            <a:r>
-              <a:rPr lang="fi-FI" dirty="0" err="1"/>
-              <a:t>link</a:t>
-            </a:r>
-            <a:r>
-              <a:rPr lang="fi-FI" dirty="0"/>
-              <a:t> to </a:t>
-            </a:r>
-            <a:r>
-              <a:rPr lang="fi-FI" dirty="0" err="1"/>
-              <a:t>e.g</a:t>
-            </a:r>
-            <a:r>
-              <a:rPr lang="fi-FI" dirty="0"/>
-              <a:t>. </a:t>
-            </a:r>
-            <a:r>
-              <a:rPr lang="fi-FI" dirty="0" err="1"/>
-              <a:t>the</a:t>
-            </a:r>
-            <a:r>
-              <a:rPr lang="fi-FI" dirty="0"/>
-              <a:t> </a:t>
-            </a:r>
-            <a:r>
-              <a:rPr lang="fi-FI" dirty="0" err="1"/>
-              <a:t>library</a:t>
-            </a:r>
-            <a:r>
-              <a:rPr lang="fi-FI" dirty="0"/>
-              <a:t> </a:t>
-            </a:r>
-            <a:r>
-              <a:rPr lang="fi-FI" dirty="0" err="1"/>
-              <a:t>list</a:t>
-            </a:r>
-            <a:r>
-              <a:rPr lang="fi-FI" dirty="0"/>
-              <a:t> in </a:t>
-            </a:r>
-            <a:r>
-              <a:rPr lang="fi-FI" dirty="0" err="1"/>
+              <a:rPr lang="en-US" dirty="0"/>
+              <a:t>Would it be possible to link to e.g. the library list in </a:t>
+            </a:r>
+            <a:r>
+              <a:rPr lang="en-US" dirty="0" err="1"/>
               <a:t>package.json</a:t>
             </a:r>
             <a:r>
-              <a:rPr lang="fi-FI" dirty="0"/>
-              <a:t> of a </a:t>
-            </a:r>
-            <a:r>
-              <a:rPr lang="fi-FI" dirty="0" err="1"/>
-              <a:t>Node</a:t>
-            </a:r>
-            <a:r>
-              <a:rPr lang="fi-FI" dirty="0"/>
-              <a:t> </a:t>
-            </a:r>
-            <a:r>
-              <a:rPr lang="fi-FI" dirty="0" err="1"/>
-              <a:t>project</a:t>
-            </a:r>
-            <a:r>
-              <a:rPr lang="fi-FI" dirty="0"/>
-              <a:t>?</a:t>
-            </a:r>
-          </a:p>
-          <a:p>
-            <a:r>
-              <a:rPr lang="fi-FI" dirty="0" err="1"/>
-              <a:t>Keep</a:t>
-            </a:r>
-            <a:r>
-              <a:rPr lang="fi-FI" dirty="0"/>
-              <a:t> </a:t>
-            </a:r>
-            <a:r>
-              <a:rPr lang="fi-FI" dirty="0" err="1"/>
-              <a:t>this</a:t>
-            </a:r>
-            <a:r>
-              <a:rPr lang="fi-FI" dirty="0"/>
-              <a:t> </a:t>
-            </a:r>
-            <a:r>
-              <a:rPr lang="fi-FI" dirty="0" err="1"/>
-              <a:t>simple</a:t>
-            </a:r>
-            <a:r>
-              <a:rPr lang="fi-FI" dirty="0"/>
-              <a:t> and as </a:t>
-            </a:r>
-            <a:r>
-              <a:rPr lang="fi-FI" dirty="0" err="1"/>
-              <a:t>short</a:t>
-            </a:r>
-            <a:r>
-              <a:rPr lang="fi-FI" dirty="0"/>
-              <a:t> as </a:t>
-            </a:r>
-            <a:r>
-              <a:rPr lang="fi-FI" dirty="0" err="1"/>
-              <a:t>possible</a:t>
-            </a:r>
-            <a:r>
-              <a:rPr lang="fi-FI" dirty="0"/>
-              <a:t>. </a:t>
-            </a:r>
-          </a:p>
-          <a:p>
-            <a:r>
-              <a:rPr lang="fi-FI" dirty="0"/>
-              <a:t>And </a:t>
-            </a:r>
-            <a:r>
-              <a:rPr lang="fi-FI" dirty="0" err="1"/>
-              <a:t>so</a:t>
-            </a:r>
-            <a:r>
-              <a:rPr lang="fi-FI" dirty="0"/>
-              <a:t> </a:t>
-            </a:r>
-            <a:r>
-              <a:rPr lang="fi-FI" dirty="0" err="1"/>
-              <a:t>generic</a:t>
-            </a:r>
-            <a:r>
-              <a:rPr lang="fi-FI" dirty="0"/>
-              <a:t> </a:t>
-            </a:r>
-            <a:r>
-              <a:rPr lang="fi-FI" dirty="0" err="1"/>
-              <a:t>that</a:t>
-            </a:r>
-            <a:r>
-              <a:rPr lang="fi-FI" dirty="0"/>
-              <a:t> </a:t>
-            </a:r>
-            <a:r>
-              <a:rPr lang="fi-FI" dirty="0" err="1"/>
-              <a:t>there</a:t>
-            </a:r>
-            <a:r>
-              <a:rPr lang="fi-FI" dirty="0"/>
-              <a:t> </a:t>
-            </a:r>
-            <a:r>
-              <a:rPr lang="fi-FI" dirty="0" err="1"/>
-              <a:t>should</a:t>
-            </a:r>
-            <a:r>
-              <a:rPr lang="fi-FI" dirty="0"/>
-              <a:t> </a:t>
-            </a:r>
-            <a:r>
-              <a:rPr lang="fi-FI" dirty="0" err="1"/>
-              <a:t>not</a:t>
-            </a:r>
-            <a:r>
-              <a:rPr lang="fi-FI" dirty="0"/>
-              <a:t> </a:t>
-            </a:r>
-            <a:r>
-              <a:rPr lang="fi-FI" dirty="0" err="1"/>
-              <a:t>be</a:t>
-            </a:r>
-            <a:r>
-              <a:rPr lang="fi-FI" dirty="0"/>
-              <a:t> </a:t>
-            </a:r>
-            <a:r>
-              <a:rPr lang="fi-FI" dirty="0" err="1"/>
-              <a:t>much</a:t>
-            </a:r>
-            <a:r>
-              <a:rPr lang="fi-FI" dirty="0"/>
-              <a:t> </a:t>
-            </a:r>
-            <a:r>
-              <a:rPr lang="fi-FI" dirty="0" err="1"/>
-              <a:t>need</a:t>
-            </a:r>
-            <a:r>
-              <a:rPr lang="fi-FI" dirty="0"/>
-              <a:t> for </a:t>
-            </a:r>
-            <a:r>
-              <a:rPr lang="fi-FI" dirty="0" err="1"/>
-              <a:t>changes</a:t>
-            </a:r>
-            <a:r>
-              <a:rPr lang="fi-FI" dirty="0"/>
-              <a:t> </a:t>
-            </a:r>
-            <a:r>
-              <a:rPr lang="fi-FI" dirty="0" err="1"/>
-              <a:t>later</a:t>
-            </a:r>
-            <a:r>
-              <a:rPr lang="fi-FI" dirty="0"/>
-              <a:t>.</a:t>
+              <a:rPr lang="en-US" dirty="0"/>
+              <a:t> of a Node project?</a:t>
+            </a:r>
+          </a:p>
+          <a:p>
+            <a:r>
+              <a:rPr lang="en-US" dirty="0"/>
+              <a:t>Keep this simple and as short as possible. </a:t>
+            </a:r>
+          </a:p>
+          <a:p>
+            <a:r>
+              <a:rPr lang="en-US" dirty="0"/>
+              <a:t>Keep this so generic that there should not be much need for changes later.</a:t>
             </a:r>
           </a:p>
         </p:txBody>
@@ -9658,7 +7774,7 @@
           <a:p>
             <a:fld id="{202E1EC2-47B8-044B-A09E-6A63B4D80C87}" type="datetime1">
               <a:rPr lang="fi-FI" smtClean="0"/>
-              <a:t>31.10.2022</a:t>
+              <a:t>3.11.2022</a:t>
             </a:fld>
             <a:endParaRPr lang="en-GB"/>
           </a:p>
@@ -9906,7 +8022,7 @@
             </a:r>
             <a:r>
               <a:rPr lang="en-US" strike="sngStrike" dirty="0"/>
-              <a:t>client, contact, lead</a:t>
+              <a:t>client, buyer, consumer, lead</a:t>
             </a:r>
             <a:r>
               <a:rPr lang="en-US" dirty="0"/>
@@ -9925,7 +8041,7 @@
             </a:r>
             <a:r>
               <a:rPr lang="en-US" dirty="0"/>
-              <a:t>: ft? m? km?</a:t>
+              <a:t>: ft? m? km? max? min? accuracy?</a:t>
             </a:r>
           </a:p>
           <a:p>
@@ -9952,7 +8068,7 @@
           <a:p>
             <a:r>
               <a:rPr lang="en-US" dirty="0"/>
-              <a:t>Then we could avoid having separate database documents? All generated from scripts?</a:t>
+              <a:t>Then we could avoid having separate database documents at all? All generated from scripts?</a:t>
             </a:r>
           </a:p>
         </p:txBody>
@@ -9980,7 +8096,7 @@
           <a:p>
             <a:fld id="{202E1EC2-47B8-044B-A09E-6A63B4D80C87}" type="datetime1">
               <a:rPr lang="fi-FI" smtClean="0"/>
-              <a:t>31.10.2022</a:t>
+              <a:t>3.11.2022</a:t>
             </a:fld>
             <a:endParaRPr lang="en-GB"/>
           </a:p>
@@ -10194,7 +8310,7 @@
             </a:r>
             <a:r>
               <a:rPr lang="fi-FI" dirty="0" err="1"/>
-              <a:t>Instead</a:t>
+              <a:t>Rather</a:t>
             </a:r>
             <a:r>
               <a:rPr lang="fi-FI" dirty="0"/>
@@ -10205,7 +8321,7 @@
               <a:t>try</a:t>
             </a:r>
             <a:r>
-              <a:rPr lang="fi-FI" dirty="0"/>
+              <a:rPr lang="fi-FI"/>
               <a:t> to </a:t>
             </a:r>
             <a:r>
@@ -10935,7 +9051,7 @@
           <a:p>
             <a:fld id="{202E1EC2-47B8-044B-A09E-6A63B4D80C87}" type="datetime1">
               <a:rPr lang="fi-FI" smtClean="0"/>
-              <a:t>31.10.2022</a:t>
+              <a:t>3.11.2022</a:t>
             </a:fld>
             <a:endParaRPr lang="en-GB"/>
           </a:p>
@@ -11671,7 +9787,7 @@
           <a:p>
             <a:fld id="{202E1EC2-47B8-044B-A09E-6A63B4D80C87}" type="datetime1">
               <a:rPr lang="fi-FI" smtClean="0"/>
-              <a:t>31.10.2022</a:t>
+              <a:t>3.11.2022</a:t>
             </a:fld>
             <a:endParaRPr lang="en-GB"/>
           </a:p>
@@ -12301,6 +10417,24 @@
 </file>
 
 <file path=customXml/item1.xml><?xml version="1.0" encoding="utf-8"?>
+<?mso-contentType ?>
+<FormTemplates xmlns="http://schemas.microsoft.com/sharepoint/v3/contenttype/forms">
+  <Display>DocumentLibraryForm</Display>
+  <Edit>DocumentLibraryForm</Edit>
+  <New>DocumentLibraryForm</New>
+</FormTemplates>
+</file>
+
+<file path=customXml/item2.xml><?xml version="1.0" encoding="utf-8"?>
+<p:properties xmlns:p="http://schemas.microsoft.com/office/2006/metadata/properties" xmlns:xsi="http://www.w3.org/2001/XMLSchema-instance" xmlns:pc="http://schemas.microsoft.com/office/infopath/2007/PartnerControls">
+  <documentManagement>
+    <PublishingExpirationDate xmlns="http://schemas.microsoft.com/sharepoint/v3" xsi:nil="true"/>
+    <PublishingStartDate xmlns="http://schemas.microsoft.com/sharepoint/v3" xsi:nil="true"/>
+  </documentManagement>
+</p:properties>
+</file>
+
+<file path=customXml/item3.xml><?xml version="1.0" encoding="utf-8"?>
 <ct:contentTypeSchema xmlns:ct="http://schemas.microsoft.com/office/2006/metadata/contentType" xmlns:ma="http://schemas.microsoft.com/office/2006/metadata/properties/metaAttributes" ct:_="" ma:_="" ma:contentTypeName="Document" ma:contentTypeID="0x01010024C55B41993A414DABB8DD07ACBA0814" ma:contentTypeVersion="1" ma:contentTypeDescription="Create a new document." ma:contentTypeScope="" ma:versionID="3ea0c22b5866975a7b271665de4056c5">
   <xsd:schema xmlns:xsd="http://www.w3.org/2001/XMLSchema" xmlns:xs="http://www.w3.org/2001/XMLSchema" xmlns:p="http://schemas.microsoft.com/office/2006/metadata/properties" xmlns:ns1="http://schemas.microsoft.com/sharepoint/v3" targetNamespace="http://schemas.microsoft.com/office/2006/metadata/properties" ma:root="true" ma:fieldsID="ef2aa9ed40e72a78c3822fc753b43e87" ns1:_="">
     <xsd:import namespace="http://schemas.microsoft.com/sharepoint/v3"/>
@@ -12432,38 +10566,10 @@
 </ct:contentTypeSchema>
 </file>
 
-<file path=customXml/item2.xml><?xml version="1.0" encoding="utf-8"?>
-<p:properties xmlns:p="http://schemas.microsoft.com/office/2006/metadata/properties" xmlns:xsi="http://www.w3.org/2001/XMLSchema-instance" xmlns:pc="http://schemas.microsoft.com/office/infopath/2007/PartnerControls">
-  <documentManagement>
-    <PublishingExpirationDate xmlns="http://schemas.microsoft.com/sharepoint/v3" xsi:nil="true"/>
-    <PublishingStartDate xmlns="http://schemas.microsoft.com/sharepoint/v3" xsi:nil="true"/>
-  </documentManagement>
-</p:properties>
-</file>
-
-<file path=customXml/item3.xml><?xml version="1.0" encoding="utf-8"?>
-<?mso-contentType ?>
-<FormTemplates xmlns="http://schemas.microsoft.com/sharepoint/v3/contenttype/forms">
-  <Display>DocumentLibraryForm</Display>
-  <Edit>DocumentLibraryForm</Edit>
-  <New>DocumentLibraryForm</New>
-</FormTemplates>
-</file>
-
 <file path=customXml/itemProps1.xml><?xml version="1.0" encoding="utf-8"?>
-<ds:datastoreItem xmlns:ds="http://schemas.openxmlformats.org/officeDocument/2006/customXml" ds:itemID="{B9E4DC25-62AA-44A0-8D5C-DB44892588AF}">
+<ds:datastoreItem xmlns:ds="http://schemas.openxmlformats.org/officeDocument/2006/customXml" ds:itemID="{D546C03B-CD3A-4EA0-AAA4-0E00E896454E}">
   <ds:schemaRefs>
-    <ds:schemaRef ds:uri="http://schemas.microsoft.com/office/2006/metadata/contentType"/>
-    <ds:schemaRef ds:uri="http://schemas.microsoft.com/office/2006/metadata/properties/metaAttributes"/>
-    <ds:schemaRef ds:uri="http://www.w3.org/2001/XMLSchema"/>
-    <ds:schemaRef ds:uri="http://schemas.microsoft.com/office/2006/metadata/properties"/>
-    <ds:schemaRef ds:uri="http://schemas.microsoft.com/sharepoint/v3"/>
-    <ds:schemaRef ds:uri="http://schemas.microsoft.com/office/2006/documentManagement/types"/>
-    <ds:schemaRef ds:uri="http://schemas.microsoft.com/office/infopath/2007/PartnerControls"/>
-    <ds:schemaRef ds:uri="http://schemas.openxmlformats.org/package/2006/metadata/core-properties"/>
-    <ds:schemaRef ds:uri="http://purl.org/dc/elements/1.1/"/>
-    <ds:schemaRef ds:uri="http://purl.org/dc/terms/"/>
-    <ds:schemaRef ds:uri="http://schemas.microsoft.com/internal/obd"/>
+    <ds:schemaRef ds:uri="http://schemas.microsoft.com/sharepoint/v3/contenttype/forms"/>
   </ds:schemaRefs>
 </ds:datastoreItem>
 </file>
@@ -12485,9 +10591,19 @@
 </file>
 
 <file path=customXml/itemProps3.xml><?xml version="1.0" encoding="utf-8"?>
-<ds:datastoreItem xmlns:ds="http://schemas.openxmlformats.org/officeDocument/2006/customXml" ds:itemID="{D546C03B-CD3A-4EA0-AAA4-0E00E896454E}">
+<ds:datastoreItem xmlns:ds="http://schemas.openxmlformats.org/officeDocument/2006/customXml" ds:itemID="{B9E4DC25-62AA-44A0-8D5C-DB44892588AF}">
   <ds:schemaRefs>
-    <ds:schemaRef ds:uri="http://schemas.microsoft.com/sharepoint/v3/contenttype/forms"/>
+    <ds:schemaRef ds:uri="http://schemas.microsoft.com/office/2006/metadata/contentType"/>
+    <ds:schemaRef ds:uri="http://schemas.microsoft.com/office/2006/metadata/properties/metaAttributes"/>
+    <ds:schemaRef ds:uri="http://www.w3.org/2001/XMLSchema"/>
+    <ds:schemaRef ds:uri="http://schemas.microsoft.com/office/2006/metadata/properties"/>
+    <ds:schemaRef ds:uri="http://schemas.microsoft.com/sharepoint/v3"/>
+    <ds:schemaRef ds:uri="http://schemas.microsoft.com/office/2006/documentManagement/types"/>
+    <ds:schemaRef ds:uri="http://schemas.microsoft.com/office/infopath/2007/PartnerControls"/>
+    <ds:schemaRef ds:uri="http://schemas.openxmlformats.org/package/2006/metadata/core-properties"/>
+    <ds:schemaRef ds:uri="http://purl.org/dc/elements/1.1/"/>
+    <ds:schemaRef ds:uri="http://purl.org/dc/terms/"/>
+    <ds:schemaRef ds:uri="http://schemas.microsoft.com/internal/obd"/>
   </ds:schemaRefs>
 </ds:datastoreItem>
 </file>
</xml_diff>

<commit_message>
Polishing the project documentation guidelines or opinions till the last page
</commit_message>
<xml_diff>
--- a/06_ohjelmistoarkkitehtuurit_ja_patternit/documentation_principles_for_sw_projects.pptx
+++ b/06_ohjelmistoarkkitehtuurit_ja_patternit/documentation_principles_for_sw_projects.pptx
@@ -7687,7 +7687,7 @@
           <a:p>
             <a:r>
               <a:rPr lang="en-US" dirty="0"/>
-              <a:t>Possible just in this level: </a:t>
+              <a:t>Possible just on this level: </a:t>
             </a:r>
             <a:r>
               <a:rPr lang="en-US" b="1" dirty="0"/>
@@ -8261,770 +8261,92 @@
           <a:lstStyle/>
           <a:p>
             <a:r>
-              <a:rPr lang="fi-FI" dirty="0" err="1"/>
-              <a:t>First</a:t>
-            </a:r>
-            <a:r>
-              <a:rPr lang="fi-FI" dirty="0"/>
-              <a:t> </a:t>
-            </a:r>
-            <a:r>
-              <a:rPr lang="fi-FI" dirty="0" err="1"/>
-              <a:t>rule</a:t>
-            </a:r>
-            <a:r>
-              <a:rPr lang="fi-FI" dirty="0"/>
-              <a:t>: </a:t>
-            </a:r>
-            <a:r>
-              <a:rPr lang="fi-FI" dirty="0" err="1"/>
-              <a:t>Avoid</a:t>
-            </a:r>
-            <a:r>
-              <a:rPr lang="fi-FI" dirty="0"/>
-              <a:t> </a:t>
-            </a:r>
-            <a:r>
-              <a:rPr lang="fi-FI" dirty="0" err="1"/>
-              <a:t>need</a:t>
-            </a:r>
-            <a:r>
-              <a:rPr lang="fi-FI" dirty="0"/>
-              <a:t> for </a:t>
-            </a:r>
-            <a:r>
-              <a:rPr lang="fi-FI" dirty="0" err="1"/>
-              <a:t>code</a:t>
-            </a:r>
-            <a:r>
-              <a:rPr lang="fi-FI" dirty="0"/>
-              <a:t> </a:t>
-            </a:r>
-            <a:r>
-              <a:rPr lang="fi-FI" dirty="0" err="1"/>
-              <a:t>comments</a:t>
-            </a:r>
-            <a:r>
-              <a:rPr lang="fi-FI" dirty="0"/>
-              <a:t>. </a:t>
-            </a:r>
-            <a:r>
-              <a:rPr lang="fi-FI" dirty="0" err="1"/>
-              <a:t>Rather</a:t>
-            </a:r>
-            <a:r>
-              <a:rPr lang="fi-FI" dirty="0"/>
-              <a:t> </a:t>
-            </a:r>
-            <a:r>
-              <a:rPr lang="fi-FI" dirty="0" err="1"/>
-              <a:t>try</a:t>
-            </a:r>
-            <a:r>
-              <a:rPr lang="fi-FI"/>
-              <a:t> to </a:t>
-            </a:r>
-            <a:r>
-              <a:rPr lang="fi-FI" dirty="0" err="1"/>
-              <a:t>make</a:t>
-            </a:r>
-            <a:r>
-              <a:rPr lang="fi-FI" dirty="0"/>
-              <a:t> </a:t>
-            </a:r>
-            <a:r>
-              <a:rPr lang="fi-FI" dirty="0" err="1"/>
-              <a:t>your</a:t>
-            </a:r>
-            <a:r>
-              <a:rPr lang="fi-FI" dirty="0"/>
-              <a:t> </a:t>
-            </a:r>
-            <a:r>
-              <a:rPr lang="fi-FI" dirty="0" err="1"/>
-              <a:t>code</a:t>
-            </a:r>
-            <a:r>
-              <a:rPr lang="fi-FI" dirty="0"/>
-              <a:t> </a:t>
-            </a:r>
-            <a:r>
-              <a:rPr lang="fi-FI" dirty="0" err="1"/>
-              <a:t>clear</a:t>
-            </a:r>
-            <a:r>
-              <a:rPr lang="fi-FI" dirty="0"/>
-              <a:t> </a:t>
-            </a:r>
-            <a:r>
-              <a:rPr lang="fi-FI" dirty="0" err="1"/>
-              <a:t>with</a:t>
-            </a:r>
-            <a:r>
-              <a:rPr lang="fi-FI" dirty="0"/>
-              <a:t> </a:t>
-            </a:r>
-            <a:r>
-              <a:rPr lang="fi-FI" dirty="0" err="1"/>
-              <a:t>naming</a:t>
-            </a:r>
-            <a:r>
-              <a:rPr lang="fi-FI" dirty="0"/>
-              <a:t> </a:t>
-            </a:r>
-            <a:r>
-              <a:rPr lang="fi-FI" dirty="0" err="1"/>
-              <a:t>conventions</a:t>
-            </a:r>
-            <a:r>
-              <a:rPr lang="fi-FI" dirty="0"/>
-              <a:t> and </a:t>
-            </a:r>
-            <a:r>
-              <a:rPr lang="fi-FI" dirty="0" err="1"/>
-              <a:t>folder</a:t>
-            </a:r>
-            <a:r>
-              <a:rPr lang="fi-FI" dirty="0"/>
-              <a:t> </a:t>
-            </a:r>
-            <a:r>
-              <a:rPr lang="fi-FI" dirty="0" err="1"/>
+              <a:rPr lang="en-US" dirty="0"/>
+              <a:t>First rule: Avoid need for the code comments. Rather try to make your code clear with naming conventions and folder structure</a:t>
+            </a:r>
+          </a:p>
+          <a:p>
+            <a:pPr lvl="1"/>
+            <a:r>
+              <a:rPr lang="en-US" dirty="0"/>
+              <a:t>Folder </a:t>
+            </a:r>
+            <a:r>
+              <a:rPr lang="en-US" b="1" dirty="0"/>
               <a:t>structure</a:t>
             </a:r>
-            <a:endParaRPr lang="fi-FI" dirty="0"/>
           </a:p>
           <a:p>
             <a:pPr lvl="1"/>
             <a:r>
-              <a:rPr lang="fi-FI" dirty="0" err="1"/>
-              <a:t>Folder</a:t>
-            </a:r>
-            <a:r>
-              <a:rPr lang="fi-FI" dirty="0"/>
-              <a:t> </a:t>
-            </a:r>
-            <a:r>
-              <a:rPr lang="fi-FI" b="1" dirty="0" err="1"/>
-              <a:t>structure</a:t>
-            </a:r>
-            <a:endParaRPr lang="fi-FI" b="1" dirty="0"/>
+              <a:rPr lang="en-US" b="1" dirty="0"/>
+              <a:t>Naming</a:t>
+            </a:r>
+            <a:r>
+              <a:rPr lang="en-US" dirty="0"/>
+              <a:t>: Folders, files, classes, modules, functions, variables, attributes of objects</a:t>
+            </a:r>
           </a:p>
           <a:p>
             <a:pPr lvl="1"/>
             <a:r>
-              <a:rPr lang="fi-FI" b="1" dirty="0" err="1"/>
-              <a:t>Naming</a:t>
-            </a:r>
-            <a:r>
-              <a:rPr lang="fi-FI" dirty="0"/>
-              <a:t>: </a:t>
-            </a:r>
-            <a:r>
-              <a:rPr lang="fi-FI" dirty="0" err="1"/>
-              <a:t>Folders</a:t>
-            </a:r>
-            <a:r>
-              <a:rPr lang="fi-FI" dirty="0"/>
-              <a:t>, </a:t>
-            </a:r>
-            <a:r>
-              <a:rPr lang="fi-FI" dirty="0" err="1"/>
-              <a:t>files</a:t>
-            </a:r>
-            <a:r>
-              <a:rPr lang="fi-FI" dirty="0"/>
-              <a:t>, </a:t>
-            </a:r>
-            <a:r>
-              <a:rPr lang="fi-FI" dirty="0" err="1"/>
-              <a:t>classes</a:t>
-            </a:r>
-            <a:r>
-              <a:rPr lang="fi-FI" dirty="0"/>
-              <a:t>, </a:t>
-            </a:r>
-            <a:r>
-              <a:rPr lang="fi-FI" dirty="0" err="1"/>
-              <a:t>modules</a:t>
-            </a:r>
-            <a:r>
-              <a:rPr lang="fi-FI" dirty="0"/>
-              <a:t>, </a:t>
-            </a:r>
-            <a:r>
-              <a:rPr lang="fi-FI" dirty="0" err="1"/>
-              <a:t>functions</a:t>
-            </a:r>
-            <a:r>
-              <a:rPr lang="fi-FI" dirty="0"/>
-              <a:t>, </a:t>
-            </a:r>
-            <a:r>
-              <a:rPr lang="fi-FI" dirty="0" err="1"/>
-              <a:t>variables</a:t>
-            </a:r>
-            <a:r>
-              <a:rPr lang="fi-FI" dirty="0"/>
-              <a:t>, </a:t>
-            </a:r>
-            <a:r>
-              <a:rPr lang="fi-FI" dirty="0" err="1"/>
-              <a:t>attributes</a:t>
-            </a:r>
-            <a:r>
-              <a:rPr lang="fi-FI" dirty="0"/>
-              <a:t> of </a:t>
-            </a:r>
-            <a:r>
-              <a:rPr lang="fi-FI" dirty="0" err="1"/>
-              <a:t>objects</a:t>
-            </a:r>
-            <a:endParaRPr lang="fi-FI" dirty="0"/>
-          </a:p>
-          <a:p>
-            <a:r>
-              <a:rPr lang="fi-FI" dirty="0" err="1"/>
-              <a:t>Then</a:t>
-            </a:r>
-            <a:r>
-              <a:rPr lang="fi-FI" dirty="0"/>
-              <a:t>, </a:t>
-            </a:r>
-            <a:r>
-              <a:rPr lang="fi-FI" dirty="0" err="1"/>
-              <a:t>if</a:t>
-            </a:r>
-            <a:r>
-              <a:rPr lang="fi-FI" dirty="0"/>
-              <a:t> </a:t>
-            </a:r>
-            <a:r>
-              <a:rPr lang="fi-FI" dirty="0" err="1"/>
-              <a:t>still</a:t>
-            </a:r>
-            <a:r>
-              <a:rPr lang="fi-FI" dirty="0"/>
-              <a:t> </a:t>
-            </a:r>
-            <a:r>
-              <a:rPr lang="fi-FI" dirty="0" err="1"/>
-              <a:t>needed</a:t>
-            </a:r>
-            <a:r>
-              <a:rPr lang="fi-FI" dirty="0"/>
-              <a:t>, </a:t>
-            </a:r>
-            <a:r>
-              <a:rPr lang="fi-FI" dirty="0" err="1"/>
-              <a:t>explain</a:t>
-            </a:r>
-            <a:r>
-              <a:rPr lang="fi-FI" dirty="0"/>
-              <a:t> </a:t>
-            </a:r>
-            <a:r>
-              <a:rPr lang="fi-FI" dirty="0" err="1"/>
-              <a:t>the</a:t>
-            </a:r>
-            <a:r>
-              <a:rPr lang="fi-FI" dirty="0"/>
-              <a:t> </a:t>
-            </a:r>
-            <a:r>
-              <a:rPr lang="fi-FI" dirty="0" err="1"/>
-              <a:t>confusing</a:t>
-            </a:r>
-            <a:r>
-              <a:rPr lang="fi-FI" dirty="0"/>
-              <a:t>, </a:t>
-            </a:r>
-            <a:r>
-              <a:rPr lang="fi-FI" dirty="0" err="1"/>
-              <a:t>irregular</a:t>
-            </a:r>
-            <a:r>
-              <a:rPr lang="fi-FI" dirty="0"/>
-              <a:t>/</a:t>
-            </a:r>
-            <a:r>
-              <a:rPr lang="fi-FI" dirty="0" err="1"/>
-              <a:t>unconventional</a:t>
-            </a:r>
-            <a:r>
-              <a:rPr lang="fi-FI" dirty="0"/>
-              <a:t>/ </a:t>
-            </a:r>
-            <a:r>
-              <a:rPr lang="fi-FI" dirty="0" err="1"/>
-              <a:t>or</a:t>
-            </a:r>
-            <a:r>
-              <a:rPr lang="fi-FI" dirty="0"/>
-              <a:t> </a:t>
-            </a:r>
-            <a:r>
-              <a:rPr lang="fi-FI" dirty="0" err="1"/>
-              <a:t>complicated</a:t>
-            </a:r>
-            <a:r>
-              <a:rPr lang="fi-FI" dirty="0"/>
-              <a:t> </a:t>
-            </a:r>
-            <a:r>
-              <a:rPr lang="fi-FI" dirty="0" err="1"/>
-              <a:t>parts</a:t>
-            </a:r>
-            <a:r>
-              <a:rPr lang="fi-FI" dirty="0"/>
-              <a:t> </a:t>
-            </a:r>
-            <a:r>
-              <a:rPr lang="fi-FI" dirty="0" err="1"/>
-              <a:t>only</a:t>
-            </a:r>
-            <a:endParaRPr lang="fi-FI" dirty="0"/>
-          </a:p>
-          <a:p>
-            <a:r>
-              <a:rPr lang="fi-FI" dirty="0" err="1"/>
-              <a:t>Less</a:t>
-            </a:r>
-            <a:r>
-              <a:rPr lang="fi-FI" dirty="0"/>
-              <a:t> is </a:t>
-            </a:r>
-            <a:r>
-              <a:rPr lang="fi-FI" dirty="0" err="1"/>
-              <a:t>more</a:t>
-            </a:r>
-            <a:r>
-              <a:rPr lang="fi-FI" dirty="0"/>
-              <a:t>. </a:t>
-            </a:r>
-            <a:r>
-              <a:rPr lang="fi-FI" dirty="0" err="1"/>
-              <a:t>Quality</a:t>
-            </a:r>
-            <a:r>
-              <a:rPr lang="fi-FI" dirty="0"/>
-              <a:t> </a:t>
-            </a:r>
-            <a:r>
-              <a:rPr lang="fi-FI" dirty="0" err="1"/>
-              <a:t>over</a:t>
-            </a:r>
-            <a:r>
-              <a:rPr lang="fi-FI" dirty="0"/>
-              <a:t> </a:t>
-            </a:r>
-            <a:r>
-              <a:rPr lang="fi-FI" dirty="0" err="1"/>
-              <a:t>quantity</a:t>
-            </a:r>
-            <a:r>
-              <a:rPr lang="fi-FI" dirty="0"/>
-              <a:t>. </a:t>
-            </a:r>
-            <a:r>
-              <a:rPr lang="fi-FI" dirty="0" err="1"/>
-              <a:t>Think</a:t>
-            </a:r>
-            <a:r>
-              <a:rPr lang="fi-FI" dirty="0"/>
-              <a:t> </a:t>
-            </a:r>
-            <a:r>
-              <a:rPr lang="fi-FI" dirty="0" err="1"/>
-              <a:t>from</a:t>
-            </a:r>
-            <a:r>
-              <a:rPr lang="fi-FI" dirty="0"/>
-              <a:t> </a:t>
-            </a:r>
-            <a:r>
-              <a:rPr lang="fi-FI" dirty="0" err="1"/>
-              <a:t>reader’s</a:t>
-            </a:r>
-            <a:r>
-              <a:rPr lang="fi-FI" dirty="0"/>
-              <a:t> </a:t>
-            </a:r>
-            <a:r>
-              <a:rPr lang="fi-FI" dirty="0" err="1"/>
-              <a:t>point</a:t>
-            </a:r>
-            <a:r>
-              <a:rPr lang="fi-FI" dirty="0"/>
-              <a:t> of </a:t>
-            </a:r>
-            <a:r>
-              <a:rPr lang="fi-FI" dirty="0" err="1"/>
-              <a:t>view</a:t>
-            </a:r>
-            <a:r>
-              <a:rPr lang="fi-FI" dirty="0"/>
-              <a:t> and </a:t>
-            </a:r>
-            <a:r>
-              <a:rPr lang="fi-FI" dirty="0" err="1"/>
-              <a:t>starting</a:t>
-            </a:r>
-            <a:r>
-              <a:rPr lang="fi-FI" dirty="0"/>
-              <a:t> </a:t>
-            </a:r>
-            <a:r>
-              <a:rPr lang="fi-FI" dirty="0" err="1"/>
-              <a:t>point</a:t>
-            </a:r>
-            <a:r>
-              <a:rPr lang="fi-FI" dirty="0"/>
-              <a:t>, </a:t>
-            </a:r>
-            <a:r>
-              <a:rPr lang="fi-FI" dirty="0" err="1"/>
-              <a:t>not</a:t>
-            </a:r>
-            <a:r>
-              <a:rPr lang="fi-FI" dirty="0"/>
-              <a:t> </a:t>
-            </a:r>
-            <a:r>
-              <a:rPr lang="fi-FI" dirty="0" err="1"/>
-              <a:t>yours</a:t>
-            </a:r>
-            <a:r>
-              <a:rPr lang="fi-FI" dirty="0"/>
-              <a:t>.</a:t>
-            </a:r>
-          </a:p>
-          <a:p>
-            <a:r>
-              <a:rPr lang="fi-FI" dirty="0" err="1"/>
-              <a:t>Try</a:t>
-            </a:r>
-            <a:r>
-              <a:rPr lang="fi-FI" dirty="0"/>
-              <a:t> to </a:t>
-            </a:r>
-            <a:r>
-              <a:rPr lang="fi-FI" dirty="0" err="1"/>
-              <a:t>understand</a:t>
-            </a:r>
-            <a:r>
-              <a:rPr lang="fi-FI" dirty="0"/>
-              <a:t> </a:t>
-            </a:r>
-            <a:r>
-              <a:rPr lang="fi-FI" dirty="0" err="1"/>
-              <a:t>thing</a:t>
-            </a:r>
-            <a:r>
-              <a:rPr lang="fi-FI" dirty="0"/>
-              <a:t> </a:t>
-            </a:r>
-            <a:r>
-              <a:rPr lang="fi-FI" dirty="0" err="1"/>
-              <a:t>incorrectly</a:t>
-            </a:r>
-            <a:r>
-              <a:rPr lang="fi-FI" dirty="0"/>
-              <a:t>, </a:t>
-            </a:r>
-            <a:r>
-              <a:rPr lang="fi-FI" dirty="0" err="1"/>
-              <a:t>if</a:t>
-            </a:r>
-            <a:r>
-              <a:rPr lang="fi-FI" dirty="0"/>
-              <a:t> </a:t>
-            </a:r>
-            <a:r>
-              <a:rPr lang="fi-FI" dirty="0" err="1"/>
-              <a:t>possible</a:t>
-            </a:r>
-            <a:r>
-              <a:rPr lang="fi-FI" dirty="0"/>
-              <a:t>, </a:t>
-            </a:r>
-            <a:r>
-              <a:rPr lang="fi-FI" dirty="0" err="1"/>
-              <a:t>improve</a:t>
-            </a:r>
-            <a:r>
-              <a:rPr lang="fi-FI" dirty="0"/>
-              <a:t>.</a:t>
-            </a:r>
-          </a:p>
-          <a:p>
-            <a:r>
-              <a:rPr lang="fi-FI" dirty="0" err="1"/>
-              <a:t>Sometimes</a:t>
-            </a:r>
-            <a:r>
-              <a:rPr lang="fi-FI" dirty="0"/>
-              <a:t> </a:t>
-            </a:r>
-            <a:r>
-              <a:rPr lang="fi-FI" dirty="0" err="1"/>
-              <a:t>writing</a:t>
-            </a:r>
-            <a:r>
-              <a:rPr lang="fi-FI" dirty="0"/>
-              <a:t> </a:t>
-            </a:r>
-            <a:r>
-              <a:rPr lang="fi-FI" dirty="0" err="1"/>
-              <a:t>longer</a:t>
-            </a:r>
-            <a:r>
-              <a:rPr lang="fi-FI" dirty="0"/>
-              <a:t> </a:t>
-            </a:r>
-            <a:r>
-              <a:rPr lang="fi-FI" dirty="0" err="1"/>
-              <a:t>code</a:t>
-            </a:r>
-            <a:r>
-              <a:rPr lang="fi-FI" dirty="0"/>
-              <a:t> </a:t>
-            </a:r>
-            <a:r>
-              <a:rPr lang="fi-FI" dirty="0" err="1"/>
-              <a:t>helps</a:t>
-            </a:r>
-            <a:r>
-              <a:rPr lang="fi-FI" dirty="0"/>
-              <a:t>, </a:t>
-            </a:r>
-            <a:r>
-              <a:rPr lang="fi-FI" dirty="0" err="1"/>
-              <a:t>optimize</a:t>
-            </a:r>
-            <a:r>
-              <a:rPr lang="fi-FI" dirty="0"/>
-              <a:t> </a:t>
-            </a:r>
-            <a:r>
-              <a:rPr lang="fi-FI" dirty="0" err="1"/>
-              <a:t>reading</a:t>
-            </a:r>
-            <a:r>
-              <a:rPr lang="fi-FI" dirty="0"/>
-              <a:t> </a:t>
-            </a:r>
-            <a:r>
-              <a:rPr lang="fi-FI" dirty="0" err="1"/>
-              <a:t>speed</a:t>
-            </a:r>
-            <a:r>
-              <a:rPr lang="fi-FI" dirty="0"/>
-              <a:t>, </a:t>
-            </a:r>
-            <a:r>
-              <a:rPr lang="fi-FI" dirty="0" err="1"/>
-              <a:t>never</a:t>
-            </a:r>
-            <a:r>
-              <a:rPr lang="fi-FI" dirty="0"/>
-              <a:t> </a:t>
-            </a:r>
-            <a:r>
-              <a:rPr lang="fi-FI" dirty="0" err="1"/>
-              <a:t>the</a:t>
-            </a:r>
-            <a:r>
-              <a:rPr lang="fi-FI" dirty="0"/>
-              <a:t> </a:t>
-            </a:r>
-            <a:r>
-              <a:rPr lang="fi-FI" dirty="0" err="1"/>
-              <a:t>writing</a:t>
-            </a:r>
-            <a:r>
-              <a:rPr lang="fi-FI" dirty="0"/>
-              <a:t> </a:t>
-            </a:r>
-            <a:r>
-              <a:rPr lang="fi-FI" dirty="0" err="1"/>
-              <a:t>speed</a:t>
-            </a:r>
-            <a:r>
-              <a:rPr lang="fi-FI" dirty="0"/>
-              <a:t>.</a:t>
-            </a:r>
-          </a:p>
-          <a:p>
-            <a:r>
-              <a:rPr lang="fi-FI" dirty="0" err="1"/>
-              <a:t>E.g</a:t>
-            </a:r>
-            <a:r>
-              <a:rPr lang="fi-FI" dirty="0"/>
-              <a:t>. </a:t>
-            </a:r>
-            <a:r>
-              <a:rPr lang="fi-FI" dirty="0" err="1"/>
-              <a:t>changing</a:t>
-            </a:r>
-            <a:r>
-              <a:rPr lang="fi-FI" dirty="0"/>
-              <a:t> </a:t>
-            </a:r>
-            <a:r>
-              <a:rPr lang="fi-FI" dirty="0" err="1"/>
-              <a:t>from</a:t>
-            </a:r>
-            <a:r>
-              <a:rPr lang="fi-FI" dirty="0"/>
-              <a:t> </a:t>
-            </a:r>
-            <a:r>
-              <a:rPr lang="fi-FI" dirty="0" err="1"/>
-              <a:t>the</a:t>
-            </a:r>
-            <a:r>
-              <a:rPr lang="fi-FI" dirty="0"/>
-              <a:t> </a:t>
-            </a:r>
-            <a:r>
-              <a:rPr lang="fi-FI" b="1" dirty="0"/>
+              <a:rPr lang="en-US" dirty="0"/>
+              <a:t>Simple tricks help: e.g. ProductList.js and </a:t>
+            </a:r>
+            <a:r>
+              <a:rPr lang="en-US" dirty="0" err="1"/>
+              <a:t>ProductListStyle.xyz</a:t>
+            </a:r>
+            <a:r>
+              <a:rPr lang="en-US" dirty="0"/>
+              <a:t> stay alphabetically close in folder listing.</a:t>
+            </a:r>
+          </a:p>
+          <a:p>
+            <a:r>
+              <a:rPr lang="en-US" dirty="0"/>
+              <a:t>Then, if still needed, explain the confusing, irregular/unconventional/ or complicated parts only</a:t>
+            </a:r>
+          </a:p>
+          <a:p>
+            <a:r>
+              <a:rPr lang="en-US" dirty="0"/>
+              <a:t>Less is more. Quality over quantity. Think from reader’s point of view and starting point, not yours.</a:t>
+            </a:r>
+          </a:p>
+          <a:p>
+            <a:r>
+              <a:rPr lang="en-US" dirty="0"/>
+              <a:t>Try to understand things incorrectly, if possible, improve.</a:t>
+            </a:r>
+          </a:p>
+          <a:p>
+            <a:r>
+              <a:rPr lang="en-US" dirty="0"/>
+              <a:t>Sometimes writing longer code helps, optimize reading speed, never the writing speed.</a:t>
+            </a:r>
+          </a:p>
+          <a:p>
+            <a:r>
+              <a:rPr lang="en-US" dirty="0"/>
+              <a:t>E.g. changing from the </a:t>
+            </a:r>
+            <a:r>
+              <a:rPr lang="en-US" b="1" dirty="0"/>
               <a:t>a ? b : c </a:t>
             </a:r>
             <a:r>
-              <a:rPr lang="fi-FI" dirty="0" err="1"/>
-              <a:t>ternary</a:t>
-            </a:r>
-            <a:r>
-              <a:rPr lang="fi-FI" dirty="0"/>
-              <a:t> </a:t>
-            </a:r>
-            <a:r>
-              <a:rPr lang="fi-FI" dirty="0" err="1"/>
-              <a:t>operator</a:t>
-            </a:r>
-            <a:r>
-              <a:rPr lang="fi-FI" dirty="0"/>
-              <a:t> to </a:t>
-            </a:r>
-            <a:r>
-              <a:rPr lang="fi-FI" b="1" dirty="0" err="1"/>
+              <a:rPr lang="en-US" dirty="0"/>
+              <a:t>ternary operator to </a:t>
+            </a:r>
+            <a:r>
+              <a:rPr lang="en-US" b="1" dirty="0"/>
               <a:t>if-else</a:t>
             </a:r>
             <a:r>
-              <a:rPr lang="fi-FI" dirty="0"/>
-              <a:t> </a:t>
-            </a:r>
-            <a:r>
-              <a:rPr lang="fi-FI" dirty="0" err="1"/>
-              <a:t>might</a:t>
-            </a:r>
-            <a:r>
-              <a:rPr lang="fi-FI" dirty="0"/>
-              <a:t> help </a:t>
-            </a:r>
-            <a:r>
-              <a:rPr lang="fi-FI" dirty="0" err="1"/>
-              <a:t>the</a:t>
-            </a:r>
-            <a:r>
-              <a:rPr lang="fi-FI" dirty="0"/>
-              <a:t> </a:t>
-            </a:r>
-            <a:r>
-              <a:rPr lang="fi-FI" dirty="0" err="1"/>
-              <a:t>readability</a:t>
-            </a:r>
-            <a:r>
-              <a:rPr lang="fi-FI" dirty="0"/>
-              <a:t> of </a:t>
-            </a:r>
-            <a:r>
-              <a:rPr lang="fi-FI" dirty="0" err="1"/>
-              <a:t>the</a:t>
-            </a:r>
-            <a:r>
-              <a:rPr lang="fi-FI" dirty="0"/>
-              <a:t> </a:t>
-            </a:r>
-            <a:r>
-              <a:rPr lang="fi-FI" dirty="0" err="1"/>
-              <a:t>code</a:t>
-            </a:r>
-            <a:r>
-              <a:rPr lang="fi-FI" dirty="0"/>
-              <a:t> and </a:t>
-            </a:r>
-            <a:r>
-              <a:rPr lang="fi-FI" dirty="0" err="1"/>
-              <a:t>e.g</a:t>
-            </a:r>
-            <a:r>
-              <a:rPr lang="fi-FI" dirty="0"/>
-              <a:t>. </a:t>
-            </a:r>
-            <a:r>
-              <a:rPr lang="fi-FI" dirty="0" err="1"/>
-              <a:t>allow</a:t>
-            </a:r>
-            <a:r>
-              <a:rPr lang="fi-FI" dirty="0"/>
-              <a:t> </a:t>
-            </a:r>
-            <a:r>
-              <a:rPr lang="fi-FI" dirty="0" err="1"/>
-              <a:t>using</a:t>
-            </a:r>
-            <a:r>
-              <a:rPr lang="fi-FI" dirty="0"/>
-              <a:t> </a:t>
-            </a:r>
-            <a:r>
-              <a:rPr lang="fi-FI" dirty="0" err="1"/>
-              <a:t>explanatory</a:t>
-            </a:r>
-            <a:r>
-              <a:rPr lang="fi-FI" dirty="0"/>
-              <a:t> </a:t>
-            </a:r>
-            <a:r>
-              <a:rPr lang="fi-FI" dirty="0" err="1"/>
-              <a:t>variable</a:t>
-            </a:r>
-            <a:r>
-              <a:rPr lang="fi-FI" dirty="0"/>
-              <a:t> </a:t>
-            </a:r>
-            <a:r>
-              <a:rPr lang="fi-FI" dirty="0" err="1"/>
-              <a:t>names</a:t>
-            </a:r>
-            <a:r>
-              <a:rPr lang="fi-FI" dirty="0"/>
-              <a:t> and </a:t>
-            </a:r>
-            <a:r>
-              <a:rPr lang="fi-FI" dirty="0" err="1"/>
-              <a:t>comments</a:t>
-            </a:r>
-            <a:r>
-              <a:rPr lang="fi-FI" dirty="0"/>
-              <a:t> </a:t>
-            </a:r>
-            <a:r>
-              <a:rPr lang="fi-FI" dirty="0" err="1"/>
-              <a:t>next</a:t>
-            </a:r>
-            <a:r>
-              <a:rPr lang="fi-FI" dirty="0"/>
-              <a:t> to </a:t>
-            </a:r>
-            <a:r>
-              <a:rPr lang="fi-FI" dirty="0" err="1"/>
-              <a:t>lines</a:t>
-            </a:r>
-            <a:endParaRPr lang="fi-FI" dirty="0"/>
+              <a:rPr lang="en-US" dirty="0"/>
+              <a:t> might help the readability of the code and e.g. allow using explanatory variable names and comments next to lines</a:t>
+            </a:r>
           </a:p>
         </p:txBody>
       </p:sp>
@@ -9203,564 +8525,126 @@
         </p:spPr>
         <p:txBody>
           <a:bodyPr>
-            <a:normAutofit/>
+            <a:normAutofit fontScale="92500"/>
           </a:bodyPr>
           <a:lstStyle/>
           <a:p>
             <a:r>
-              <a:rPr lang="fi-FI" dirty="0"/>
-              <a:t>Libraries </a:t>
-            </a:r>
-            <a:r>
-              <a:rPr lang="fi-FI" dirty="0" err="1"/>
-              <a:t>exist</a:t>
-            </a:r>
-            <a:r>
-              <a:rPr lang="fi-FI" dirty="0"/>
-              <a:t> for </a:t>
-            </a:r>
-            <a:r>
-              <a:rPr lang="fi-FI" dirty="0" err="1"/>
-              <a:t>generating</a:t>
-            </a:r>
-            <a:r>
-              <a:rPr lang="fi-FI" dirty="0"/>
-              <a:t> API </a:t>
-            </a:r>
-            <a:r>
-              <a:rPr lang="fi-FI" dirty="0" err="1"/>
-              <a:t>documentation</a:t>
-            </a:r>
-            <a:r>
-              <a:rPr lang="fi-FI" dirty="0"/>
-              <a:t> </a:t>
-            </a:r>
-            <a:r>
-              <a:rPr lang="fi-FI" dirty="0" err="1"/>
-              <a:t>based</a:t>
-            </a:r>
-            <a:r>
-              <a:rPr lang="fi-FI" dirty="0"/>
-              <a:t> on </a:t>
-            </a:r>
-            <a:r>
-              <a:rPr lang="fi-FI" dirty="0" err="1"/>
-              <a:t>the</a:t>
-            </a:r>
-            <a:r>
-              <a:rPr lang="fi-FI" dirty="0"/>
-              <a:t> API (</a:t>
-            </a:r>
-            <a:r>
-              <a:rPr lang="fi-FI" dirty="0" err="1"/>
-              <a:t>the</a:t>
-            </a:r>
-            <a:r>
-              <a:rPr lang="fi-FI" dirty="0"/>
-              <a:t> </a:t>
-            </a:r>
-            <a:r>
-              <a:rPr lang="fi-FI" dirty="0" err="1"/>
-              <a:t>interface</a:t>
-            </a:r>
-            <a:r>
-              <a:rPr lang="fi-FI" dirty="0"/>
-              <a:t>)</a:t>
-            </a:r>
-          </a:p>
-          <a:p>
-            <a:r>
-              <a:rPr lang="fi-FI" dirty="0" err="1"/>
-              <a:t>We</a:t>
-            </a:r>
-            <a:r>
-              <a:rPr lang="fi-FI" dirty="0"/>
-              <a:t> just </a:t>
-            </a:r>
-            <a:r>
-              <a:rPr lang="fi-FI" dirty="0" err="1"/>
-              <a:t>need</a:t>
-            </a:r>
-            <a:r>
-              <a:rPr lang="fi-FI" dirty="0"/>
-              <a:t> to </a:t>
-            </a:r>
-            <a:r>
-              <a:rPr lang="fi-FI" dirty="0" err="1"/>
-              <a:t>add</a:t>
-            </a:r>
-            <a:r>
-              <a:rPr lang="fi-FI" dirty="0"/>
-              <a:t> </a:t>
-            </a:r>
-            <a:r>
-              <a:rPr lang="fi-FI" dirty="0" err="1"/>
-              <a:t>possible</a:t>
-            </a:r>
-            <a:r>
-              <a:rPr lang="fi-FI" dirty="0"/>
-              <a:t> </a:t>
-            </a:r>
-            <a:r>
-              <a:rPr lang="fi-FI" dirty="0" err="1"/>
+              <a:rPr lang="en-US" sz="2000" dirty="0"/>
+              <a:t>Libraries exist for generating API documentation based on the API (the interface)</a:t>
+            </a:r>
+          </a:p>
+          <a:p>
+            <a:r>
+              <a:rPr lang="en-US" sz="2000" dirty="0"/>
+              <a:t>We just need to add possible </a:t>
+            </a:r>
+            <a:r>
+              <a:rPr lang="en-US" sz="2000" dirty="0" err="1"/>
               <a:t>commentation</a:t>
             </a:r>
             <a:r>
-              <a:rPr lang="fi-FI" dirty="0"/>
-              <a:t> as some </a:t>
-            </a:r>
-            <a:r>
-              <a:rPr lang="fi-FI" dirty="0" err="1"/>
-              <a:t>kind</a:t>
-            </a:r>
-            <a:r>
-              <a:rPr lang="fi-FI" dirty="0"/>
-              <a:t> of </a:t>
-            </a:r>
-            <a:r>
-              <a:rPr lang="fi-FI" dirty="0" err="1"/>
-              <a:t>annotation</a:t>
-            </a:r>
-            <a:r>
-              <a:rPr lang="fi-FI" dirty="0"/>
-              <a:t> </a:t>
-            </a:r>
-            <a:r>
-              <a:rPr lang="fi-FI" dirty="0" err="1"/>
-              <a:t>or</a:t>
-            </a:r>
-            <a:r>
-              <a:rPr lang="fi-FI" dirty="0"/>
-              <a:t> </a:t>
-            </a:r>
-            <a:r>
-              <a:rPr lang="fi-FI" dirty="0" err="1"/>
-              <a:t>javadoc-kind</a:t>
-            </a:r>
-            <a:r>
-              <a:rPr lang="fi-FI" dirty="0"/>
-              <a:t> of </a:t>
-            </a:r>
-            <a:r>
-              <a:rPr lang="fi-FI" dirty="0" err="1"/>
-              <a:t>comments</a:t>
-            </a:r>
-            <a:endParaRPr lang="fi-FI" dirty="0"/>
+              <a:rPr lang="en-US" sz="2000" dirty="0"/>
+              <a:t> as some kind of annotation or </a:t>
+            </a:r>
+            <a:r>
+              <a:rPr lang="en-US" sz="2000" dirty="0" err="1"/>
+              <a:t>javadoc</a:t>
+            </a:r>
+            <a:r>
+              <a:rPr lang="en-US" sz="2000" dirty="0"/>
+              <a:t>-kind of comments</a:t>
+            </a:r>
           </a:p>
           <a:p>
             <a:pPr lvl="1"/>
             <a:r>
-              <a:rPr lang="fi-FI" dirty="0"/>
-              <a:t>(</a:t>
-            </a:r>
-            <a:r>
-              <a:rPr lang="fi-FI" dirty="0" err="1"/>
-              <a:t>Javadoc</a:t>
-            </a:r>
-            <a:r>
-              <a:rPr lang="fi-FI" dirty="0"/>
-              <a:t>: Write </a:t>
-            </a:r>
-            <a:r>
-              <a:rPr lang="fi-FI" dirty="0" err="1"/>
-              <a:t>comments</a:t>
-            </a:r>
-            <a:r>
-              <a:rPr lang="fi-FI" dirty="0"/>
-              <a:t> on </a:t>
-            </a:r>
-            <a:r>
-              <a:rPr lang="fi-FI" dirty="0" err="1"/>
-              <a:t>certain</a:t>
-            </a:r>
-            <a:r>
-              <a:rPr lang="fi-FI" dirty="0"/>
-              <a:t> </a:t>
-            </a:r>
-            <a:r>
-              <a:rPr lang="fi-FI" dirty="0" err="1"/>
-              <a:t>style</a:t>
-            </a:r>
-            <a:r>
-              <a:rPr lang="fi-FI" dirty="0"/>
-              <a:t> and </a:t>
-            </a:r>
-            <a:r>
-              <a:rPr lang="fi-FI" dirty="0" err="1"/>
-              <a:t>they</a:t>
-            </a:r>
-            <a:r>
-              <a:rPr lang="fi-FI" dirty="0"/>
-              <a:t> go to </a:t>
-            </a:r>
-            <a:r>
-              <a:rPr lang="fi-FI" dirty="0" err="1"/>
-              <a:t>the</a:t>
-            </a:r>
-            <a:r>
-              <a:rPr lang="fi-FI" dirty="0"/>
-              <a:t> </a:t>
-            </a:r>
-            <a:r>
-              <a:rPr lang="fi-FI" dirty="0" err="1"/>
+              <a:rPr lang="en-US" sz="1800" dirty="0"/>
+              <a:t>(Javadoc: Write comments on certain style and they go to the </a:t>
+            </a:r>
+            <a:r>
+              <a:rPr lang="en-US" sz="1800" dirty="0" err="1"/>
               <a:t>javadoc</a:t>
             </a:r>
             <a:r>
-              <a:rPr lang="fi-FI" dirty="0"/>
-              <a:t> </a:t>
-            </a:r>
-            <a:r>
-              <a:rPr lang="fi-FI" dirty="0" err="1"/>
-              <a:t>tool</a:t>
-            </a:r>
-            <a:r>
-              <a:rPr lang="fi-FI" dirty="0"/>
-              <a:t> </a:t>
-            </a:r>
-            <a:r>
-              <a:rPr lang="fi-FI" dirty="0" err="1"/>
-              <a:t>generated</a:t>
-            </a:r>
-            <a:r>
-              <a:rPr lang="fi-FI" dirty="0"/>
-              <a:t> HTML etc. </a:t>
-            </a:r>
-            <a:r>
-              <a:rPr lang="fi-FI" dirty="0" err="1"/>
-              <a:t>Documentation</a:t>
-            </a:r>
-            <a:r>
-              <a:rPr lang="fi-FI" dirty="0"/>
-              <a:t>)</a:t>
+              <a:rPr lang="en-US" sz="1800" dirty="0"/>
+              <a:t> tool generated HTML etc. Documentation)</a:t>
+            </a:r>
+          </a:p>
+          <a:p>
+            <a:pPr lvl="2"/>
+            <a:r>
+              <a:rPr lang="en-US" sz="1800" dirty="0" err="1"/>
+              <a:t>Someting</a:t>
+            </a:r>
+            <a:r>
+              <a:rPr lang="en-US" sz="1800" dirty="0"/>
+              <a:t> like /** */ instead of /* */  </a:t>
+            </a:r>
+          </a:p>
+          <a:p>
+            <a:pPr lvl="2"/>
+            <a:r>
+              <a:rPr lang="en-US" sz="1800" dirty="0"/>
+              <a:t>With parameter etc. annotations with @</a:t>
             </a:r>
           </a:p>
           <a:p>
             <a:pPr lvl="1"/>
             <a:r>
-              <a:rPr lang="fi-FI" dirty="0"/>
-              <a:t>Microsoft </a:t>
-            </a:r>
-            <a:r>
-              <a:rPr lang="fi-FI" dirty="0" err="1"/>
-              <a:t>had</a:t>
-            </a:r>
-            <a:r>
-              <a:rPr lang="fi-FI" dirty="0"/>
-              <a:t> </a:t>
-            </a:r>
-            <a:r>
-              <a:rPr lang="fi-FI" dirty="0" err="1"/>
-              <a:t>similar</a:t>
-            </a:r>
-            <a:r>
-              <a:rPr lang="fi-FI" dirty="0"/>
-              <a:t> </a:t>
-            </a:r>
-            <a:r>
-              <a:rPr lang="fi-FI" dirty="0" err="1"/>
-              <a:t>thing</a:t>
-            </a:r>
-            <a:r>
-              <a:rPr lang="fi-FI" dirty="0"/>
-              <a:t> </a:t>
-            </a:r>
-            <a:r>
-              <a:rPr lang="fi-FI" dirty="0" err="1"/>
-              <a:t>called</a:t>
-            </a:r>
-            <a:r>
-              <a:rPr lang="fi-FI" dirty="0"/>
-              <a:t> ”XML </a:t>
-            </a:r>
-            <a:r>
-              <a:rPr lang="fi-FI" dirty="0" err="1"/>
-              <a:t>comments</a:t>
-            </a:r>
-            <a:r>
-              <a:rPr lang="fi-FI" dirty="0"/>
+              <a:rPr lang="en-US" sz="1800" dirty="0"/>
+              <a:t>Microsoft has a similar thing called ”</a:t>
+            </a:r>
+            <a:r>
+              <a:rPr lang="en-US" sz="1800" dirty="0">
+                <a:hlinkClick r:id="rId2"/>
+              </a:rPr>
+              <a:t>XML comments</a:t>
+            </a:r>
+            <a:r>
+              <a:rPr lang="en-US" sz="1800" dirty="0"/>
               <a:t>”</a:t>
             </a:r>
           </a:p>
           <a:p>
-            <a:pPr lvl="1"/>
-            <a:r>
-              <a:rPr lang="fi-FI" dirty="0" err="1"/>
-              <a:t>Someting</a:t>
-            </a:r>
-            <a:r>
-              <a:rPr lang="fi-FI" dirty="0"/>
-              <a:t> </a:t>
-            </a:r>
-            <a:r>
-              <a:rPr lang="fi-FI" dirty="0" err="1"/>
-              <a:t>like</a:t>
-            </a:r>
-            <a:r>
-              <a:rPr lang="fi-FI" dirty="0"/>
-              <a:t> /** **/ </a:t>
-            </a:r>
-            <a:r>
-              <a:rPr lang="fi-FI" dirty="0" err="1"/>
-              <a:t>instead</a:t>
-            </a:r>
-            <a:r>
-              <a:rPr lang="fi-FI" dirty="0"/>
-              <a:t> of /* */  and </a:t>
-            </a:r>
-            <a:r>
-              <a:rPr lang="fi-FI" dirty="0" err="1"/>
-              <a:t>with</a:t>
-            </a:r>
-            <a:r>
-              <a:rPr lang="fi-FI" dirty="0"/>
-              <a:t> </a:t>
-            </a:r>
-            <a:r>
-              <a:rPr lang="fi-FI" dirty="0" err="1"/>
-              <a:t>parameter</a:t>
-            </a:r>
-            <a:r>
-              <a:rPr lang="fi-FI" dirty="0"/>
-              <a:t> </a:t>
-            </a:r>
-            <a:r>
-              <a:rPr lang="fi-FI" dirty="0" err="1"/>
-              <a:t>annotation</a:t>
-            </a:r>
-            <a:r>
-              <a:rPr lang="fi-FI" dirty="0"/>
-              <a:t> </a:t>
-            </a:r>
-            <a:r>
-              <a:rPr lang="fi-FI" dirty="0" err="1"/>
-              <a:t>comments</a:t>
-            </a:r>
-            <a:endParaRPr lang="fi-FI" dirty="0"/>
-          </a:p>
-          <a:p>
-            <a:r>
-              <a:rPr lang="fi-FI" dirty="0" err="1"/>
-              <a:t>Thus</a:t>
-            </a:r>
-            <a:r>
-              <a:rPr lang="fi-FI" dirty="0"/>
-              <a:t>, </a:t>
-            </a:r>
-            <a:r>
-              <a:rPr lang="fi-FI" dirty="0" err="1"/>
-              <a:t>maybe</a:t>
-            </a:r>
-            <a:r>
-              <a:rPr lang="fi-FI" dirty="0"/>
-              <a:t> </a:t>
-            </a:r>
-            <a:r>
-              <a:rPr lang="fi-FI" dirty="0" err="1"/>
-              <a:t>use</a:t>
-            </a:r>
-            <a:r>
-              <a:rPr lang="fi-FI" dirty="0"/>
-              <a:t> a </a:t>
-            </a:r>
-            <a:r>
-              <a:rPr lang="fi-FI" dirty="0" err="1"/>
-              <a:t>library</a:t>
-            </a:r>
-            <a:r>
-              <a:rPr lang="fi-FI" dirty="0"/>
-              <a:t> </a:t>
-            </a:r>
-            <a:r>
-              <a:rPr lang="fi-FI" dirty="0" err="1"/>
-              <a:t>instead</a:t>
-            </a:r>
-            <a:r>
-              <a:rPr lang="fi-FI" dirty="0"/>
-              <a:t> of non-</a:t>
-            </a:r>
-            <a:r>
-              <a:rPr lang="fi-FI" dirty="0" err="1"/>
-              <a:t>updating</a:t>
-            </a:r>
-            <a:r>
-              <a:rPr lang="fi-FI" dirty="0"/>
-              <a:t> Word </a:t>
-            </a:r>
-            <a:r>
-              <a:rPr lang="fi-FI" dirty="0" err="1"/>
-              <a:t>document</a:t>
-            </a:r>
-            <a:r>
-              <a:rPr lang="fi-FI" dirty="0"/>
-              <a:t>.</a:t>
+            <a:r>
+              <a:rPr lang="en-US" sz="2000" dirty="0"/>
+              <a:t>Thus, maybe use some library or language doc feature instead of a non-updating Word document.</a:t>
             </a:r>
           </a:p>
           <a:p>
             <a:pPr marL="504000" lvl="1" indent="0">
               <a:buNone/>
             </a:pPr>
-            <a:endParaRPr lang="fi-FI" dirty="0"/>
+            <a:endParaRPr lang="en-US" dirty="0"/>
           </a:p>
           <a:p>
             <a:pPr marL="504000" lvl="1" indent="0">
               <a:buNone/>
             </a:pPr>
-            <a:endParaRPr lang="fi-FI" dirty="0"/>
+            <a:endParaRPr lang="en-US" dirty="0"/>
           </a:p>
           <a:p>
             <a:pPr marL="504000" lvl="1" indent="0">
               <a:buNone/>
             </a:pPr>
-            <a:endParaRPr lang="fi-FI"/>
-          </a:p>
-          <a:p>
-            <a:pPr marL="504000" lvl="1" indent="0">
+            <a:endParaRPr lang="en-US" dirty="0"/>
+          </a:p>
+          <a:p>
+            <a:pPr marL="0" indent="0">
               <a:buNone/>
             </a:pPr>
             <a:r>
-              <a:rPr lang="fi-FI"/>
-              <a:t>Didn’t</a:t>
-            </a:r>
-            <a:r>
-              <a:rPr lang="fi-FI" dirty="0"/>
-              <a:t> </a:t>
-            </a:r>
-            <a:r>
-              <a:rPr lang="fi-FI" dirty="0" err="1"/>
-              <a:t>we</a:t>
-            </a:r>
-            <a:r>
-              <a:rPr lang="fi-FI" dirty="0"/>
-              <a:t> </a:t>
-            </a:r>
-            <a:r>
-              <a:rPr lang="fi-FI" dirty="0" err="1"/>
-              <a:t>agree</a:t>
-            </a:r>
-            <a:r>
-              <a:rPr lang="fi-FI" dirty="0"/>
-              <a:t> on </a:t>
-            </a:r>
-            <a:r>
-              <a:rPr lang="fi-FI" dirty="0" err="1"/>
-              <a:t>this</a:t>
-            </a:r>
-            <a:r>
-              <a:rPr lang="fi-FI" dirty="0"/>
-              <a:t> </a:t>
-            </a:r>
-            <a:r>
-              <a:rPr lang="fi-FI" dirty="0" err="1"/>
-              <a:t>presentation</a:t>
-            </a:r>
-            <a:r>
-              <a:rPr lang="fi-FI" dirty="0"/>
-              <a:t> </a:t>
-            </a:r>
-            <a:r>
-              <a:rPr lang="fi-FI" dirty="0" err="1"/>
-              <a:t>mostly</a:t>
-            </a:r>
-            <a:r>
-              <a:rPr lang="fi-FI" dirty="0"/>
-              <a:t> </a:t>
-            </a:r>
-            <a:r>
-              <a:rPr lang="fi-FI" dirty="0" err="1"/>
-              <a:t>that</a:t>
-            </a:r>
-            <a:r>
-              <a:rPr lang="fi-FI" dirty="0"/>
-              <a:t> </a:t>
-            </a:r>
-            <a:r>
-              <a:rPr lang="fi-FI" dirty="0" err="1"/>
-              <a:t>we</a:t>
-            </a:r>
-            <a:r>
-              <a:rPr lang="fi-FI" dirty="0"/>
-              <a:t> </a:t>
-            </a:r>
-            <a:r>
-              <a:rPr lang="fi-FI" dirty="0" err="1"/>
-              <a:t>can</a:t>
-            </a:r>
-            <a:r>
-              <a:rPr lang="fi-FI" dirty="0"/>
-              <a:t> </a:t>
-            </a:r>
-            <a:r>
-              <a:rPr lang="fi-FI" dirty="0" err="1"/>
-              <a:t>almost</a:t>
-            </a:r>
-            <a:r>
-              <a:rPr lang="fi-FI" dirty="0"/>
-              <a:t> </a:t>
-            </a:r>
-            <a:r>
-              <a:rPr lang="fi-FI" dirty="0" err="1"/>
-              <a:t>totally</a:t>
-            </a:r>
-            <a:r>
-              <a:rPr lang="fi-FI" dirty="0"/>
-              <a:t> </a:t>
-            </a:r>
-            <a:r>
-              <a:rPr lang="fi-FI" dirty="0" err="1"/>
-              <a:t>remove</a:t>
-            </a:r>
-            <a:r>
-              <a:rPr lang="fi-FI" dirty="0"/>
-              <a:t> non-</a:t>
-            </a:r>
-            <a:r>
-              <a:rPr lang="fi-FI" dirty="0" err="1"/>
-              <a:t>generated</a:t>
-            </a:r>
-            <a:r>
-              <a:rPr lang="fi-FI" dirty="0"/>
-              <a:t>, non-</a:t>
-            </a:r>
-            <a:r>
-              <a:rPr lang="fi-FI" dirty="0" err="1"/>
-              <a:t>code</a:t>
-            </a:r>
-            <a:r>
-              <a:rPr lang="fi-FI" dirty="0"/>
-              <a:t> </a:t>
-            </a:r>
-            <a:r>
-              <a:rPr lang="fi-FI" dirty="0" err="1"/>
-              <a:t>or</a:t>
-            </a:r>
-            <a:r>
-              <a:rPr lang="fi-FI" dirty="0"/>
-              <a:t> </a:t>
-            </a:r>
-            <a:r>
-              <a:rPr lang="fi-FI" dirty="0" err="1"/>
-              <a:t>script</a:t>
-            </a:r>
-            <a:r>
-              <a:rPr lang="fi-FI" dirty="0"/>
-              <a:t> </a:t>
-            </a:r>
-            <a:r>
-              <a:rPr lang="fi-FI" dirty="0" err="1"/>
-              <a:t>linked</a:t>
-            </a:r>
-            <a:r>
-              <a:rPr lang="fi-FI" dirty="0"/>
-              <a:t> </a:t>
-            </a:r>
-            <a:r>
-              <a:rPr lang="fi-FI" dirty="0" err="1"/>
-              <a:t>documentation</a:t>
-            </a:r>
-            <a:r>
-              <a:rPr lang="fi-FI" dirty="0"/>
-              <a:t>?</a:t>
-            </a:r>
+              <a:rPr lang="en-US" sz="2000" dirty="0"/>
+              <a:t>Didn’t we agree through this presentation mostly that we can almost totally remove non-generated, non-code/script-linked documentation? </a:t>
+            </a:r>
+            <a:r>
+              <a:rPr lang="en-US" sz="2000" dirty="0">
+                <a:sym typeface="Wingdings" panose="05000000000000000000" pitchFamily="2" charset="2"/>
+              </a:rPr>
+              <a:t></a:t>
+            </a:r>
+            <a:endParaRPr lang="en-US" sz="2000" dirty="0"/>
           </a:p>
         </p:txBody>
       </p:sp>
@@ -10417,24 +9301,6 @@
 </file>
 
 <file path=customXml/item1.xml><?xml version="1.0" encoding="utf-8"?>
-<?mso-contentType ?>
-<FormTemplates xmlns="http://schemas.microsoft.com/sharepoint/v3/contenttype/forms">
-  <Display>DocumentLibraryForm</Display>
-  <Edit>DocumentLibraryForm</Edit>
-  <New>DocumentLibraryForm</New>
-</FormTemplates>
-</file>
-
-<file path=customXml/item2.xml><?xml version="1.0" encoding="utf-8"?>
-<p:properties xmlns:p="http://schemas.microsoft.com/office/2006/metadata/properties" xmlns:xsi="http://www.w3.org/2001/XMLSchema-instance" xmlns:pc="http://schemas.microsoft.com/office/infopath/2007/PartnerControls">
-  <documentManagement>
-    <PublishingExpirationDate xmlns="http://schemas.microsoft.com/sharepoint/v3" xsi:nil="true"/>
-    <PublishingStartDate xmlns="http://schemas.microsoft.com/sharepoint/v3" xsi:nil="true"/>
-  </documentManagement>
-</p:properties>
-</file>
-
-<file path=customXml/item3.xml><?xml version="1.0" encoding="utf-8"?>
 <ct:contentTypeSchema xmlns:ct="http://schemas.microsoft.com/office/2006/metadata/contentType" xmlns:ma="http://schemas.microsoft.com/office/2006/metadata/properties/metaAttributes" ct:_="" ma:_="" ma:contentTypeName="Document" ma:contentTypeID="0x01010024C55B41993A414DABB8DD07ACBA0814" ma:contentTypeVersion="1" ma:contentTypeDescription="Create a new document." ma:contentTypeScope="" ma:versionID="3ea0c22b5866975a7b271665de4056c5">
   <xsd:schema xmlns:xsd="http://www.w3.org/2001/XMLSchema" xmlns:xs="http://www.w3.org/2001/XMLSchema" xmlns:p="http://schemas.microsoft.com/office/2006/metadata/properties" xmlns:ns1="http://schemas.microsoft.com/sharepoint/v3" targetNamespace="http://schemas.microsoft.com/office/2006/metadata/properties" ma:root="true" ma:fieldsID="ef2aa9ed40e72a78c3822fc753b43e87" ns1:_="">
     <xsd:import namespace="http://schemas.microsoft.com/sharepoint/v3"/>
@@ -10566,10 +9432,38 @@
 </ct:contentTypeSchema>
 </file>
 
+<file path=customXml/item2.xml><?xml version="1.0" encoding="utf-8"?>
+<p:properties xmlns:p="http://schemas.microsoft.com/office/2006/metadata/properties" xmlns:xsi="http://www.w3.org/2001/XMLSchema-instance" xmlns:pc="http://schemas.microsoft.com/office/infopath/2007/PartnerControls">
+  <documentManagement>
+    <PublishingExpirationDate xmlns="http://schemas.microsoft.com/sharepoint/v3" xsi:nil="true"/>
+    <PublishingStartDate xmlns="http://schemas.microsoft.com/sharepoint/v3" xsi:nil="true"/>
+  </documentManagement>
+</p:properties>
+</file>
+
+<file path=customXml/item3.xml><?xml version="1.0" encoding="utf-8"?>
+<?mso-contentType ?>
+<FormTemplates xmlns="http://schemas.microsoft.com/sharepoint/v3/contenttype/forms">
+  <Display>DocumentLibraryForm</Display>
+  <Edit>DocumentLibraryForm</Edit>
+  <New>DocumentLibraryForm</New>
+</FormTemplates>
+</file>
+
 <file path=customXml/itemProps1.xml><?xml version="1.0" encoding="utf-8"?>
-<ds:datastoreItem xmlns:ds="http://schemas.openxmlformats.org/officeDocument/2006/customXml" ds:itemID="{D546C03B-CD3A-4EA0-AAA4-0E00E896454E}">
+<ds:datastoreItem xmlns:ds="http://schemas.openxmlformats.org/officeDocument/2006/customXml" ds:itemID="{B9E4DC25-62AA-44A0-8D5C-DB44892588AF}">
   <ds:schemaRefs>
-    <ds:schemaRef ds:uri="http://schemas.microsoft.com/sharepoint/v3/contenttype/forms"/>
+    <ds:schemaRef ds:uri="http://schemas.microsoft.com/office/2006/metadata/contentType"/>
+    <ds:schemaRef ds:uri="http://schemas.microsoft.com/office/2006/metadata/properties/metaAttributes"/>
+    <ds:schemaRef ds:uri="http://www.w3.org/2001/XMLSchema"/>
+    <ds:schemaRef ds:uri="http://schemas.microsoft.com/office/2006/metadata/properties"/>
+    <ds:schemaRef ds:uri="http://schemas.microsoft.com/sharepoint/v3"/>
+    <ds:schemaRef ds:uri="http://schemas.microsoft.com/office/2006/documentManagement/types"/>
+    <ds:schemaRef ds:uri="http://schemas.microsoft.com/office/infopath/2007/PartnerControls"/>
+    <ds:schemaRef ds:uri="http://schemas.openxmlformats.org/package/2006/metadata/core-properties"/>
+    <ds:schemaRef ds:uri="http://purl.org/dc/elements/1.1/"/>
+    <ds:schemaRef ds:uri="http://purl.org/dc/terms/"/>
+    <ds:schemaRef ds:uri="http://schemas.microsoft.com/internal/obd"/>
   </ds:schemaRefs>
 </ds:datastoreItem>
 </file>
@@ -10591,19 +9485,9 @@
 </file>
 
 <file path=customXml/itemProps3.xml><?xml version="1.0" encoding="utf-8"?>
-<ds:datastoreItem xmlns:ds="http://schemas.openxmlformats.org/officeDocument/2006/customXml" ds:itemID="{B9E4DC25-62AA-44A0-8D5C-DB44892588AF}">
+<ds:datastoreItem xmlns:ds="http://schemas.openxmlformats.org/officeDocument/2006/customXml" ds:itemID="{D546C03B-CD3A-4EA0-AAA4-0E00E896454E}">
   <ds:schemaRefs>
-    <ds:schemaRef ds:uri="http://schemas.microsoft.com/office/2006/metadata/contentType"/>
-    <ds:schemaRef ds:uri="http://schemas.microsoft.com/office/2006/metadata/properties/metaAttributes"/>
-    <ds:schemaRef ds:uri="http://www.w3.org/2001/XMLSchema"/>
-    <ds:schemaRef ds:uri="http://schemas.microsoft.com/office/2006/metadata/properties"/>
-    <ds:schemaRef ds:uri="http://schemas.microsoft.com/sharepoint/v3"/>
-    <ds:schemaRef ds:uri="http://schemas.microsoft.com/office/2006/documentManagement/types"/>
-    <ds:schemaRef ds:uri="http://schemas.microsoft.com/office/infopath/2007/PartnerControls"/>
-    <ds:schemaRef ds:uri="http://schemas.openxmlformats.org/package/2006/metadata/core-properties"/>
-    <ds:schemaRef ds:uri="http://purl.org/dc/elements/1.1/"/>
-    <ds:schemaRef ds:uri="http://purl.org/dc/terms/"/>
-    <ds:schemaRef ds:uri="http://schemas.microsoft.com/internal/obd"/>
+    <ds:schemaRef ds:uri="http://schemas.microsoft.com/sharepoint/v3/contenttype/forms"/>
   </ds:schemaRefs>
 </ds:datastoreItem>
 </file>
</xml_diff>